<commit_message>
Discussion anti-ferro done. Proof reading and get better discussion on excited state needed.
</commit_message>
<xml_diff>
--- a/04-CrMagOpt/Pictures/Antiferro-Cr.pptx
+++ b/04-CrMagOpt/Pictures/Antiferro-Cr.pptx
@@ -288,7 +288,7 @@
           <a:p>
             <a:fld id="{A26ED350-09DA-47B2-96B1-414F1C332C84}" type="datetimeFigureOut">
               <a:rPr lang="fr-FR" smtClean="0"/>
-              <a:t>26/06/2017</a:t>
+              <a:t>27/06/2017</a:t>
             </a:fld>
             <a:endParaRPr lang="fr-FR"/>
           </a:p>
@@ -458,7 +458,7 @@
           <a:p>
             <a:fld id="{A26ED350-09DA-47B2-96B1-414F1C332C84}" type="datetimeFigureOut">
               <a:rPr lang="fr-FR" smtClean="0"/>
-              <a:t>26/06/2017</a:t>
+              <a:t>27/06/2017</a:t>
             </a:fld>
             <a:endParaRPr lang="fr-FR"/>
           </a:p>
@@ -638,7 +638,7 @@
           <a:p>
             <a:fld id="{A26ED350-09DA-47B2-96B1-414F1C332C84}" type="datetimeFigureOut">
               <a:rPr lang="fr-FR" smtClean="0"/>
-              <a:t>26/06/2017</a:t>
+              <a:t>27/06/2017</a:t>
             </a:fld>
             <a:endParaRPr lang="fr-FR"/>
           </a:p>
@@ -808,7 +808,7 @@
           <a:p>
             <a:fld id="{A26ED350-09DA-47B2-96B1-414F1C332C84}" type="datetimeFigureOut">
               <a:rPr lang="fr-FR" smtClean="0"/>
-              <a:t>26/06/2017</a:t>
+              <a:t>27/06/2017</a:t>
             </a:fld>
             <a:endParaRPr lang="fr-FR"/>
           </a:p>
@@ -1054,7 +1054,7 @@
           <a:p>
             <a:fld id="{A26ED350-09DA-47B2-96B1-414F1C332C84}" type="datetimeFigureOut">
               <a:rPr lang="fr-FR" smtClean="0"/>
-              <a:t>26/06/2017</a:t>
+              <a:t>27/06/2017</a:t>
             </a:fld>
             <a:endParaRPr lang="fr-FR"/>
           </a:p>
@@ -1342,7 +1342,7 @@
           <a:p>
             <a:fld id="{A26ED350-09DA-47B2-96B1-414F1C332C84}" type="datetimeFigureOut">
               <a:rPr lang="fr-FR" smtClean="0"/>
-              <a:t>26/06/2017</a:t>
+              <a:t>27/06/2017</a:t>
             </a:fld>
             <a:endParaRPr lang="fr-FR"/>
           </a:p>
@@ -1769,7 +1769,7 @@
           <a:p>
             <a:fld id="{A26ED350-09DA-47B2-96B1-414F1C332C84}" type="datetimeFigureOut">
               <a:rPr lang="fr-FR" smtClean="0"/>
-              <a:t>26/06/2017</a:t>
+              <a:t>27/06/2017</a:t>
             </a:fld>
             <a:endParaRPr lang="fr-FR"/>
           </a:p>
@@ -1887,7 +1887,7 @@
           <a:p>
             <a:fld id="{A26ED350-09DA-47B2-96B1-414F1C332C84}" type="datetimeFigureOut">
               <a:rPr lang="fr-FR" smtClean="0"/>
-              <a:t>26/06/2017</a:t>
+              <a:t>27/06/2017</a:t>
             </a:fld>
             <a:endParaRPr lang="fr-FR"/>
           </a:p>
@@ -1982,7 +1982,7 @@
           <a:p>
             <a:fld id="{A26ED350-09DA-47B2-96B1-414F1C332C84}" type="datetimeFigureOut">
               <a:rPr lang="fr-FR" smtClean="0"/>
-              <a:t>26/06/2017</a:t>
+              <a:t>27/06/2017</a:t>
             </a:fld>
             <a:endParaRPr lang="fr-FR"/>
           </a:p>
@@ -2259,7 +2259,7 @@
           <a:p>
             <a:fld id="{A26ED350-09DA-47B2-96B1-414F1C332C84}" type="datetimeFigureOut">
               <a:rPr lang="fr-FR" smtClean="0"/>
-              <a:t>26/06/2017</a:t>
+              <a:t>27/06/2017</a:t>
             </a:fld>
             <a:endParaRPr lang="fr-FR"/>
           </a:p>
@@ -2512,7 +2512,7 @@
           <a:p>
             <a:fld id="{A26ED350-09DA-47B2-96B1-414F1C332C84}" type="datetimeFigureOut">
               <a:rPr lang="fr-FR" smtClean="0"/>
-              <a:t>26/06/2017</a:t>
+              <a:t>27/06/2017</a:t>
             </a:fld>
             <a:endParaRPr lang="fr-FR"/>
           </a:p>
@@ -2725,7 +2725,7 @@
           <a:p>
             <a:fld id="{A26ED350-09DA-47B2-96B1-414F1C332C84}" type="datetimeFigureOut">
               <a:rPr lang="fr-FR" smtClean="0"/>
-              <a:t>26/06/2017</a:t>
+              <a:t>27/06/2017</a:t>
             </a:fld>
             <a:endParaRPr lang="fr-FR"/>
           </a:p>
@@ -3478,7 +3478,7 @@
         </p:nvSpPr>
         <p:spPr>
           <a:xfrm>
-            <a:off x="648271" y="58510"/>
+            <a:off x="648271" y="255950"/>
             <a:ext cx="628698" cy="553998"/>
           </a:xfrm>
           <a:prstGeom prst="rect">
@@ -3585,6 +3585,310 @@
               <a:t>s+</a:t>
             </a:r>
             <a:endParaRPr lang="fr-FR" sz="3000" dirty="0">
+              <a:solidFill>
+                <a:srgbClr val="FF0000"/>
+              </a:solidFill>
+              <a:latin typeface="Symbol" panose="05050102010706020507" pitchFamily="18" charset="2"/>
+            </a:endParaRPr>
+          </a:p>
+        </p:txBody>
+      </p:sp>
+      <p:sp>
+        <p:nvSpPr>
+          <p:cNvPr id="14" name="CustomShape 2"/>
+          <p:cNvSpPr/>
+          <p:nvPr/>
+        </p:nvSpPr>
+        <p:spPr>
+          <a:xfrm>
+            <a:off x="1314376" y="2309241"/>
+            <a:ext cx="757487" cy="588939"/>
+          </a:xfrm>
+          <a:prstGeom prst="ellipse">
+            <a:avLst/>
+          </a:prstGeom>
+          <a:noFill/>
+          <a:ln w="19080">
+            <a:solidFill>
+              <a:srgbClr val="FF0000"/>
+            </a:solidFill>
+            <a:prstDash val="dash"/>
+            <a:round/>
+          </a:ln>
+        </p:spPr>
+      </p:sp>
+      <p:sp>
+        <p:nvSpPr>
+          <p:cNvPr id="15" name="ZoneTexte 14"/>
+          <p:cNvSpPr txBox="1"/>
+          <p:nvPr/>
+        </p:nvSpPr>
+        <p:spPr>
+          <a:xfrm>
+            <a:off x="860406" y="2528848"/>
+            <a:ext cx="453970" cy="369332"/>
+          </a:xfrm>
+          <a:prstGeom prst="rect">
+            <a:avLst/>
+          </a:prstGeom>
+          <a:noFill/>
+        </p:spPr>
+        <p:txBody>
+          <a:bodyPr wrap="none" rtlCol="0">
+            <a:spAutoFit/>
+          </a:bodyPr>
+          <a:lstStyle/>
+          <a:p>
+            <a:r>
+              <a:rPr lang="fr-FR" dirty="0" smtClean="0">
+                <a:solidFill>
+                  <a:srgbClr val="FF0000"/>
+                </a:solidFill>
+                <a:latin typeface="Symbol" panose="05050102010706020507" pitchFamily="18" charset="2"/>
+              </a:rPr>
+              <a:t>(4)</a:t>
+            </a:r>
+            <a:endParaRPr lang="fr-FR" dirty="0">
+              <a:solidFill>
+                <a:srgbClr val="FF0000"/>
+              </a:solidFill>
+              <a:latin typeface="Symbol" panose="05050102010706020507" pitchFamily="18" charset="2"/>
+            </a:endParaRPr>
+          </a:p>
+        </p:txBody>
+      </p:sp>
+      <p:sp>
+        <p:nvSpPr>
+          <p:cNvPr id="16" name="CustomShape 2"/>
+          <p:cNvSpPr/>
+          <p:nvPr/>
+        </p:nvSpPr>
+        <p:spPr>
+          <a:xfrm>
+            <a:off x="2071863" y="1350819"/>
+            <a:ext cx="538657" cy="539249"/>
+          </a:xfrm>
+          <a:prstGeom prst="ellipse">
+            <a:avLst/>
+          </a:prstGeom>
+          <a:noFill/>
+          <a:ln w="19080">
+            <a:solidFill>
+              <a:srgbClr val="FF0000"/>
+            </a:solidFill>
+            <a:prstDash val="dash"/>
+            <a:round/>
+          </a:ln>
+        </p:spPr>
+      </p:sp>
+      <p:sp>
+        <p:nvSpPr>
+          <p:cNvPr id="17" name="ZoneTexte 16"/>
+          <p:cNvSpPr txBox="1"/>
+          <p:nvPr/>
+        </p:nvSpPr>
+        <p:spPr>
+          <a:xfrm>
+            <a:off x="2610520" y="1530028"/>
+            <a:ext cx="453970" cy="369332"/>
+          </a:xfrm>
+          <a:prstGeom prst="rect">
+            <a:avLst/>
+          </a:prstGeom>
+          <a:noFill/>
+        </p:spPr>
+        <p:txBody>
+          <a:bodyPr wrap="none" rtlCol="0">
+            <a:spAutoFit/>
+          </a:bodyPr>
+          <a:lstStyle/>
+          <a:p>
+            <a:r>
+              <a:rPr lang="fr-FR" dirty="0" smtClean="0">
+                <a:solidFill>
+                  <a:srgbClr val="FF0000"/>
+                </a:solidFill>
+                <a:latin typeface="Symbol" panose="05050102010706020507" pitchFamily="18" charset="2"/>
+              </a:rPr>
+              <a:t>(2)</a:t>
+            </a:r>
+            <a:endParaRPr lang="fr-FR" dirty="0">
+              <a:solidFill>
+                <a:srgbClr val="FF0000"/>
+              </a:solidFill>
+              <a:latin typeface="Symbol" panose="05050102010706020507" pitchFamily="18" charset="2"/>
+            </a:endParaRPr>
+          </a:p>
+        </p:txBody>
+      </p:sp>
+      <p:sp>
+        <p:nvSpPr>
+          <p:cNvPr id="18" name="CustomShape 2"/>
+          <p:cNvSpPr/>
+          <p:nvPr/>
+        </p:nvSpPr>
+        <p:spPr>
+          <a:xfrm>
+            <a:off x="1999855" y="2946013"/>
+            <a:ext cx="538657" cy="539249"/>
+          </a:xfrm>
+          <a:prstGeom prst="ellipse">
+            <a:avLst/>
+          </a:prstGeom>
+          <a:noFill/>
+          <a:ln w="19080">
+            <a:solidFill>
+              <a:srgbClr val="FF0000"/>
+            </a:solidFill>
+            <a:prstDash val="dash"/>
+            <a:round/>
+          </a:ln>
+        </p:spPr>
+      </p:sp>
+      <p:sp>
+        <p:nvSpPr>
+          <p:cNvPr id="19" name="ZoneTexte 18"/>
+          <p:cNvSpPr txBox="1"/>
+          <p:nvPr/>
+        </p:nvSpPr>
+        <p:spPr>
+          <a:xfrm>
+            <a:off x="2709637" y="2842368"/>
+            <a:ext cx="453970" cy="369332"/>
+          </a:xfrm>
+          <a:prstGeom prst="rect">
+            <a:avLst/>
+          </a:prstGeom>
+          <a:noFill/>
+        </p:spPr>
+        <p:txBody>
+          <a:bodyPr wrap="none" rtlCol="0">
+            <a:spAutoFit/>
+          </a:bodyPr>
+          <a:lstStyle/>
+          <a:p>
+            <a:r>
+              <a:rPr lang="fr-FR" dirty="0" smtClean="0">
+                <a:solidFill>
+                  <a:srgbClr val="FF0000"/>
+                </a:solidFill>
+                <a:latin typeface="Symbol" panose="05050102010706020507" pitchFamily="18" charset="2"/>
+              </a:rPr>
+              <a:t>(1)</a:t>
+            </a:r>
+            <a:endParaRPr lang="fr-FR" dirty="0">
+              <a:solidFill>
+                <a:srgbClr val="FF0000"/>
+              </a:solidFill>
+              <a:latin typeface="Symbol" panose="05050102010706020507" pitchFamily="18" charset="2"/>
+            </a:endParaRPr>
+          </a:p>
+        </p:txBody>
+      </p:sp>
+      <p:sp>
+        <p:nvSpPr>
+          <p:cNvPr id="21" name="CustomShape 2"/>
+          <p:cNvSpPr/>
+          <p:nvPr/>
+        </p:nvSpPr>
+        <p:spPr>
+          <a:xfrm>
+            <a:off x="1386384" y="-211115"/>
+            <a:ext cx="538657" cy="539249"/>
+          </a:xfrm>
+          <a:prstGeom prst="ellipse">
+            <a:avLst/>
+          </a:prstGeom>
+          <a:noFill/>
+          <a:ln w="19080">
+            <a:solidFill>
+              <a:srgbClr val="FF0000"/>
+            </a:solidFill>
+            <a:prstDash val="dash"/>
+            <a:round/>
+          </a:ln>
+        </p:spPr>
+      </p:sp>
+      <p:sp>
+        <p:nvSpPr>
+          <p:cNvPr id="2" name="Rectangle 1"/>
+          <p:cNvSpPr/>
+          <p:nvPr/>
+        </p:nvSpPr>
+        <p:spPr>
+          <a:xfrm>
+            <a:off x="1314376" y="-270000"/>
+            <a:ext cx="792088" cy="306000"/>
+          </a:xfrm>
+          <a:prstGeom prst="rect">
+            <a:avLst/>
+          </a:prstGeom>
+          <a:solidFill>
+            <a:schemeClr val="bg1"/>
+          </a:solidFill>
+          <a:ln>
+            <a:solidFill>
+              <a:schemeClr val="bg1"/>
+            </a:solidFill>
+          </a:ln>
+        </p:spPr>
+        <p:style>
+          <a:lnRef idx="2">
+            <a:schemeClr val="accent1">
+              <a:shade val="50000"/>
+            </a:schemeClr>
+          </a:lnRef>
+          <a:fillRef idx="1">
+            <a:schemeClr val="accent1"/>
+          </a:fillRef>
+          <a:effectRef idx="0">
+            <a:schemeClr val="accent1"/>
+          </a:effectRef>
+          <a:fontRef idx="minor">
+            <a:schemeClr val="lt1"/>
+          </a:fontRef>
+        </p:style>
+        <p:txBody>
+          <a:bodyPr rtlCol="0" anchor="ctr"/>
+          <a:lstStyle/>
+          <a:p>
+            <a:pPr algn="ctr"/>
+            <a:endParaRPr lang="fr-FR"/>
+          </a:p>
+        </p:txBody>
+      </p:sp>
+      <p:sp>
+        <p:nvSpPr>
+          <p:cNvPr id="23" name="ZoneTexte 22"/>
+          <p:cNvSpPr txBox="1"/>
+          <p:nvPr/>
+        </p:nvSpPr>
+        <p:spPr>
+          <a:xfrm>
+            <a:off x="954336" y="8568"/>
+            <a:ext cx="453970" cy="369332"/>
+          </a:xfrm>
+          <a:prstGeom prst="rect">
+            <a:avLst/>
+          </a:prstGeom>
+          <a:noFill/>
+        </p:spPr>
+        <p:txBody>
+          <a:bodyPr wrap="none" rtlCol="0">
+            <a:spAutoFit/>
+          </a:bodyPr>
+          <a:lstStyle/>
+          <a:p>
+            <a:r>
+              <a:rPr lang="fr-FR" dirty="0" smtClean="0">
+                <a:solidFill>
+                  <a:srgbClr val="FF0000"/>
+                </a:solidFill>
+                <a:latin typeface="Symbol" panose="05050102010706020507" pitchFamily="18" charset="2"/>
+              </a:rPr>
+              <a:t>(6)</a:t>
+            </a:r>
+            <a:endParaRPr lang="fr-FR" dirty="0">
               <a:solidFill>
                 <a:srgbClr val="FF0000"/>
               </a:solidFill>

</xml_diff>

<commit_message>
Chap04: Pictures modified according to last criticism, Fig.6 - 7 remaining.
</commit_message>
<xml_diff>
--- a/04-CrMagOpt/Pictures/Antiferro-Cr.pptx
+++ b/04-CrMagOpt/Pictures/Antiferro-Cr.pptx
@@ -288,7 +288,7 @@
           <a:p>
             <a:fld id="{A26ED350-09DA-47B2-96B1-414F1C332C84}" type="datetimeFigureOut">
               <a:rPr lang="fr-FR" smtClean="0"/>
-              <a:t>27/06/2017</a:t>
+              <a:t>29/06/2017</a:t>
             </a:fld>
             <a:endParaRPr lang="fr-FR"/>
           </a:p>
@@ -458,7 +458,7 @@
           <a:p>
             <a:fld id="{A26ED350-09DA-47B2-96B1-414F1C332C84}" type="datetimeFigureOut">
               <a:rPr lang="fr-FR" smtClean="0"/>
-              <a:t>27/06/2017</a:t>
+              <a:t>29/06/2017</a:t>
             </a:fld>
             <a:endParaRPr lang="fr-FR"/>
           </a:p>
@@ -638,7 +638,7 @@
           <a:p>
             <a:fld id="{A26ED350-09DA-47B2-96B1-414F1C332C84}" type="datetimeFigureOut">
               <a:rPr lang="fr-FR" smtClean="0"/>
-              <a:t>27/06/2017</a:t>
+              <a:t>29/06/2017</a:t>
             </a:fld>
             <a:endParaRPr lang="fr-FR"/>
           </a:p>
@@ -808,7 +808,7 @@
           <a:p>
             <a:fld id="{A26ED350-09DA-47B2-96B1-414F1C332C84}" type="datetimeFigureOut">
               <a:rPr lang="fr-FR" smtClean="0"/>
-              <a:t>27/06/2017</a:t>
+              <a:t>29/06/2017</a:t>
             </a:fld>
             <a:endParaRPr lang="fr-FR"/>
           </a:p>
@@ -1054,7 +1054,7 @@
           <a:p>
             <a:fld id="{A26ED350-09DA-47B2-96B1-414F1C332C84}" type="datetimeFigureOut">
               <a:rPr lang="fr-FR" smtClean="0"/>
-              <a:t>27/06/2017</a:t>
+              <a:t>29/06/2017</a:t>
             </a:fld>
             <a:endParaRPr lang="fr-FR"/>
           </a:p>
@@ -1342,7 +1342,7 @@
           <a:p>
             <a:fld id="{A26ED350-09DA-47B2-96B1-414F1C332C84}" type="datetimeFigureOut">
               <a:rPr lang="fr-FR" smtClean="0"/>
-              <a:t>27/06/2017</a:t>
+              <a:t>29/06/2017</a:t>
             </a:fld>
             <a:endParaRPr lang="fr-FR"/>
           </a:p>
@@ -1769,7 +1769,7 @@
           <a:p>
             <a:fld id="{A26ED350-09DA-47B2-96B1-414F1C332C84}" type="datetimeFigureOut">
               <a:rPr lang="fr-FR" smtClean="0"/>
-              <a:t>27/06/2017</a:t>
+              <a:t>29/06/2017</a:t>
             </a:fld>
             <a:endParaRPr lang="fr-FR"/>
           </a:p>
@@ -1887,7 +1887,7 @@
           <a:p>
             <a:fld id="{A26ED350-09DA-47B2-96B1-414F1C332C84}" type="datetimeFigureOut">
               <a:rPr lang="fr-FR" smtClean="0"/>
-              <a:t>27/06/2017</a:t>
+              <a:t>29/06/2017</a:t>
             </a:fld>
             <a:endParaRPr lang="fr-FR"/>
           </a:p>
@@ -1982,7 +1982,7 @@
           <a:p>
             <a:fld id="{A26ED350-09DA-47B2-96B1-414F1C332C84}" type="datetimeFigureOut">
               <a:rPr lang="fr-FR" smtClean="0"/>
-              <a:t>27/06/2017</a:t>
+              <a:t>29/06/2017</a:t>
             </a:fld>
             <a:endParaRPr lang="fr-FR"/>
           </a:p>
@@ -2259,7 +2259,7 @@
           <a:p>
             <a:fld id="{A26ED350-09DA-47B2-96B1-414F1C332C84}" type="datetimeFigureOut">
               <a:rPr lang="fr-FR" smtClean="0"/>
-              <a:t>27/06/2017</a:t>
+              <a:t>29/06/2017</a:t>
             </a:fld>
             <a:endParaRPr lang="fr-FR"/>
           </a:p>
@@ -2512,7 +2512,7 @@
           <a:p>
             <a:fld id="{A26ED350-09DA-47B2-96B1-414F1C332C84}" type="datetimeFigureOut">
               <a:rPr lang="fr-FR" smtClean="0"/>
-              <a:t>27/06/2017</a:t>
+              <a:t>29/06/2017</a:t>
             </a:fld>
             <a:endParaRPr lang="fr-FR"/>
           </a:p>
@@ -2725,7 +2725,7 @@
           <a:p>
             <a:fld id="{A26ED350-09DA-47B2-96B1-414F1C332C84}" type="datetimeFigureOut">
               <a:rPr lang="fr-FR" smtClean="0"/>
-              <a:t>27/06/2017</a:t>
+              <a:t>29/06/2017</a:t>
             </a:fld>
             <a:endParaRPr lang="fr-FR"/>
           </a:p>
@@ -3102,251 +3102,730 @@
       </p:grpSpPr>
       <p:grpSp>
         <p:nvGrpSpPr>
-          <p:cNvPr id="71" name="Groupe 70"/>
+          <p:cNvPr id="3" name="Groupe 2"/>
           <p:cNvGrpSpPr/>
           <p:nvPr/>
         </p:nvGrpSpPr>
         <p:grpSpPr>
           <a:xfrm>
-            <a:off x="3779706" y="-126000"/>
-            <a:ext cx="1837117" cy="7074000"/>
-            <a:chOff x="3779912" y="-126000"/>
-            <a:chExt cx="1837117" cy="7074000"/>
+            <a:off x="-90000" y="-270000"/>
+            <a:ext cx="5742607" cy="7218000"/>
+            <a:chOff x="-35743" y="-270000"/>
+            <a:chExt cx="5742607" cy="7218000"/>
           </a:xfrm>
         </p:grpSpPr>
-        <p:pic>
-          <p:nvPicPr>
-            <p:cNvPr id="72" name="Picture 15"/>
-            <p:cNvPicPr>
-              <a:picLocks noChangeAspect="1" noChangeArrowheads="1"/>
-            </p:cNvPicPr>
+        <p:grpSp>
+          <p:nvGrpSpPr>
+            <p:cNvPr id="71" name="Groupe 70"/>
+            <p:cNvGrpSpPr/>
             <p:nvPr/>
-          </p:nvPicPr>
-          <p:blipFill rotWithShape="1">
-            <a:blip r:embed="rId2">
+          </p:nvGrpSpPr>
+          <p:grpSpPr>
+            <a:xfrm>
+              <a:off x="3869747" y="-126000"/>
+              <a:ext cx="1837117" cy="7074000"/>
+              <a:chOff x="3779912" y="-126000"/>
+              <a:chExt cx="1837117" cy="7074000"/>
+            </a:xfrm>
+          </p:grpSpPr>
+          <p:pic>
+            <p:nvPicPr>
+              <p:cNvPr id="72" name="Picture 15"/>
+              <p:cNvPicPr>
+                <a:picLocks noChangeAspect="1" noChangeArrowheads="1"/>
+              </p:cNvPicPr>
+              <p:nvPr/>
+            </p:nvPicPr>
+            <p:blipFill rotWithShape="1">
+              <a:blip r:embed="rId2">
+                <a:extLst>
+                  <a:ext uri="{28A0092B-C50C-407E-A947-70E740481C1C}">
+                    <a14:useLocalDpi xmlns:a14="http://schemas.microsoft.com/office/drawing/2010/main" val="0"/>
+                  </a:ext>
+                </a:extLst>
+              </a:blip>
+              <a:srcRect t="4704" r="12767" b="20137"/>
+              <a:stretch/>
+            </p:blipFill>
+            <p:spPr bwMode="auto">
+              <a:xfrm>
+                <a:off x="3779912" y="2156457"/>
+                <a:ext cx="1837117" cy="2118363"/>
+              </a:xfrm>
+              <a:prstGeom prst="rect">
+                <a:avLst/>
+              </a:prstGeom>
+              <a:noFill/>
+              <a:ln>
+                <a:noFill/>
+              </a:ln>
               <a:extLst>
-                <a:ext uri="{28A0092B-C50C-407E-A947-70E740481C1C}">
-                  <a14:useLocalDpi xmlns:a14="http://schemas.microsoft.com/office/drawing/2010/main" val="0"/>
+                <a:ext uri="{909E8E84-426E-40DD-AFC4-6F175D3DCCD1}">
+                  <a14:hiddenFill xmlns:a14="http://schemas.microsoft.com/office/drawing/2010/main">
+                    <a:solidFill>
+                      <a:schemeClr val="accent1"/>
+                    </a:solidFill>
+                  </a14:hiddenFill>
+                </a:ext>
+                <a:ext uri="{91240B29-F687-4F45-9708-019B960494DF}">
+                  <a14:hiddenLine xmlns:a14="http://schemas.microsoft.com/office/drawing/2010/main" w="9525">
+                    <a:solidFill>
+                      <a:schemeClr val="tx1"/>
+                    </a:solidFill>
+                    <a:miter lim="800000"/>
+                    <a:headEnd/>
+                    <a:tailEnd/>
+                  </a14:hiddenLine>
                 </a:ext>
               </a:extLst>
-            </a:blip>
-            <a:srcRect t="4704" r="12767" b="20137"/>
-            <a:stretch/>
-          </p:blipFill>
-          <p:spPr bwMode="auto">
+            </p:spPr>
+          </p:pic>
+          <p:pic>
+            <p:nvPicPr>
+              <p:cNvPr id="73" name="Picture 9"/>
+              <p:cNvPicPr>
+                <a:picLocks noChangeAspect="1" noChangeArrowheads="1"/>
+              </p:cNvPicPr>
+              <p:nvPr/>
+            </p:nvPicPr>
+            <p:blipFill rotWithShape="1">
+              <a:blip r:embed="rId3">
+                <a:extLst>
+                  <a:ext uri="{28A0092B-C50C-407E-A947-70E740481C1C}">
+                    <a14:useLocalDpi xmlns:a14="http://schemas.microsoft.com/office/drawing/2010/main" val="0"/>
+                  </a:ext>
+                </a:extLst>
+              </a:blip>
+              <a:srcRect t="2935" r="12764"/>
+              <a:stretch/>
+            </p:blipFill>
+            <p:spPr bwMode="auto">
+              <a:xfrm>
+                <a:off x="3780727" y="4274820"/>
+                <a:ext cx="1836302" cy="2673180"/>
+              </a:xfrm>
+              <a:prstGeom prst="rect">
+                <a:avLst/>
+              </a:prstGeom>
+              <a:noFill/>
+              <a:ln>
+                <a:noFill/>
+              </a:ln>
+              <a:extLst>
+                <a:ext uri="{909E8E84-426E-40DD-AFC4-6F175D3DCCD1}">
+                  <a14:hiddenFill xmlns:a14="http://schemas.microsoft.com/office/drawing/2010/main">
+                    <a:solidFill>
+                      <a:schemeClr val="accent1"/>
+                    </a:solidFill>
+                  </a14:hiddenFill>
+                </a:ext>
+                <a:ext uri="{91240B29-F687-4F45-9708-019B960494DF}">
+                  <a14:hiddenLine xmlns:a14="http://schemas.microsoft.com/office/drawing/2010/main" w="9525">
+                    <a:solidFill>
+                      <a:schemeClr val="tx1"/>
+                    </a:solidFill>
+                    <a:miter lim="800000"/>
+                    <a:headEnd/>
+                    <a:tailEnd/>
+                  </a14:hiddenLine>
+                </a:ext>
+              </a:extLst>
+            </p:spPr>
+          </p:pic>
+          <p:pic>
+            <p:nvPicPr>
+              <p:cNvPr id="74" name="Picture 16"/>
+              <p:cNvPicPr>
+                <a:picLocks noChangeAspect="1" noChangeArrowheads="1"/>
+              </p:cNvPicPr>
+              <p:nvPr/>
+            </p:nvPicPr>
+            <p:blipFill rotWithShape="1">
+              <a:blip r:embed="rId4">
+                <a:extLst>
+                  <a:ext uri="{28A0092B-C50C-407E-A947-70E740481C1C}">
+                    <a14:useLocalDpi xmlns:a14="http://schemas.microsoft.com/office/drawing/2010/main" val="0"/>
+                  </a:ext>
+                </a:extLst>
+              </a:blip>
+              <a:srcRect r="12772" b="19074"/>
+              <a:stretch/>
+            </p:blipFill>
+            <p:spPr bwMode="auto">
+              <a:xfrm>
+                <a:off x="3780000" y="-126000"/>
+                <a:ext cx="1837029" cy="2246630"/>
+              </a:xfrm>
+              <a:prstGeom prst="rect">
+                <a:avLst/>
+              </a:prstGeom>
+              <a:noFill/>
+              <a:ln>
+                <a:noFill/>
+              </a:ln>
+              <a:extLst>
+                <a:ext uri="{909E8E84-426E-40DD-AFC4-6F175D3DCCD1}">
+                  <a14:hiddenFill xmlns:a14="http://schemas.microsoft.com/office/drawing/2010/main">
+                    <a:solidFill>
+                      <a:schemeClr val="accent1"/>
+                    </a:solidFill>
+                  </a14:hiddenFill>
+                </a:ext>
+                <a:ext uri="{91240B29-F687-4F45-9708-019B960494DF}">
+                  <a14:hiddenLine xmlns:a14="http://schemas.microsoft.com/office/drawing/2010/main" w="9525">
+                    <a:solidFill>
+                      <a:schemeClr val="tx1"/>
+                    </a:solidFill>
+                    <a:miter lim="800000"/>
+                    <a:headEnd/>
+                    <a:tailEnd/>
+                  </a14:hiddenLine>
+                </a:ext>
+              </a:extLst>
+            </p:spPr>
+          </p:pic>
+        </p:grpSp>
+        <p:grpSp>
+          <p:nvGrpSpPr>
+            <p:cNvPr id="75" name="Groupe 74"/>
+            <p:cNvGrpSpPr/>
+            <p:nvPr/>
+          </p:nvGrpSpPr>
+          <p:grpSpPr>
             <a:xfrm>
-              <a:off x="3779912" y="2156457"/>
-              <a:ext cx="1837117" cy="2118363"/>
+              <a:off x="18232" y="-129600"/>
+              <a:ext cx="3844095" cy="7077075"/>
+              <a:chOff x="-115200" y="-129600"/>
+              <a:chExt cx="3844095" cy="7077075"/>
+            </a:xfrm>
+          </p:grpSpPr>
+          <p:pic>
+            <p:nvPicPr>
+              <p:cNvPr id="76" name="Picture 5"/>
+              <p:cNvPicPr>
+                <a:picLocks noChangeAspect="1" noChangeArrowheads="1"/>
+              </p:cNvPicPr>
+              <p:nvPr/>
+            </p:nvPicPr>
+            <p:blipFill rotWithShape="1">
+              <a:blip r:embed="rId5">
+                <a:extLst>
+                  <a:ext uri="{28A0092B-C50C-407E-A947-70E740481C1C}">
+                    <a14:useLocalDpi xmlns:a14="http://schemas.microsoft.com/office/drawing/2010/main" val="0"/>
+                  </a:ext>
+                </a:extLst>
+              </a:blip>
+              <a:srcRect r="8312"/>
+              <a:stretch/>
+            </p:blipFill>
+            <p:spPr bwMode="auto">
+              <a:xfrm>
+                <a:off x="-115200" y="-129600"/>
+                <a:ext cx="3844095" cy="7077075"/>
+              </a:xfrm>
+              <a:prstGeom prst="rect">
+                <a:avLst/>
+              </a:prstGeom>
+              <a:noFill/>
+              <a:ln>
+                <a:noFill/>
+              </a:ln>
+              <a:extLst>
+                <a:ext uri="{909E8E84-426E-40DD-AFC4-6F175D3DCCD1}">
+                  <a14:hiddenFill xmlns:a14="http://schemas.microsoft.com/office/drawing/2010/main">
+                    <a:solidFill>
+                      <a:schemeClr val="accent1"/>
+                    </a:solidFill>
+                  </a14:hiddenFill>
+                </a:ext>
+                <a:ext uri="{91240B29-F687-4F45-9708-019B960494DF}">
+                  <a14:hiddenLine xmlns:a14="http://schemas.microsoft.com/office/drawing/2010/main" w="9525">
+                    <a:solidFill>
+                      <a:schemeClr val="tx1"/>
+                    </a:solidFill>
+                    <a:miter lim="800000"/>
+                    <a:headEnd/>
+                    <a:tailEnd/>
+                  </a14:hiddenLine>
+                </a:ext>
+              </a:extLst>
+            </p:spPr>
+          </p:pic>
+          <p:sp>
+            <p:nvSpPr>
+              <p:cNvPr id="77" name="Rectangle 76"/>
+              <p:cNvSpPr/>
+              <p:nvPr/>
+            </p:nvSpPr>
+            <p:spPr>
+              <a:xfrm>
+                <a:off x="211592" y="233884"/>
+                <a:ext cx="72008" cy="144016"/>
+              </a:xfrm>
+              <a:prstGeom prst="rect">
+                <a:avLst/>
+              </a:prstGeom>
+              <a:solidFill>
+                <a:schemeClr val="bg1"/>
+              </a:solidFill>
+              <a:ln>
+                <a:solidFill>
+                  <a:schemeClr val="bg1"/>
+                </a:solidFill>
+              </a:ln>
+            </p:spPr>
+            <p:style>
+              <a:lnRef idx="2">
+                <a:schemeClr val="accent1">
+                  <a:shade val="50000"/>
+                </a:schemeClr>
+              </a:lnRef>
+              <a:fillRef idx="1">
+                <a:schemeClr val="accent1"/>
+              </a:fillRef>
+              <a:effectRef idx="0">
+                <a:schemeClr val="accent1"/>
+              </a:effectRef>
+              <a:fontRef idx="minor">
+                <a:schemeClr val="lt1"/>
+              </a:fontRef>
+            </p:style>
+            <p:txBody>
+              <a:bodyPr rtlCol="0" anchor="ctr"/>
+              <a:lstStyle/>
+              <a:p>
+                <a:pPr algn="ctr"/>
+                <a:endParaRPr lang="fr-FR"/>
+              </a:p>
+            </p:txBody>
+          </p:sp>
+          <p:sp>
+            <p:nvSpPr>
+              <p:cNvPr id="78" name="Rectangle 77"/>
+              <p:cNvSpPr/>
+              <p:nvPr/>
+            </p:nvSpPr>
+            <p:spPr>
+              <a:xfrm>
+                <a:off x="308792" y="1702800"/>
+                <a:ext cx="72008" cy="144016"/>
+              </a:xfrm>
+              <a:prstGeom prst="rect">
+                <a:avLst/>
+              </a:prstGeom>
+              <a:solidFill>
+                <a:schemeClr val="bg1"/>
+              </a:solidFill>
+              <a:ln>
+                <a:solidFill>
+                  <a:schemeClr val="bg1"/>
+                </a:solidFill>
+              </a:ln>
+            </p:spPr>
+            <p:style>
+              <a:lnRef idx="2">
+                <a:schemeClr val="accent1">
+                  <a:shade val="50000"/>
+                </a:schemeClr>
+              </a:lnRef>
+              <a:fillRef idx="1">
+                <a:schemeClr val="accent1"/>
+              </a:fillRef>
+              <a:effectRef idx="0">
+                <a:schemeClr val="accent1"/>
+              </a:effectRef>
+              <a:fontRef idx="minor">
+                <a:schemeClr val="lt1"/>
+              </a:fontRef>
+            </p:style>
+            <p:txBody>
+              <a:bodyPr rtlCol="0" anchor="ctr"/>
+              <a:lstStyle/>
+              <a:p>
+                <a:pPr algn="ctr"/>
+                <a:endParaRPr lang="fr-FR"/>
+              </a:p>
+            </p:txBody>
+          </p:sp>
+        </p:grpSp>
+        <p:sp>
+          <p:nvSpPr>
+            <p:cNvPr id="79" name="ZoneTexte 78"/>
+            <p:cNvSpPr txBox="1"/>
+            <p:nvPr/>
+          </p:nvSpPr>
+          <p:spPr>
+            <a:xfrm>
+              <a:off x="-35743" y="-126156"/>
+              <a:ext cx="526106" cy="461665"/>
             </a:xfrm>
             <a:prstGeom prst="rect">
               <a:avLst/>
             </a:prstGeom>
             <a:noFill/>
-            <a:ln>
-              <a:noFill/>
-            </a:ln>
-            <a:extLst>
-              <a:ext uri="{909E8E84-426E-40DD-AFC4-6F175D3DCCD1}">
-                <a14:hiddenFill xmlns:a14="http://schemas.microsoft.com/office/drawing/2010/main">
-                  <a:solidFill>
-                    <a:schemeClr val="accent1"/>
-                  </a:solidFill>
-                </a14:hiddenFill>
-              </a:ext>
-              <a:ext uri="{91240B29-F687-4F45-9708-019B960494DF}">
-                <a14:hiddenLine xmlns:a14="http://schemas.microsoft.com/office/drawing/2010/main" w="9525">
-                  <a:solidFill>
-                    <a:schemeClr val="tx1"/>
-                  </a:solidFill>
-                  <a:miter lim="800000"/>
-                  <a:headEnd/>
-                  <a:tailEnd/>
-                </a14:hiddenLine>
-              </a:ext>
-            </a:extLst>
           </p:spPr>
-        </p:pic>
-        <p:pic>
-          <p:nvPicPr>
-            <p:cNvPr id="73" name="Picture 9"/>
-            <p:cNvPicPr>
-              <a:picLocks noChangeAspect="1" noChangeArrowheads="1"/>
-            </p:cNvPicPr>
+          <p:txBody>
+            <a:bodyPr wrap="none" rtlCol="0">
+              <a:spAutoFit/>
+            </a:bodyPr>
+            <a:lstStyle/>
+            <a:p>
+              <a:r>
+                <a:rPr lang="fr-FR" sz="2400" dirty="0" smtClean="0">
+                  <a:latin typeface="Times New Roman" panose="02020603050405020304" pitchFamily="18" charset="0"/>
+                  <a:cs typeface="Times New Roman" panose="02020603050405020304" pitchFamily="18" charset="0"/>
+                </a:rPr>
+                <a:t>(a)</a:t>
+              </a:r>
+              <a:endParaRPr lang="fr-FR" sz="2400" dirty="0">
+                <a:latin typeface="Times New Roman" panose="02020603050405020304" pitchFamily="18" charset="0"/>
+                <a:cs typeface="Times New Roman" panose="02020603050405020304" pitchFamily="18" charset="0"/>
+              </a:endParaRPr>
+            </a:p>
+          </p:txBody>
+        </p:sp>
+        <p:sp>
+          <p:nvSpPr>
+            <p:cNvPr id="80" name="ZoneTexte 79"/>
+            <p:cNvSpPr txBox="1"/>
             <p:nvPr/>
-          </p:nvPicPr>
-          <p:blipFill rotWithShape="1">
-            <a:blip r:embed="rId3">
-              <a:extLst>
-                <a:ext uri="{28A0092B-C50C-407E-A947-70E740481C1C}">
-                  <a14:useLocalDpi xmlns:a14="http://schemas.microsoft.com/office/drawing/2010/main" val="0"/>
-                </a:ext>
-              </a:extLst>
-            </a:blip>
-            <a:srcRect t="2935" r="12764"/>
-            <a:stretch/>
-          </p:blipFill>
-          <p:spPr bwMode="auto">
+          </p:nvSpPr>
+          <p:spPr>
             <a:xfrm>
-              <a:off x="3780727" y="4274820"/>
-              <a:ext cx="1836302" cy="2673180"/>
+              <a:off x="738312" y="255950"/>
+              <a:ext cx="628698" cy="553998"/>
             </a:xfrm>
             <a:prstGeom prst="rect">
               <a:avLst/>
             </a:prstGeom>
             <a:noFill/>
-            <a:ln>
-              <a:noFill/>
-            </a:ln>
-            <a:extLst>
-              <a:ext uri="{909E8E84-426E-40DD-AFC4-6F175D3DCCD1}">
-                <a14:hiddenFill xmlns:a14="http://schemas.microsoft.com/office/drawing/2010/main">
+          </p:spPr>
+          <p:txBody>
+            <a:bodyPr wrap="none" rtlCol="0">
+              <a:spAutoFit/>
+            </a:bodyPr>
+            <a:lstStyle/>
+            <a:p>
+              <a:r>
+                <a:rPr lang="fr-FR" sz="3000" dirty="0" smtClean="0">
                   <a:solidFill>
-                    <a:schemeClr val="accent1"/>
+                    <a:srgbClr val="FF0000"/>
                   </a:solidFill>
-                </a14:hiddenFill>
-              </a:ext>
-              <a:ext uri="{91240B29-F687-4F45-9708-019B960494DF}">
-                <a14:hiddenLine xmlns:a14="http://schemas.microsoft.com/office/drawing/2010/main" w="9525">
-                  <a:solidFill>
-                    <a:schemeClr val="tx1"/>
-                  </a:solidFill>
-                  <a:miter lim="800000"/>
-                  <a:headEnd/>
-                  <a:tailEnd/>
-                </a14:hiddenLine>
-              </a:ext>
-            </a:extLst>
-          </p:spPr>
-        </p:pic>
-        <p:pic>
-          <p:nvPicPr>
-            <p:cNvPr id="74" name="Picture 16"/>
-            <p:cNvPicPr>
-              <a:picLocks noChangeAspect="1" noChangeArrowheads="1"/>
-            </p:cNvPicPr>
+                  <a:latin typeface="Symbol" panose="05050102010706020507" pitchFamily="18" charset="2"/>
+                </a:rPr>
+                <a:t>s-</a:t>
+              </a:r>
+              <a:endParaRPr lang="fr-FR" sz="3000" dirty="0">
+                <a:solidFill>
+                  <a:srgbClr val="FF0000"/>
+                </a:solidFill>
+                <a:latin typeface="Symbol" panose="05050102010706020507" pitchFamily="18" charset="2"/>
+              </a:endParaRPr>
+            </a:p>
+          </p:txBody>
+        </p:sp>
+        <p:sp>
+          <p:nvSpPr>
+            <p:cNvPr id="81" name="ZoneTexte 80"/>
+            <p:cNvSpPr txBox="1"/>
             <p:nvPr/>
-          </p:nvPicPr>
-          <p:blipFill rotWithShape="1">
-            <a:blip r:embed="rId4">
-              <a:extLst>
-                <a:ext uri="{28A0092B-C50C-407E-A947-70E740481C1C}">
-                  <a14:useLocalDpi xmlns:a14="http://schemas.microsoft.com/office/drawing/2010/main" val="0"/>
-                </a:ext>
-              </a:extLst>
-            </a:blip>
-            <a:srcRect r="12772" b="19074"/>
-            <a:stretch/>
-          </p:blipFill>
-          <p:spPr bwMode="auto">
+          </p:nvSpPr>
+          <p:spPr>
             <a:xfrm>
-              <a:off x="3780000" y="-126000"/>
-              <a:ext cx="1837029" cy="2246630"/>
+              <a:off x="3866981" y="-126156"/>
+              <a:ext cx="543739" cy="461665"/>
             </a:xfrm>
             <a:prstGeom prst="rect">
               <a:avLst/>
             </a:prstGeom>
             <a:noFill/>
-            <a:ln>
-              <a:noFill/>
-            </a:ln>
-            <a:extLst>
-              <a:ext uri="{909E8E84-426E-40DD-AFC4-6F175D3DCCD1}">
-                <a14:hiddenFill xmlns:a14="http://schemas.microsoft.com/office/drawing/2010/main">
-                  <a:solidFill>
-                    <a:schemeClr val="accent1"/>
-                  </a:solidFill>
-                </a14:hiddenFill>
-              </a:ext>
-              <a:ext uri="{91240B29-F687-4F45-9708-019B960494DF}">
-                <a14:hiddenLine xmlns:a14="http://schemas.microsoft.com/office/drawing/2010/main" w="9525">
-                  <a:solidFill>
-                    <a:schemeClr val="tx1"/>
-                  </a:solidFill>
-                  <a:miter lim="800000"/>
-                  <a:headEnd/>
-                  <a:tailEnd/>
-                </a14:hiddenLine>
-              </a:ext>
-            </a:extLst>
           </p:spPr>
-        </p:pic>
-      </p:grpSp>
-      <p:grpSp>
-        <p:nvGrpSpPr>
-          <p:cNvPr id="75" name="Groupe 74"/>
-          <p:cNvGrpSpPr/>
-          <p:nvPr/>
-        </p:nvGrpSpPr>
-        <p:grpSpPr>
-          <a:xfrm>
-            <a:off x="-71809" y="-129600"/>
-            <a:ext cx="3844095" cy="7077075"/>
-            <a:chOff x="-115200" y="-129600"/>
-            <a:chExt cx="3844095" cy="7077075"/>
-          </a:xfrm>
-        </p:grpSpPr>
-        <p:pic>
-          <p:nvPicPr>
-            <p:cNvPr id="76" name="Picture 5"/>
-            <p:cNvPicPr>
-              <a:picLocks noChangeAspect="1" noChangeArrowheads="1"/>
-            </p:cNvPicPr>
+          <p:txBody>
+            <a:bodyPr wrap="none" rtlCol="0">
+              <a:spAutoFit/>
+            </a:bodyPr>
+            <a:lstStyle/>
+            <a:p>
+              <a:r>
+                <a:rPr lang="fr-FR" sz="2400" dirty="0" smtClean="0">
+                  <a:latin typeface="Times New Roman" panose="02020603050405020304" pitchFamily="18" charset="0"/>
+                  <a:cs typeface="Times New Roman" panose="02020603050405020304" pitchFamily="18" charset="0"/>
+                </a:rPr>
+                <a:t>(b)</a:t>
+              </a:r>
+              <a:endParaRPr lang="fr-FR" sz="2400" dirty="0">
+                <a:latin typeface="Times New Roman" panose="02020603050405020304" pitchFamily="18" charset="0"/>
+                <a:cs typeface="Times New Roman" panose="02020603050405020304" pitchFamily="18" charset="0"/>
+              </a:endParaRPr>
+            </a:p>
+          </p:txBody>
+        </p:sp>
+        <p:sp>
+          <p:nvSpPr>
+            <p:cNvPr id="82" name="ZoneTexte 81"/>
+            <p:cNvSpPr txBox="1"/>
             <p:nvPr/>
-          </p:nvPicPr>
-          <p:blipFill rotWithShape="1">
-            <a:blip r:embed="rId5">
-              <a:extLst>
-                <a:ext uri="{28A0092B-C50C-407E-A947-70E740481C1C}">
-                  <a14:useLocalDpi xmlns:a14="http://schemas.microsoft.com/office/drawing/2010/main" val="0"/>
-                </a:ext>
-              </a:extLst>
-            </a:blip>
-            <a:srcRect r="8312"/>
-            <a:stretch/>
-          </p:blipFill>
-          <p:spPr bwMode="auto">
+          </p:nvSpPr>
+          <p:spPr>
             <a:xfrm>
-              <a:off x="-115200" y="-129600"/>
-              <a:ext cx="3844095" cy="7077075"/>
+              <a:off x="738312" y="5800566"/>
+              <a:ext cx="628698" cy="553998"/>
             </a:xfrm>
             <a:prstGeom prst="rect">
               <a:avLst/>
             </a:prstGeom>
             <a:noFill/>
-            <a:ln>
-              <a:noFill/>
-            </a:ln>
-            <a:extLst>
-              <a:ext uri="{909E8E84-426E-40DD-AFC4-6F175D3DCCD1}">
-                <a14:hiddenFill xmlns:a14="http://schemas.microsoft.com/office/drawing/2010/main">
+          </p:spPr>
+          <p:txBody>
+            <a:bodyPr wrap="none" rtlCol="0">
+              <a:spAutoFit/>
+            </a:bodyPr>
+            <a:lstStyle/>
+            <a:p>
+              <a:r>
+                <a:rPr lang="fr-FR" sz="3000" dirty="0" smtClean="0">
                   <a:solidFill>
-                    <a:schemeClr val="accent1"/>
+                    <a:srgbClr val="FF0000"/>
                   </a:solidFill>
-                </a14:hiddenFill>
-              </a:ext>
-              <a:ext uri="{91240B29-F687-4F45-9708-019B960494DF}">
-                <a14:hiddenLine xmlns:a14="http://schemas.microsoft.com/office/drawing/2010/main" w="9525">
-                  <a:solidFill>
-                    <a:schemeClr val="tx1"/>
-                  </a:solidFill>
-                  <a:miter lim="800000"/>
-                  <a:headEnd/>
-                  <a:tailEnd/>
-                </a14:hiddenLine>
-              </a:ext>
-            </a:extLst>
-          </p:spPr>
-        </p:pic>
+                  <a:latin typeface="Symbol" panose="05050102010706020507" pitchFamily="18" charset="2"/>
+                </a:rPr>
+                <a:t>s+</a:t>
+              </a:r>
+              <a:endParaRPr lang="fr-FR" sz="3000" dirty="0">
+                <a:solidFill>
+                  <a:srgbClr val="FF0000"/>
+                </a:solidFill>
+                <a:latin typeface="Symbol" panose="05050102010706020507" pitchFamily="18" charset="2"/>
+              </a:endParaRPr>
+            </a:p>
+          </p:txBody>
+        </p:sp>
         <p:sp>
           <p:nvSpPr>
-            <p:cNvPr id="77" name="Rectangle 76"/>
+            <p:cNvPr id="14" name="CustomShape 2"/>
             <p:cNvSpPr/>
             <p:nvPr/>
           </p:nvSpPr>
           <p:spPr>
             <a:xfrm>
-              <a:off x="211592" y="233884"/>
-              <a:ext cx="72008" cy="144016"/>
+              <a:off x="1404417" y="2309241"/>
+              <a:ext cx="757487" cy="588939"/>
+            </a:xfrm>
+            <a:prstGeom prst="ellipse">
+              <a:avLst/>
+            </a:prstGeom>
+            <a:noFill/>
+            <a:ln w="19080">
+              <a:solidFill>
+                <a:srgbClr val="FF0000"/>
+              </a:solidFill>
+              <a:prstDash val="dash"/>
+              <a:round/>
+            </a:ln>
+          </p:spPr>
+        </p:sp>
+        <p:sp>
+          <p:nvSpPr>
+            <p:cNvPr id="15" name="ZoneTexte 14"/>
+            <p:cNvSpPr txBox="1"/>
+            <p:nvPr/>
+          </p:nvSpPr>
+          <p:spPr>
+            <a:xfrm>
+              <a:off x="950447" y="2528848"/>
+              <a:ext cx="453970" cy="369332"/>
+            </a:xfrm>
+            <a:prstGeom prst="rect">
+              <a:avLst/>
+            </a:prstGeom>
+            <a:noFill/>
+          </p:spPr>
+          <p:txBody>
+            <a:bodyPr wrap="none" rtlCol="0">
+              <a:spAutoFit/>
+            </a:bodyPr>
+            <a:lstStyle/>
+            <a:p>
+              <a:r>
+                <a:rPr lang="fr-FR" dirty="0" smtClean="0">
+                  <a:solidFill>
+                    <a:srgbClr val="FF0000"/>
+                  </a:solidFill>
+                  <a:latin typeface="Symbol" panose="05050102010706020507" pitchFamily="18" charset="2"/>
+                </a:rPr>
+                <a:t>(4)</a:t>
+              </a:r>
+              <a:endParaRPr lang="fr-FR" dirty="0">
+                <a:solidFill>
+                  <a:srgbClr val="FF0000"/>
+                </a:solidFill>
+                <a:latin typeface="Symbol" panose="05050102010706020507" pitchFamily="18" charset="2"/>
+              </a:endParaRPr>
+            </a:p>
+          </p:txBody>
+        </p:sp>
+        <p:sp>
+          <p:nvSpPr>
+            <p:cNvPr id="16" name="CustomShape 2"/>
+            <p:cNvSpPr/>
+            <p:nvPr/>
+          </p:nvSpPr>
+          <p:spPr>
+            <a:xfrm>
+              <a:off x="2161904" y="1350819"/>
+              <a:ext cx="538657" cy="539249"/>
+            </a:xfrm>
+            <a:prstGeom prst="ellipse">
+              <a:avLst/>
+            </a:prstGeom>
+            <a:noFill/>
+            <a:ln w="19080">
+              <a:solidFill>
+                <a:srgbClr val="FF0000"/>
+              </a:solidFill>
+              <a:prstDash val="dash"/>
+              <a:round/>
+            </a:ln>
+          </p:spPr>
+        </p:sp>
+        <p:sp>
+          <p:nvSpPr>
+            <p:cNvPr id="17" name="ZoneTexte 16"/>
+            <p:cNvSpPr txBox="1"/>
+            <p:nvPr/>
+          </p:nvSpPr>
+          <p:spPr>
+            <a:xfrm>
+              <a:off x="2700561" y="1530028"/>
+              <a:ext cx="453970" cy="369332"/>
+            </a:xfrm>
+            <a:prstGeom prst="rect">
+              <a:avLst/>
+            </a:prstGeom>
+            <a:noFill/>
+          </p:spPr>
+          <p:txBody>
+            <a:bodyPr wrap="none" rtlCol="0">
+              <a:spAutoFit/>
+            </a:bodyPr>
+            <a:lstStyle/>
+            <a:p>
+              <a:r>
+                <a:rPr lang="fr-FR" dirty="0" smtClean="0">
+                  <a:solidFill>
+                    <a:srgbClr val="FF0000"/>
+                  </a:solidFill>
+                  <a:latin typeface="Symbol" panose="05050102010706020507" pitchFamily="18" charset="2"/>
+                </a:rPr>
+                <a:t>(2)</a:t>
+              </a:r>
+              <a:endParaRPr lang="fr-FR" dirty="0">
+                <a:solidFill>
+                  <a:srgbClr val="FF0000"/>
+                </a:solidFill>
+                <a:latin typeface="Symbol" panose="05050102010706020507" pitchFamily="18" charset="2"/>
+              </a:endParaRPr>
+            </a:p>
+          </p:txBody>
+        </p:sp>
+        <p:sp>
+          <p:nvSpPr>
+            <p:cNvPr id="18" name="CustomShape 2"/>
+            <p:cNvSpPr/>
+            <p:nvPr/>
+          </p:nvSpPr>
+          <p:spPr>
+            <a:xfrm>
+              <a:off x="2089896" y="2946013"/>
+              <a:ext cx="538657" cy="539249"/>
+            </a:xfrm>
+            <a:prstGeom prst="ellipse">
+              <a:avLst/>
+            </a:prstGeom>
+            <a:noFill/>
+            <a:ln w="19080">
+              <a:solidFill>
+                <a:srgbClr val="FF0000"/>
+              </a:solidFill>
+              <a:prstDash val="dash"/>
+              <a:round/>
+            </a:ln>
+          </p:spPr>
+        </p:sp>
+        <p:sp>
+          <p:nvSpPr>
+            <p:cNvPr id="19" name="ZoneTexte 18"/>
+            <p:cNvSpPr txBox="1"/>
+            <p:nvPr/>
+          </p:nvSpPr>
+          <p:spPr>
+            <a:xfrm>
+              <a:off x="2799678" y="2842368"/>
+              <a:ext cx="453970" cy="369332"/>
+            </a:xfrm>
+            <a:prstGeom prst="rect">
+              <a:avLst/>
+            </a:prstGeom>
+            <a:noFill/>
+          </p:spPr>
+          <p:txBody>
+            <a:bodyPr wrap="none" rtlCol="0">
+              <a:spAutoFit/>
+            </a:bodyPr>
+            <a:lstStyle/>
+            <a:p>
+              <a:r>
+                <a:rPr lang="fr-FR" dirty="0" smtClean="0">
+                  <a:solidFill>
+                    <a:srgbClr val="FF0000"/>
+                  </a:solidFill>
+                  <a:latin typeface="Symbol" panose="05050102010706020507" pitchFamily="18" charset="2"/>
+                </a:rPr>
+                <a:t>(1)</a:t>
+              </a:r>
+              <a:endParaRPr lang="fr-FR" dirty="0">
+                <a:solidFill>
+                  <a:srgbClr val="FF0000"/>
+                </a:solidFill>
+                <a:latin typeface="Symbol" panose="05050102010706020507" pitchFamily="18" charset="2"/>
+              </a:endParaRPr>
+            </a:p>
+          </p:txBody>
+        </p:sp>
+        <p:sp>
+          <p:nvSpPr>
+            <p:cNvPr id="21" name="CustomShape 2"/>
+            <p:cNvSpPr/>
+            <p:nvPr/>
+          </p:nvSpPr>
+          <p:spPr>
+            <a:xfrm>
+              <a:off x="1476425" y="-211115"/>
+              <a:ext cx="538657" cy="539249"/>
+            </a:xfrm>
+            <a:prstGeom prst="ellipse">
+              <a:avLst/>
+            </a:prstGeom>
+            <a:noFill/>
+            <a:ln w="19080">
+              <a:solidFill>
+                <a:srgbClr val="FF0000"/>
+              </a:solidFill>
+              <a:prstDash val="dash"/>
+              <a:round/>
+            </a:ln>
+          </p:spPr>
+        </p:sp>
+        <p:sp>
+          <p:nvSpPr>
+            <p:cNvPr id="2" name="Rectangle 1"/>
+            <p:cNvSpPr/>
+            <p:nvPr/>
+          </p:nvSpPr>
+          <p:spPr>
+            <a:xfrm>
+              <a:off x="1404417" y="-270000"/>
+              <a:ext cx="792088" cy="306000"/>
             </a:xfrm>
             <a:prstGeom prst="rect">
               <a:avLst/>
@@ -3387,516 +3866,109 @@
         </p:sp>
         <p:sp>
           <p:nvSpPr>
-            <p:cNvPr id="78" name="Rectangle 77"/>
+            <p:cNvPr id="23" name="ZoneTexte 22"/>
+            <p:cNvSpPr txBox="1"/>
+            <p:nvPr/>
+          </p:nvSpPr>
+          <p:spPr>
+            <a:xfrm>
+              <a:off x="1044377" y="8568"/>
+              <a:ext cx="453970" cy="369332"/>
+            </a:xfrm>
+            <a:prstGeom prst="rect">
+              <a:avLst/>
+            </a:prstGeom>
+            <a:noFill/>
+          </p:spPr>
+          <p:txBody>
+            <a:bodyPr wrap="none" rtlCol="0">
+              <a:spAutoFit/>
+            </a:bodyPr>
+            <a:lstStyle/>
+            <a:p>
+              <a:r>
+                <a:rPr lang="fr-FR" dirty="0" smtClean="0">
+                  <a:solidFill>
+                    <a:srgbClr val="FF0000"/>
+                  </a:solidFill>
+                  <a:latin typeface="Symbol" panose="05050102010706020507" pitchFamily="18" charset="2"/>
+                </a:rPr>
+                <a:t>(6)</a:t>
+              </a:r>
+              <a:endParaRPr lang="fr-FR" dirty="0">
+                <a:solidFill>
+                  <a:srgbClr val="FF0000"/>
+                </a:solidFill>
+                <a:latin typeface="Symbol" panose="05050102010706020507" pitchFamily="18" charset="2"/>
+              </a:endParaRPr>
+            </a:p>
+          </p:txBody>
+        </p:sp>
+        <p:sp>
+          <p:nvSpPr>
+            <p:cNvPr id="24" name="CustomShape 2"/>
             <p:cNvSpPr/>
             <p:nvPr/>
           </p:nvSpPr>
           <p:spPr>
             <a:xfrm>
-              <a:off x="308792" y="1702800"/>
-              <a:ext cx="72008" cy="144016"/>
+              <a:off x="2124497" y="4519171"/>
+              <a:ext cx="538657" cy="539249"/>
+            </a:xfrm>
+            <a:prstGeom prst="ellipse">
+              <a:avLst/>
+            </a:prstGeom>
+            <a:noFill/>
+            <a:ln w="19080">
+              <a:solidFill>
+                <a:srgbClr val="FF0000"/>
+              </a:solidFill>
+              <a:prstDash val="dash"/>
+              <a:round/>
+            </a:ln>
+          </p:spPr>
+        </p:sp>
+        <p:sp>
+          <p:nvSpPr>
+            <p:cNvPr id="25" name="ZoneTexte 24"/>
+            <p:cNvSpPr txBox="1"/>
+            <p:nvPr/>
+          </p:nvSpPr>
+          <p:spPr>
+            <a:xfrm>
+              <a:off x="1620441" y="4554364"/>
+              <a:ext cx="453970" cy="369332"/>
             </a:xfrm>
             <a:prstGeom prst="rect">
               <a:avLst/>
             </a:prstGeom>
-            <a:solidFill>
-              <a:schemeClr val="bg1"/>
-            </a:solidFill>
-            <a:ln>
-              <a:solidFill>
-                <a:schemeClr val="bg1"/>
-              </a:solidFill>
-            </a:ln>
+            <a:noFill/>
           </p:spPr>
-          <p:style>
-            <a:lnRef idx="2">
-              <a:schemeClr val="accent1">
-                <a:shade val="50000"/>
-              </a:schemeClr>
-            </a:lnRef>
-            <a:fillRef idx="1">
-              <a:schemeClr val="accent1"/>
-            </a:fillRef>
-            <a:effectRef idx="0">
-              <a:schemeClr val="accent1"/>
-            </a:effectRef>
-            <a:fontRef idx="minor">
-              <a:schemeClr val="lt1"/>
-            </a:fontRef>
-          </p:style>
           <p:txBody>
-            <a:bodyPr rtlCol="0" anchor="ctr"/>
+            <a:bodyPr wrap="none" rtlCol="0">
+              <a:spAutoFit/>
+            </a:bodyPr>
             <a:lstStyle/>
             <a:p>
-              <a:pPr algn="ctr"/>
-              <a:endParaRPr lang="fr-FR"/>
+              <a:r>
+                <a:rPr lang="fr-FR" dirty="0" smtClean="0">
+                  <a:solidFill>
+                    <a:srgbClr val="FF0000"/>
+                  </a:solidFill>
+                  <a:latin typeface="Symbol" panose="05050102010706020507" pitchFamily="18" charset="2"/>
+                </a:rPr>
+                <a:t>(3)</a:t>
+              </a:r>
+              <a:endParaRPr lang="fr-FR" dirty="0">
+                <a:solidFill>
+                  <a:srgbClr val="FF0000"/>
+                </a:solidFill>
+                <a:latin typeface="Symbol" panose="05050102010706020507" pitchFamily="18" charset="2"/>
+              </a:endParaRPr>
             </a:p>
           </p:txBody>
         </p:sp>
       </p:grpSp>
-      <p:sp>
-        <p:nvSpPr>
-          <p:cNvPr id="79" name="ZoneTexte 78"/>
-          <p:cNvSpPr txBox="1"/>
-          <p:nvPr/>
-        </p:nvSpPr>
-        <p:spPr>
-          <a:xfrm>
-            <a:off x="-71809" y="-126156"/>
-            <a:ext cx="423514" cy="461665"/>
-          </a:xfrm>
-          <a:prstGeom prst="rect">
-            <a:avLst/>
-          </a:prstGeom>
-          <a:noFill/>
-        </p:spPr>
-        <p:txBody>
-          <a:bodyPr wrap="none" rtlCol="0">
-            <a:spAutoFit/>
-          </a:bodyPr>
-          <a:lstStyle/>
-          <a:p>
-            <a:r>
-              <a:rPr lang="fr-FR" sz="2400" dirty="0" smtClean="0">
-                <a:latin typeface="Times New Roman" panose="02020603050405020304" pitchFamily="18" charset="0"/>
-                <a:cs typeface="Times New Roman" panose="02020603050405020304" pitchFamily="18" charset="0"/>
-              </a:rPr>
-              <a:t>a)</a:t>
-            </a:r>
-            <a:endParaRPr lang="fr-FR" sz="2400" dirty="0">
-              <a:latin typeface="Times New Roman" panose="02020603050405020304" pitchFamily="18" charset="0"/>
-              <a:cs typeface="Times New Roman" panose="02020603050405020304" pitchFamily="18" charset="0"/>
-            </a:endParaRPr>
-          </a:p>
-        </p:txBody>
-      </p:sp>
-      <p:sp>
-        <p:nvSpPr>
-          <p:cNvPr id="80" name="ZoneTexte 79"/>
-          <p:cNvSpPr txBox="1"/>
-          <p:nvPr/>
-        </p:nvSpPr>
-        <p:spPr>
-          <a:xfrm>
-            <a:off x="648271" y="255950"/>
-            <a:ext cx="628698" cy="553998"/>
-          </a:xfrm>
-          <a:prstGeom prst="rect">
-            <a:avLst/>
-          </a:prstGeom>
-          <a:noFill/>
-        </p:spPr>
-        <p:txBody>
-          <a:bodyPr wrap="none" rtlCol="0">
-            <a:spAutoFit/>
-          </a:bodyPr>
-          <a:lstStyle/>
-          <a:p>
-            <a:r>
-              <a:rPr lang="fr-FR" sz="3000" dirty="0" smtClean="0">
-                <a:solidFill>
-                  <a:srgbClr val="FF0000"/>
-                </a:solidFill>
-                <a:latin typeface="Symbol" panose="05050102010706020507" pitchFamily="18" charset="2"/>
-              </a:rPr>
-              <a:t>s-</a:t>
-            </a:r>
-            <a:endParaRPr lang="fr-FR" sz="3000" dirty="0">
-              <a:solidFill>
-                <a:srgbClr val="FF0000"/>
-              </a:solidFill>
-              <a:latin typeface="Symbol" panose="05050102010706020507" pitchFamily="18" charset="2"/>
-            </a:endParaRPr>
-          </a:p>
-        </p:txBody>
-      </p:sp>
-      <p:sp>
-        <p:nvSpPr>
-          <p:cNvPr id="81" name="ZoneTexte 80"/>
-          <p:cNvSpPr txBox="1"/>
-          <p:nvPr/>
-        </p:nvSpPr>
-        <p:spPr>
-          <a:xfrm>
-            <a:off x="3825558" y="-126156"/>
-            <a:ext cx="441146" cy="461665"/>
-          </a:xfrm>
-          <a:prstGeom prst="rect">
-            <a:avLst/>
-          </a:prstGeom>
-          <a:noFill/>
-        </p:spPr>
-        <p:txBody>
-          <a:bodyPr wrap="none" rtlCol="0">
-            <a:spAutoFit/>
-          </a:bodyPr>
-          <a:lstStyle/>
-          <a:p>
-            <a:r>
-              <a:rPr lang="fr-FR" sz="2400" dirty="0">
-                <a:latin typeface="Times New Roman" panose="02020603050405020304" pitchFamily="18" charset="0"/>
-                <a:cs typeface="Times New Roman" panose="02020603050405020304" pitchFamily="18" charset="0"/>
-              </a:rPr>
-              <a:t>b</a:t>
-            </a:r>
-            <a:r>
-              <a:rPr lang="fr-FR" sz="2400" dirty="0" smtClean="0">
-                <a:latin typeface="Times New Roman" panose="02020603050405020304" pitchFamily="18" charset="0"/>
-                <a:cs typeface="Times New Roman" panose="02020603050405020304" pitchFamily="18" charset="0"/>
-              </a:rPr>
-              <a:t>)</a:t>
-            </a:r>
-            <a:endParaRPr lang="fr-FR" sz="2400" dirty="0">
-              <a:latin typeface="Times New Roman" panose="02020603050405020304" pitchFamily="18" charset="0"/>
-              <a:cs typeface="Times New Roman" panose="02020603050405020304" pitchFamily="18" charset="0"/>
-            </a:endParaRPr>
-          </a:p>
-        </p:txBody>
-      </p:sp>
-      <p:sp>
-        <p:nvSpPr>
-          <p:cNvPr id="82" name="ZoneTexte 81"/>
-          <p:cNvSpPr txBox="1"/>
-          <p:nvPr/>
-        </p:nvSpPr>
-        <p:spPr>
-          <a:xfrm>
-            <a:off x="648271" y="5800566"/>
-            <a:ext cx="628698" cy="553998"/>
-          </a:xfrm>
-          <a:prstGeom prst="rect">
-            <a:avLst/>
-          </a:prstGeom>
-          <a:noFill/>
-        </p:spPr>
-        <p:txBody>
-          <a:bodyPr wrap="none" rtlCol="0">
-            <a:spAutoFit/>
-          </a:bodyPr>
-          <a:lstStyle/>
-          <a:p>
-            <a:r>
-              <a:rPr lang="fr-FR" sz="3000" dirty="0" smtClean="0">
-                <a:solidFill>
-                  <a:srgbClr val="FF0000"/>
-                </a:solidFill>
-                <a:latin typeface="Symbol" panose="05050102010706020507" pitchFamily="18" charset="2"/>
-              </a:rPr>
-              <a:t>s+</a:t>
-            </a:r>
-            <a:endParaRPr lang="fr-FR" sz="3000" dirty="0">
-              <a:solidFill>
-                <a:srgbClr val="FF0000"/>
-              </a:solidFill>
-              <a:latin typeface="Symbol" panose="05050102010706020507" pitchFamily="18" charset="2"/>
-            </a:endParaRPr>
-          </a:p>
-        </p:txBody>
-      </p:sp>
-      <p:sp>
-        <p:nvSpPr>
-          <p:cNvPr id="14" name="CustomShape 2"/>
-          <p:cNvSpPr/>
-          <p:nvPr/>
-        </p:nvSpPr>
-        <p:spPr>
-          <a:xfrm>
-            <a:off x="1314376" y="2309241"/>
-            <a:ext cx="757487" cy="588939"/>
-          </a:xfrm>
-          <a:prstGeom prst="ellipse">
-            <a:avLst/>
-          </a:prstGeom>
-          <a:noFill/>
-          <a:ln w="19080">
-            <a:solidFill>
-              <a:srgbClr val="FF0000"/>
-            </a:solidFill>
-            <a:prstDash val="dash"/>
-            <a:round/>
-          </a:ln>
-        </p:spPr>
-      </p:sp>
-      <p:sp>
-        <p:nvSpPr>
-          <p:cNvPr id="15" name="ZoneTexte 14"/>
-          <p:cNvSpPr txBox="1"/>
-          <p:nvPr/>
-        </p:nvSpPr>
-        <p:spPr>
-          <a:xfrm>
-            <a:off x="860406" y="2528848"/>
-            <a:ext cx="453970" cy="369332"/>
-          </a:xfrm>
-          <a:prstGeom prst="rect">
-            <a:avLst/>
-          </a:prstGeom>
-          <a:noFill/>
-        </p:spPr>
-        <p:txBody>
-          <a:bodyPr wrap="none" rtlCol="0">
-            <a:spAutoFit/>
-          </a:bodyPr>
-          <a:lstStyle/>
-          <a:p>
-            <a:r>
-              <a:rPr lang="fr-FR" dirty="0" smtClean="0">
-                <a:solidFill>
-                  <a:srgbClr val="FF0000"/>
-                </a:solidFill>
-                <a:latin typeface="Symbol" panose="05050102010706020507" pitchFamily="18" charset="2"/>
-              </a:rPr>
-              <a:t>(4)</a:t>
-            </a:r>
-            <a:endParaRPr lang="fr-FR" dirty="0">
-              <a:solidFill>
-                <a:srgbClr val="FF0000"/>
-              </a:solidFill>
-              <a:latin typeface="Symbol" panose="05050102010706020507" pitchFamily="18" charset="2"/>
-            </a:endParaRPr>
-          </a:p>
-        </p:txBody>
-      </p:sp>
-      <p:sp>
-        <p:nvSpPr>
-          <p:cNvPr id="16" name="CustomShape 2"/>
-          <p:cNvSpPr/>
-          <p:nvPr/>
-        </p:nvSpPr>
-        <p:spPr>
-          <a:xfrm>
-            <a:off x="2071863" y="1350819"/>
-            <a:ext cx="538657" cy="539249"/>
-          </a:xfrm>
-          <a:prstGeom prst="ellipse">
-            <a:avLst/>
-          </a:prstGeom>
-          <a:noFill/>
-          <a:ln w="19080">
-            <a:solidFill>
-              <a:srgbClr val="FF0000"/>
-            </a:solidFill>
-            <a:prstDash val="dash"/>
-            <a:round/>
-          </a:ln>
-        </p:spPr>
-      </p:sp>
-      <p:sp>
-        <p:nvSpPr>
-          <p:cNvPr id="17" name="ZoneTexte 16"/>
-          <p:cNvSpPr txBox="1"/>
-          <p:nvPr/>
-        </p:nvSpPr>
-        <p:spPr>
-          <a:xfrm>
-            <a:off x="2610520" y="1530028"/>
-            <a:ext cx="453970" cy="369332"/>
-          </a:xfrm>
-          <a:prstGeom prst="rect">
-            <a:avLst/>
-          </a:prstGeom>
-          <a:noFill/>
-        </p:spPr>
-        <p:txBody>
-          <a:bodyPr wrap="none" rtlCol="0">
-            <a:spAutoFit/>
-          </a:bodyPr>
-          <a:lstStyle/>
-          <a:p>
-            <a:r>
-              <a:rPr lang="fr-FR" dirty="0" smtClean="0">
-                <a:solidFill>
-                  <a:srgbClr val="FF0000"/>
-                </a:solidFill>
-                <a:latin typeface="Symbol" panose="05050102010706020507" pitchFamily="18" charset="2"/>
-              </a:rPr>
-              <a:t>(2)</a:t>
-            </a:r>
-            <a:endParaRPr lang="fr-FR" dirty="0">
-              <a:solidFill>
-                <a:srgbClr val="FF0000"/>
-              </a:solidFill>
-              <a:latin typeface="Symbol" panose="05050102010706020507" pitchFamily="18" charset="2"/>
-            </a:endParaRPr>
-          </a:p>
-        </p:txBody>
-      </p:sp>
-      <p:sp>
-        <p:nvSpPr>
-          <p:cNvPr id="18" name="CustomShape 2"/>
-          <p:cNvSpPr/>
-          <p:nvPr/>
-        </p:nvSpPr>
-        <p:spPr>
-          <a:xfrm>
-            <a:off x="1999855" y="2946013"/>
-            <a:ext cx="538657" cy="539249"/>
-          </a:xfrm>
-          <a:prstGeom prst="ellipse">
-            <a:avLst/>
-          </a:prstGeom>
-          <a:noFill/>
-          <a:ln w="19080">
-            <a:solidFill>
-              <a:srgbClr val="FF0000"/>
-            </a:solidFill>
-            <a:prstDash val="dash"/>
-            <a:round/>
-          </a:ln>
-        </p:spPr>
-      </p:sp>
-      <p:sp>
-        <p:nvSpPr>
-          <p:cNvPr id="19" name="ZoneTexte 18"/>
-          <p:cNvSpPr txBox="1"/>
-          <p:nvPr/>
-        </p:nvSpPr>
-        <p:spPr>
-          <a:xfrm>
-            <a:off x="2709637" y="2842368"/>
-            <a:ext cx="453970" cy="369332"/>
-          </a:xfrm>
-          <a:prstGeom prst="rect">
-            <a:avLst/>
-          </a:prstGeom>
-          <a:noFill/>
-        </p:spPr>
-        <p:txBody>
-          <a:bodyPr wrap="none" rtlCol="0">
-            <a:spAutoFit/>
-          </a:bodyPr>
-          <a:lstStyle/>
-          <a:p>
-            <a:r>
-              <a:rPr lang="fr-FR" dirty="0" smtClean="0">
-                <a:solidFill>
-                  <a:srgbClr val="FF0000"/>
-                </a:solidFill>
-                <a:latin typeface="Symbol" panose="05050102010706020507" pitchFamily="18" charset="2"/>
-              </a:rPr>
-              <a:t>(1)</a:t>
-            </a:r>
-            <a:endParaRPr lang="fr-FR" dirty="0">
-              <a:solidFill>
-                <a:srgbClr val="FF0000"/>
-              </a:solidFill>
-              <a:latin typeface="Symbol" panose="05050102010706020507" pitchFamily="18" charset="2"/>
-            </a:endParaRPr>
-          </a:p>
-        </p:txBody>
-      </p:sp>
-      <p:sp>
-        <p:nvSpPr>
-          <p:cNvPr id="21" name="CustomShape 2"/>
-          <p:cNvSpPr/>
-          <p:nvPr/>
-        </p:nvSpPr>
-        <p:spPr>
-          <a:xfrm>
-            <a:off x="1386384" y="-211115"/>
-            <a:ext cx="538657" cy="539249"/>
-          </a:xfrm>
-          <a:prstGeom prst="ellipse">
-            <a:avLst/>
-          </a:prstGeom>
-          <a:noFill/>
-          <a:ln w="19080">
-            <a:solidFill>
-              <a:srgbClr val="FF0000"/>
-            </a:solidFill>
-            <a:prstDash val="dash"/>
-            <a:round/>
-          </a:ln>
-        </p:spPr>
-      </p:sp>
-      <p:sp>
-        <p:nvSpPr>
-          <p:cNvPr id="2" name="Rectangle 1"/>
-          <p:cNvSpPr/>
-          <p:nvPr/>
-        </p:nvSpPr>
-        <p:spPr>
-          <a:xfrm>
-            <a:off x="1314376" y="-270000"/>
-            <a:ext cx="792088" cy="306000"/>
-          </a:xfrm>
-          <a:prstGeom prst="rect">
-            <a:avLst/>
-          </a:prstGeom>
-          <a:solidFill>
-            <a:schemeClr val="bg1"/>
-          </a:solidFill>
-          <a:ln>
-            <a:solidFill>
-              <a:schemeClr val="bg1"/>
-            </a:solidFill>
-          </a:ln>
-        </p:spPr>
-        <p:style>
-          <a:lnRef idx="2">
-            <a:schemeClr val="accent1">
-              <a:shade val="50000"/>
-            </a:schemeClr>
-          </a:lnRef>
-          <a:fillRef idx="1">
-            <a:schemeClr val="accent1"/>
-          </a:fillRef>
-          <a:effectRef idx="0">
-            <a:schemeClr val="accent1"/>
-          </a:effectRef>
-          <a:fontRef idx="minor">
-            <a:schemeClr val="lt1"/>
-          </a:fontRef>
-        </p:style>
-        <p:txBody>
-          <a:bodyPr rtlCol="0" anchor="ctr"/>
-          <a:lstStyle/>
-          <a:p>
-            <a:pPr algn="ctr"/>
-            <a:endParaRPr lang="fr-FR"/>
-          </a:p>
-        </p:txBody>
-      </p:sp>
-      <p:sp>
-        <p:nvSpPr>
-          <p:cNvPr id="23" name="ZoneTexte 22"/>
-          <p:cNvSpPr txBox="1"/>
-          <p:nvPr/>
-        </p:nvSpPr>
-        <p:spPr>
-          <a:xfrm>
-            <a:off x="954336" y="8568"/>
-            <a:ext cx="453970" cy="369332"/>
-          </a:xfrm>
-          <a:prstGeom prst="rect">
-            <a:avLst/>
-          </a:prstGeom>
-          <a:noFill/>
-        </p:spPr>
-        <p:txBody>
-          <a:bodyPr wrap="none" rtlCol="0">
-            <a:spAutoFit/>
-          </a:bodyPr>
-          <a:lstStyle/>
-          <a:p>
-            <a:r>
-              <a:rPr lang="fr-FR" dirty="0" smtClean="0">
-                <a:solidFill>
-                  <a:srgbClr val="FF0000"/>
-                </a:solidFill>
-                <a:latin typeface="Symbol" panose="05050102010706020507" pitchFamily="18" charset="2"/>
-              </a:rPr>
-              <a:t>(6)</a:t>
-            </a:r>
-            <a:endParaRPr lang="fr-FR" dirty="0">
-              <a:solidFill>
-                <a:srgbClr val="FF0000"/>
-              </a:solidFill>
-              <a:latin typeface="Symbol" panose="05050102010706020507" pitchFamily="18" charset="2"/>
-            </a:endParaRPr>
-          </a:p>
-        </p:txBody>
-      </p:sp>
     </p:spTree>
     <p:extLst>
       <p:ext uri="{BB962C8B-B14F-4D97-AF65-F5344CB8AC3E}">

</xml_diff>

<commit_message>
Proofread of chap01 and 04 for alpha 2
</commit_message>
<xml_diff>
--- a/04-CrMagOpt/Pictures/Antiferro-Cr.pptx
+++ b/04-CrMagOpt/Pictures/Antiferro-Cr.pptx
@@ -288,7 +288,7 @@
           <a:p>
             <a:fld id="{A26ED350-09DA-47B2-96B1-414F1C332C84}" type="datetimeFigureOut">
               <a:rPr lang="fr-FR" smtClean="0"/>
-              <a:t>29/06/2017</a:t>
+              <a:t>20/07/2017</a:t>
             </a:fld>
             <a:endParaRPr lang="fr-FR"/>
           </a:p>
@@ -458,7 +458,7 @@
           <a:p>
             <a:fld id="{A26ED350-09DA-47B2-96B1-414F1C332C84}" type="datetimeFigureOut">
               <a:rPr lang="fr-FR" smtClean="0"/>
-              <a:t>29/06/2017</a:t>
+              <a:t>20/07/2017</a:t>
             </a:fld>
             <a:endParaRPr lang="fr-FR"/>
           </a:p>
@@ -638,7 +638,7 @@
           <a:p>
             <a:fld id="{A26ED350-09DA-47B2-96B1-414F1C332C84}" type="datetimeFigureOut">
               <a:rPr lang="fr-FR" smtClean="0"/>
-              <a:t>29/06/2017</a:t>
+              <a:t>20/07/2017</a:t>
             </a:fld>
             <a:endParaRPr lang="fr-FR"/>
           </a:p>
@@ -808,7 +808,7 @@
           <a:p>
             <a:fld id="{A26ED350-09DA-47B2-96B1-414F1C332C84}" type="datetimeFigureOut">
               <a:rPr lang="fr-FR" smtClean="0"/>
-              <a:t>29/06/2017</a:t>
+              <a:t>20/07/2017</a:t>
             </a:fld>
             <a:endParaRPr lang="fr-FR"/>
           </a:p>
@@ -1054,7 +1054,7 @@
           <a:p>
             <a:fld id="{A26ED350-09DA-47B2-96B1-414F1C332C84}" type="datetimeFigureOut">
               <a:rPr lang="fr-FR" smtClean="0"/>
-              <a:t>29/06/2017</a:t>
+              <a:t>20/07/2017</a:t>
             </a:fld>
             <a:endParaRPr lang="fr-FR"/>
           </a:p>
@@ -1342,7 +1342,7 @@
           <a:p>
             <a:fld id="{A26ED350-09DA-47B2-96B1-414F1C332C84}" type="datetimeFigureOut">
               <a:rPr lang="fr-FR" smtClean="0"/>
-              <a:t>29/06/2017</a:t>
+              <a:t>20/07/2017</a:t>
             </a:fld>
             <a:endParaRPr lang="fr-FR"/>
           </a:p>
@@ -1769,7 +1769,7 @@
           <a:p>
             <a:fld id="{A26ED350-09DA-47B2-96B1-414F1C332C84}" type="datetimeFigureOut">
               <a:rPr lang="fr-FR" smtClean="0"/>
-              <a:t>29/06/2017</a:t>
+              <a:t>20/07/2017</a:t>
             </a:fld>
             <a:endParaRPr lang="fr-FR"/>
           </a:p>
@@ -1887,7 +1887,7 @@
           <a:p>
             <a:fld id="{A26ED350-09DA-47B2-96B1-414F1C332C84}" type="datetimeFigureOut">
               <a:rPr lang="fr-FR" smtClean="0"/>
-              <a:t>29/06/2017</a:t>
+              <a:t>20/07/2017</a:t>
             </a:fld>
             <a:endParaRPr lang="fr-FR"/>
           </a:p>
@@ -1982,7 +1982,7 @@
           <a:p>
             <a:fld id="{A26ED350-09DA-47B2-96B1-414F1C332C84}" type="datetimeFigureOut">
               <a:rPr lang="fr-FR" smtClean="0"/>
-              <a:t>29/06/2017</a:t>
+              <a:t>20/07/2017</a:t>
             </a:fld>
             <a:endParaRPr lang="fr-FR"/>
           </a:p>
@@ -2259,7 +2259,7 @@
           <a:p>
             <a:fld id="{A26ED350-09DA-47B2-96B1-414F1C332C84}" type="datetimeFigureOut">
               <a:rPr lang="fr-FR" smtClean="0"/>
-              <a:t>29/06/2017</a:t>
+              <a:t>20/07/2017</a:t>
             </a:fld>
             <a:endParaRPr lang="fr-FR"/>
           </a:p>
@@ -2512,7 +2512,7 @@
           <a:p>
             <a:fld id="{A26ED350-09DA-47B2-96B1-414F1C332C84}" type="datetimeFigureOut">
               <a:rPr lang="fr-FR" smtClean="0"/>
-              <a:t>29/06/2017</a:t>
+              <a:t>20/07/2017</a:t>
             </a:fld>
             <a:endParaRPr lang="fr-FR"/>
           </a:p>
@@ -2725,7 +2725,7 @@
           <a:p>
             <a:fld id="{A26ED350-09DA-47B2-96B1-414F1C332C84}" type="datetimeFigureOut">
               <a:rPr lang="fr-FR" smtClean="0"/>
-              <a:t>29/06/2017</a:t>
+              <a:t>20/07/2017</a:t>
             </a:fld>
             <a:endParaRPr lang="fr-FR"/>
           </a:p>
@@ -3102,730 +3102,80 @@
       </p:grpSpPr>
       <p:grpSp>
         <p:nvGrpSpPr>
-          <p:cNvPr id="3" name="Groupe 2"/>
+          <p:cNvPr id="75" name="Groupe 74"/>
           <p:cNvGrpSpPr/>
           <p:nvPr/>
         </p:nvGrpSpPr>
         <p:grpSpPr>
           <a:xfrm>
-            <a:off x="-90000" y="-270000"/>
-            <a:ext cx="5742607" cy="7218000"/>
-            <a:chOff x="-35743" y="-270000"/>
-            <a:chExt cx="5742607" cy="7218000"/>
+            <a:off x="-36025" y="-129600"/>
+            <a:ext cx="3844095" cy="7077075"/>
+            <a:chOff x="-115200" y="-129600"/>
+            <a:chExt cx="3844095" cy="7077075"/>
           </a:xfrm>
         </p:grpSpPr>
-        <p:grpSp>
-          <p:nvGrpSpPr>
-            <p:cNvPr id="71" name="Groupe 70"/>
-            <p:cNvGrpSpPr/>
+        <p:pic>
+          <p:nvPicPr>
+            <p:cNvPr id="76" name="Picture 5"/>
+            <p:cNvPicPr>
+              <a:picLocks noChangeAspect="1" noChangeArrowheads="1"/>
+            </p:cNvPicPr>
             <p:nvPr/>
-          </p:nvGrpSpPr>
-          <p:grpSpPr>
-            <a:xfrm>
-              <a:off x="3869747" y="-126000"/>
-              <a:ext cx="1837117" cy="7074000"/>
-              <a:chOff x="3779912" y="-126000"/>
-              <a:chExt cx="1837117" cy="7074000"/>
-            </a:xfrm>
-          </p:grpSpPr>
-          <p:pic>
-            <p:nvPicPr>
-              <p:cNvPr id="72" name="Picture 15"/>
-              <p:cNvPicPr>
-                <a:picLocks noChangeAspect="1" noChangeArrowheads="1"/>
-              </p:cNvPicPr>
-              <p:nvPr/>
-            </p:nvPicPr>
-            <p:blipFill rotWithShape="1">
-              <a:blip r:embed="rId2">
-                <a:extLst>
-                  <a:ext uri="{28A0092B-C50C-407E-A947-70E740481C1C}">
-                    <a14:useLocalDpi xmlns:a14="http://schemas.microsoft.com/office/drawing/2010/main" val="0"/>
-                  </a:ext>
-                </a:extLst>
-              </a:blip>
-              <a:srcRect t="4704" r="12767" b="20137"/>
-              <a:stretch/>
-            </p:blipFill>
-            <p:spPr bwMode="auto">
-              <a:xfrm>
-                <a:off x="3779912" y="2156457"/>
-                <a:ext cx="1837117" cy="2118363"/>
-              </a:xfrm>
-              <a:prstGeom prst="rect">
-                <a:avLst/>
-              </a:prstGeom>
-              <a:noFill/>
-              <a:ln>
-                <a:noFill/>
-              </a:ln>
+          </p:nvPicPr>
+          <p:blipFill rotWithShape="1">
+            <a:blip r:embed="rId2">
               <a:extLst>
-                <a:ext uri="{909E8E84-426E-40DD-AFC4-6F175D3DCCD1}">
-                  <a14:hiddenFill xmlns:a14="http://schemas.microsoft.com/office/drawing/2010/main">
-                    <a:solidFill>
-                      <a:schemeClr val="accent1"/>
-                    </a:solidFill>
-                  </a14:hiddenFill>
-                </a:ext>
-                <a:ext uri="{91240B29-F687-4F45-9708-019B960494DF}">
-                  <a14:hiddenLine xmlns:a14="http://schemas.microsoft.com/office/drawing/2010/main" w="9525">
-                    <a:solidFill>
-                      <a:schemeClr val="tx1"/>
-                    </a:solidFill>
-                    <a:miter lim="800000"/>
-                    <a:headEnd/>
-                    <a:tailEnd/>
-                  </a14:hiddenLine>
+                <a:ext uri="{28A0092B-C50C-407E-A947-70E740481C1C}">
+                  <a14:useLocalDpi xmlns:a14="http://schemas.microsoft.com/office/drawing/2010/main" val="0"/>
                 </a:ext>
               </a:extLst>
-            </p:spPr>
-          </p:pic>
-          <p:pic>
-            <p:nvPicPr>
-              <p:cNvPr id="73" name="Picture 9"/>
-              <p:cNvPicPr>
-                <a:picLocks noChangeAspect="1" noChangeArrowheads="1"/>
-              </p:cNvPicPr>
-              <p:nvPr/>
-            </p:nvPicPr>
-            <p:blipFill rotWithShape="1">
-              <a:blip r:embed="rId3">
-                <a:extLst>
-                  <a:ext uri="{28A0092B-C50C-407E-A947-70E740481C1C}">
-                    <a14:useLocalDpi xmlns:a14="http://schemas.microsoft.com/office/drawing/2010/main" val="0"/>
-                  </a:ext>
-                </a:extLst>
-              </a:blip>
-              <a:srcRect t="2935" r="12764"/>
-              <a:stretch/>
-            </p:blipFill>
-            <p:spPr bwMode="auto">
-              <a:xfrm>
-                <a:off x="3780727" y="4274820"/>
-                <a:ext cx="1836302" cy="2673180"/>
-              </a:xfrm>
-              <a:prstGeom prst="rect">
-                <a:avLst/>
-              </a:prstGeom>
-              <a:noFill/>
-              <a:ln>
-                <a:noFill/>
-              </a:ln>
-              <a:extLst>
-                <a:ext uri="{909E8E84-426E-40DD-AFC4-6F175D3DCCD1}">
-                  <a14:hiddenFill xmlns:a14="http://schemas.microsoft.com/office/drawing/2010/main">
-                    <a:solidFill>
-                      <a:schemeClr val="accent1"/>
-                    </a:solidFill>
-                  </a14:hiddenFill>
-                </a:ext>
-                <a:ext uri="{91240B29-F687-4F45-9708-019B960494DF}">
-                  <a14:hiddenLine xmlns:a14="http://schemas.microsoft.com/office/drawing/2010/main" w="9525">
-                    <a:solidFill>
-                      <a:schemeClr val="tx1"/>
-                    </a:solidFill>
-                    <a:miter lim="800000"/>
-                    <a:headEnd/>
-                    <a:tailEnd/>
-                  </a14:hiddenLine>
-                </a:ext>
-              </a:extLst>
-            </p:spPr>
-          </p:pic>
-          <p:pic>
-            <p:nvPicPr>
-              <p:cNvPr id="74" name="Picture 16"/>
-              <p:cNvPicPr>
-                <a:picLocks noChangeAspect="1" noChangeArrowheads="1"/>
-              </p:cNvPicPr>
-              <p:nvPr/>
-            </p:nvPicPr>
-            <p:blipFill rotWithShape="1">
-              <a:blip r:embed="rId4">
-                <a:extLst>
-                  <a:ext uri="{28A0092B-C50C-407E-A947-70E740481C1C}">
-                    <a14:useLocalDpi xmlns:a14="http://schemas.microsoft.com/office/drawing/2010/main" val="0"/>
-                  </a:ext>
-                </a:extLst>
-              </a:blip>
-              <a:srcRect r="12772" b="19074"/>
-              <a:stretch/>
-            </p:blipFill>
-            <p:spPr bwMode="auto">
-              <a:xfrm>
-                <a:off x="3780000" y="-126000"/>
-                <a:ext cx="1837029" cy="2246630"/>
-              </a:xfrm>
-              <a:prstGeom prst="rect">
-                <a:avLst/>
-              </a:prstGeom>
-              <a:noFill/>
-              <a:ln>
-                <a:noFill/>
-              </a:ln>
-              <a:extLst>
-                <a:ext uri="{909E8E84-426E-40DD-AFC4-6F175D3DCCD1}">
-                  <a14:hiddenFill xmlns:a14="http://schemas.microsoft.com/office/drawing/2010/main">
-                    <a:solidFill>
-                      <a:schemeClr val="accent1"/>
-                    </a:solidFill>
-                  </a14:hiddenFill>
-                </a:ext>
-                <a:ext uri="{91240B29-F687-4F45-9708-019B960494DF}">
-                  <a14:hiddenLine xmlns:a14="http://schemas.microsoft.com/office/drawing/2010/main" w="9525">
-                    <a:solidFill>
-                      <a:schemeClr val="tx1"/>
-                    </a:solidFill>
-                    <a:miter lim="800000"/>
-                    <a:headEnd/>
-                    <a:tailEnd/>
-                  </a14:hiddenLine>
-                </a:ext>
-              </a:extLst>
-            </p:spPr>
-          </p:pic>
-        </p:grpSp>
-        <p:grpSp>
-          <p:nvGrpSpPr>
-            <p:cNvPr id="75" name="Groupe 74"/>
-            <p:cNvGrpSpPr/>
-            <p:nvPr/>
-          </p:nvGrpSpPr>
-          <p:grpSpPr>
+            </a:blip>
+            <a:srcRect r="8312"/>
+            <a:stretch/>
+          </p:blipFill>
+          <p:spPr bwMode="auto">
             <a:xfrm>
-              <a:off x="18232" y="-129600"/>
+              <a:off x="-115200" y="-129600"/>
               <a:ext cx="3844095" cy="7077075"/>
-              <a:chOff x="-115200" y="-129600"/>
-              <a:chExt cx="3844095" cy="7077075"/>
-            </a:xfrm>
-          </p:grpSpPr>
-          <p:pic>
-            <p:nvPicPr>
-              <p:cNvPr id="76" name="Picture 5"/>
-              <p:cNvPicPr>
-                <a:picLocks noChangeAspect="1" noChangeArrowheads="1"/>
-              </p:cNvPicPr>
-              <p:nvPr/>
-            </p:nvPicPr>
-            <p:blipFill rotWithShape="1">
-              <a:blip r:embed="rId5">
-                <a:extLst>
-                  <a:ext uri="{28A0092B-C50C-407E-A947-70E740481C1C}">
-                    <a14:useLocalDpi xmlns:a14="http://schemas.microsoft.com/office/drawing/2010/main" val="0"/>
-                  </a:ext>
-                </a:extLst>
-              </a:blip>
-              <a:srcRect r="8312"/>
-              <a:stretch/>
-            </p:blipFill>
-            <p:spPr bwMode="auto">
-              <a:xfrm>
-                <a:off x="-115200" y="-129600"/>
-                <a:ext cx="3844095" cy="7077075"/>
-              </a:xfrm>
-              <a:prstGeom prst="rect">
-                <a:avLst/>
-              </a:prstGeom>
-              <a:noFill/>
-              <a:ln>
-                <a:noFill/>
-              </a:ln>
-              <a:extLst>
-                <a:ext uri="{909E8E84-426E-40DD-AFC4-6F175D3DCCD1}">
-                  <a14:hiddenFill xmlns:a14="http://schemas.microsoft.com/office/drawing/2010/main">
-                    <a:solidFill>
-                      <a:schemeClr val="accent1"/>
-                    </a:solidFill>
-                  </a14:hiddenFill>
-                </a:ext>
-                <a:ext uri="{91240B29-F687-4F45-9708-019B960494DF}">
-                  <a14:hiddenLine xmlns:a14="http://schemas.microsoft.com/office/drawing/2010/main" w="9525">
-                    <a:solidFill>
-                      <a:schemeClr val="tx1"/>
-                    </a:solidFill>
-                    <a:miter lim="800000"/>
-                    <a:headEnd/>
-                    <a:tailEnd/>
-                  </a14:hiddenLine>
-                </a:ext>
-              </a:extLst>
-            </p:spPr>
-          </p:pic>
-          <p:sp>
-            <p:nvSpPr>
-              <p:cNvPr id="77" name="Rectangle 76"/>
-              <p:cNvSpPr/>
-              <p:nvPr/>
-            </p:nvSpPr>
-            <p:spPr>
-              <a:xfrm>
-                <a:off x="211592" y="233884"/>
-                <a:ext cx="72008" cy="144016"/>
-              </a:xfrm>
-              <a:prstGeom prst="rect">
-                <a:avLst/>
-              </a:prstGeom>
-              <a:solidFill>
-                <a:schemeClr val="bg1"/>
-              </a:solidFill>
-              <a:ln>
-                <a:solidFill>
-                  <a:schemeClr val="bg1"/>
-                </a:solidFill>
-              </a:ln>
-            </p:spPr>
-            <p:style>
-              <a:lnRef idx="2">
-                <a:schemeClr val="accent1">
-                  <a:shade val="50000"/>
-                </a:schemeClr>
-              </a:lnRef>
-              <a:fillRef idx="1">
-                <a:schemeClr val="accent1"/>
-              </a:fillRef>
-              <a:effectRef idx="0">
-                <a:schemeClr val="accent1"/>
-              </a:effectRef>
-              <a:fontRef idx="minor">
-                <a:schemeClr val="lt1"/>
-              </a:fontRef>
-            </p:style>
-            <p:txBody>
-              <a:bodyPr rtlCol="0" anchor="ctr"/>
-              <a:lstStyle/>
-              <a:p>
-                <a:pPr algn="ctr"/>
-                <a:endParaRPr lang="fr-FR"/>
-              </a:p>
-            </p:txBody>
-          </p:sp>
-          <p:sp>
-            <p:nvSpPr>
-              <p:cNvPr id="78" name="Rectangle 77"/>
-              <p:cNvSpPr/>
-              <p:nvPr/>
-            </p:nvSpPr>
-            <p:spPr>
-              <a:xfrm>
-                <a:off x="308792" y="1702800"/>
-                <a:ext cx="72008" cy="144016"/>
-              </a:xfrm>
-              <a:prstGeom prst="rect">
-                <a:avLst/>
-              </a:prstGeom>
-              <a:solidFill>
-                <a:schemeClr val="bg1"/>
-              </a:solidFill>
-              <a:ln>
-                <a:solidFill>
-                  <a:schemeClr val="bg1"/>
-                </a:solidFill>
-              </a:ln>
-            </p:spPr>
-            <p:style>
-              <a:lnRef idx="2">
-                <a:schemeClr val="accent1">
-                  <a:shade val="50000"/>
-                </a:schemeClr>
-              </a:lnRef>
-              <a:fillRef idx="1">
-                <a:schemeClr val="accent1"/>
-              </a:fillRef>
-              <a:effectRef idx="0">
-                <a:schemeClr val="accent1"/>
-              </a:effectRef>
-              <a:fontRef idx="minor">
-                <a:schemeClr val="lt1"/>
-              </a:fontRef>
-            </p:style>
-            <p:txBody>
-              <a:bodyPr rtlCol="0" anchor="ctr"/>
-              <a:lstStyle/>
-              <a:p>
-                <a:pPr algn="ctr"/>
-                <a:endParaRPr lang="fr-FR"/>
-              </a:p>
-            </p:txBody>
-          </p:sp>
-        </p:grpSp>
-        <p:sp>
-          <p:nvSpPr>
-            <p:cNvPr id="79" name="ZoneTexte 78"/>
-            <p:cNvSpPr txBox="1"/>
-            <p:nvPr/>
-          </p:nvSpPr>
-          <p:spPr>
-            <a:xfrm>
-              <a:off x="-35743" y="-126156"/>
-              <a:ext cx="526106" cy="461665"/>
             </a:xfrm>
             <a:prstGeom prst="rect">
               <a:avLst/>
             </a:prstGeom>
             <a:noFill/>
+            <a:ln>
+              <a:noFill/>
+            </a:ln>
+            <a:extLst>
+              <a:ext uri="{909E8E84-426E-40DD-AFC4-6F175D3DCCD1}">
+                <a14:hiddenFill xmlns:a14="http://schemas.microsoft.com/office/drawing/2010/main">
+                  <a:solidFill>
+                    <a:schemeClr val="accent1"/>
+                  </a:solidFill>
+                </a14:hiddenFill>
+              </a:ext>
+              <a:ext uri="{91240B29-F687-4F45-9708-019B960494DF}">
+                <a14:hiddenLine xmlns:a14="http://schemas.microsoft.com/office/drawing/2010/main" w="9525">
+                  <a:solidFill>
+                    <a:schemeClr val="tx1"/>
+                  </a:solidFill>
+                  <a:miter lim="800000"/>
+                  <a:headEnd/>
+                  <a:tailEnd/>
+                </a14:hiddenLine>
+              </a:ext>
+            </a:extLst>
           </p:spPr>
-          <p:txBody>
-            <a:bodyPr wrap="none" rtlCol="0">
-              <a:spAutoFit/>
-            </a:bodyPr>
-            <a:lstStyle/>
-            <a:p>
-              <a:r>
-                <a:rPr lang="fr-FR" sz="2400" dirty="0" smtClean="0">
-                  <a:latin typeface="Times New Roman" panose="02020603050405020304" pitchFamily="18" charset="0"/>
-                  <a:cs typeface="Times New Roman" panose="02020603050405020304" pitchFamily="18" charset="0"/>
-                </a:rPr>
-                <a:t>(a)</a:t>
-              </a:r>
-              <a:endParaRPr lang="fr-FR" sz="2400" dirty="0">
-                <a:latin typeface="Times New Roman" panose="02020603050405020304" pitchFamily="18" charset="0"/>
-                <a:cs typeface="Times New Roman" panose="02020603050405020304" pitchFamily="18" charset="0"/>
-              </a:endParaRPr>
-            </a:p>
-          </p:txBody>
-        </p:sp>
+        </p:pic>
         <p:sp>
           <p:nvSpPr>
-            <p:cNvPr id="80" name="ZoneTexte 79"/>
-            <p:cNvSpPr txBox="1"/>
-            <p:nvPr/>
-          </p:nvSpPr>
-          <p:spPr>
-            <a:xfrm>
-              <a:off x="738312" y="255950"/>
-              <a:ext cx="628698" cy="553998"/>
-            </a:xfrm>
-            <a:prstGeom prst="rect">
-              <a:avLst/>
-            </a:prstGeom>
-            <a:noFill/>
-          </p:spPr>
-          <p:txBody>
-            <a:bodyPr wrap="none" rtlCol="0">
-              <a:spAutoFit/>
-            </a:bodyPr>
-            <a:lstStyle/>
-            <a:p>
-              <a:r>
-                <a:rPr lang="fr-FR" sz="3000" dirty="0" smtClean="0">
-                  <a:solidFill>
-                    <a:srgbClr val="FF0000"/>
-                  </a:solidFill>
-                  <a:latin typeface="Symbol" panose="05050102010706020507" pitchFamily="18" charset="2"/>
-                </a:rPr>
-                <a:t>s-</a:t>
-              </a:r>
-              <a:endParaRPr lang="fr-FR" sz="3000" dirty="0">
-                <a:solidFill>
-                  <a:srgbClr val="FF0000"/>
-                </a:solidFill>
-                <a:latin typeface="Symbol" panose="05050102010706020507" pitchFamily="18" charset="2"/>
-              </a:endParaRPr>
-            </a:p>
-          </p:txBody>
-        </p:sp>
-        <p:sp>
-          <p:nvSpPr>
-            <p:cNvPr id="81" name="ZoneTexte 80"/>
-            <p:cNvSpPr txBox="1"/>
-            <p:nvPr/>
-          </p:nvSpPr>
-          <p:spPr>
-            <a:xfrm>
-              <a:off x="3866981" y="-126156"/>
-              <a:ext cx="543739" cy="461665"/>
-            </a:xfrm>
-            <a:prstGeom prst="rect">
-              <a:avLst/>
-            </a:prstGeom>
-            <a:noFill/>
-          </p:spPr>
-          <p:txBody>
-            <a:bodyPr wrap="none" rtlCol="0">
-              <a:spAutoFit/>
-            </a:bodyPr>
-            <a:lstStyle/>
-            <a:p>
-              <a:r>
-                <a:rPr lang="fr-FR" sz="2400" dirty="0" smtClean="0">
-                  <a:latin typeface="Times New Roman" panose="02020603050405020304" pitchFamily="18" charset="0"/>
-                  <a:cs typeface="Times New Roman" panose="02020603050405020304" pitchFamily="18" charset="0"/>
-                </a:rPr>
-                <a:t>(b)</a:t>
-              </a:r>
-              <a:endParaRPr lang="fr-FR" sz="2400" dirty="0">
-                <a:latin typeface="Times New Roman" panose="02020603050405020304" pitchFamily="18" charset="0"/>
-                <a:cs typeface="Times New Roman" panose="02020603050405020304" pitchFamily="18" charset="0"/>
-              </a:endParaRPr>
-            </a:p>
-          </p:txBody>
-        </p:sp>
-        <p:sp>
-          <p:nvSpPr>
-            <p:cNvPr id="82" name="ZoneTexte 81"/>
-            <p:cNvSpPr txBox="1"/>
-            <p:nvPr/>
-          </p:nvSpPr>
-          <p:spPr>
-            <a:xfrm>
-              <a:off x="738312" y="5800566"/>
-              <a:ext cx="628698" cy="553998"/>
-            </a:xfrm>
-            <a:prstGeom prst="rect">
-              <a:avLst/>
-            </a:prstGeom>
-            <a:noFill/>
-          </p:spPr>
-          <p:txBody>
-            <a:bodyPr wrap="none" rtlCol="0">
-              <a:spAutoFit/>
-            </a:bodyPr>
-            <a:lstStyle/>
-            <a:p>
-              <a:r>
-                <a:rPr lang="fr-FR" sz="3000" dirty="0" smtClean="0">
-                  <a:solidFill>
-                    <a:srgbClr val="FF0000"/>
-                  </a:solidFill>
-                  <a:latin typeface="Symbol" panose="05050102010706020507" pitchFamily="18" charset="2"/>
-                </a:rPr>
-                <a:t>s+</a:t>
-              </a:r>
-              <a:endParaRPr lang="fr-FR" sz="3000" dirty="0">
-                <a:solidFill>
-                  <a:srgbClr val="FF0000"/>
-                </a:solidFill>
-                <a:latin typeface="Symbol" panose="05050102010706020507" pitchFamily="18" charset="2"/>
-              </a:endParaRPr>
-            </a:p>
-          </p:txBody>
-        </p:sp>
-        <p:sp>
-          <p:nvSpPr>
-            <p:cNvPr id="14" name="CustomShape 2"/>
+            <p:cNvPr id="77" name="Rectangle 76"/>
             <p:cNvSpPr/>
             <p:nvPr/>
           </p:nvSpPr>
           <p:spPr>
             <a:xfrm>
-              <a:off x="1404417" y="2309241"/>
-              <a:ext cx="757487" cy="588939"/>
-            </a:xfrm>
-            <a:prstGeom prst="ellipse">
-              <a:avLst/>
-            </a:prstGeom>
-            <a:noFill/>
-            <a:ln w="19080">
-              <a:solidFill>
-                <a:srgbClr val="FF0000"/>
-              </a:solidFill>
-              <a:prstDash val="dash"/>
-              <a:round/>
-            </a:ln>
-          </p:spPr>
-        </p:sp>
-        <p:sp>
-          <p:nvSpPr>
-            <p:cNvPr id="15" name="ZoneTexte 14"/>
-            <p:cNvSpPr txBox="1"/>
-            <p:nvPr/>
-          </p:nvSpPr>
-          <p:spPr>
-            <a:xfrm>
-              <a:off x="950447" y="2528848"/>
-              <a:ext cx="453970" cy="369332"/>
-            </a:xfrm>
-            <a:prstGeom prst="rect">
-              <a:avLst/>
-            </a:prstGeom>
-            <a:noFill/>
-          </p:spPr>
-          <p:txBody>
-            <a:bodyPr wrap="none" rtlCol="0">
-              <a:spAutoFit/>
-            </a:bodyPr>
-            <a:lstStyle/>
-            <a:p>
-              <a:r>
-                <a:rPr lang="fr-FR" dirty="0" smtClean="0">
-                  <a:solidFill>
-                    <a:srgbClr val="FF0000"/>
-                  </a:solidFill>
-                  <a:latin typeface="Symbol" panose="05050102010706020507" pitchFamily="18" charset="2"/>
-                </a:rPr>
-                <a:t>(4)</a:t>
-              </a:r>
-              <a:endParaRPr lang="fr-FR" dirty="0">
-                <a:solidFill>
-                  <a:srgbClr val="FF0000"/>
-                </a:solidFill>
-                <a:latin typeface="Symbol" panose="05050102010706020507" pitchFamily="18" charset="2"/>
-              </a:endParaRPr>
-            </a:p>
-          </p:txBody>
-        </p:sp>
-        <p:sp>
-          <p:nvSpPr>
-            <p:cNvPr id="16" name="CustomShape 2"/>
-            <p:cNvSpPr/>
-            <p:nvPr/>
-          </p:nvSpPr>
-          <p:spPr>
-            <a:xfrm>
-              <a:off x="2161904" y="1350819"/>
-              <a:ext cx="538657" cy="539249"/>
-            </a:xfrm>
-            <a:prstGeom prst="ellipse">
-              <a:avLst/>
-            </a:prstGeom>
-            <a:noFill/>
-            <a:ln w="19080">
-              <a:solidFill>
-                <a:srgbClr val="FF0000"/>
-              </a:solidFill>
-              <a:prstDash val="dash"/>
-              <a:round/>
-            </a:ln>
-          </p:spPr>
-        </p:sp>
-        <p:sp>
-          <p:nvSpPr>
-            <p:cNvPr id="17" name="ZoneTexte 16"/>
-            <p:cNvSpPr txBox="1"/>
-            <p:nvPr/>
-          </p:nvSpPr>
-          <p:spPr>
-            <a:xfrm>
-              <a:off x="2700561" y="1530028"/>
-              <a:ext cx="453970" cy="369332"/>
-            </a:xfrm>
-            <a:prstGeom prst="rect">
-              <a:avLst/>
-            </a:prstGeom>
-            <a:noFill/>
-          </p:spPr>
-          <p:txBody>
-            <a:bodyPr wrap="none" rtlCol="0">
-              <a:spAutoFit/>
-            </a:bodyPr>
-            <a:lstStyle/>
-            <a:p>
-              <a:r>
-                <a:rPr lang="fr-FR" dirty="0" smtClean="0">
-                  <a:solidFill>
-                    <a:srgbClr val="FF0000"/>
-                  </a:solidFill>
-                  <a:latin typeface="Symbol" panose="05050102010706020507" pitchFamily="18" charset="2"/>
-                </a:rPr>
-                <a:t>(2)</a:t>
-              </a:r>
-              <a:endParaRPr lang="fr-FR" dirty="0">
-                <a:solidFill>
-                  <a:srgbClr val="FF0000"/>
-                </a:solidFill>
-                <a:latin typeface="Symbol" panose="05050102010706020507" pitchFamily="18" charset="2"/>
-              </a:endParaRPr>
-            </a:p>
-          </p:txBody>
-        </p:sp>
-        <p:sp>
-          <p:nvSpPr>
-            <p:cNvPr id="18" name="CustomShape 2"/>
-            <p:cNvSpPr/>
-            <p:nvPr/>
-          </p:nvSpPr>
-          <p:spPr>
-            <a:xfrm>
-              <a:off x="2089896" y="2946013"/>
-              <a:ext cx="538657" cy="539249"/>
-            </a:xfrm>
-            <a:prstGeom prst="ellipse">
-              <a:avLst/>
-            </a:prstGeom>
-            <a:noFill/>
-            <a:ln w="19080">
-              <a:solidFill>
-                <a:srgbClr val="FF0000"/>
-              </a:solidFill>
-              <a:prstDash val="dash"/>
-              <a:round/>
-            </a:ln>
-          </p:spPr>
-        </p:sp>
-        <p:sp>
-          <p:nvSpPr>
-            <p:cNvPr id="19" name="ZoneTexte 18"/>
-            <p:cNvSpPr txBox="1"/>
-            <p:nvPr/>
-          </p:nvSpPr>
-          <p:spPr>
-            <a:xfrm>
-              <a:off x="2799678" y="2842368"/>
-              <a:ext cx="453970" cy="369332"/>
-            </a:xfrm>
-            <a:prstGeom prst="rect">
-              <a:avLst/>
-            </a:prstGeom>
-            <a:noFill/>
-          </p:spPr>
-          <p:txBody>
-            <a:bodyPr wrap="none" rtlCol="0">
-              <a:spAutoFit/>
-            </a:bodyPr>
-            <a:lstStyle/>
-            <a:p>
-              <a:r>
-                <a:rPr lang="fr-FR" dirty="0" smtClean="0">
-                  <a:solidFill>
-                    <a:srgbClr val="FF0000"/>
-                  </a:solidFill>
-                  <a:latin typeface="Symbol" panose="05050102010706020507" pitchFamily="18" charset="2"/>
-                </a:rPr>
-                <a:t>(1)</a:t>
-              </a:r>
-              <a:endParaRPr lang="fr-FR" dirty="0">
-                <a:solidFill>
-                  <a:srgbClr val="FF0000"/>
-                </a:solidFill>
-                <a:latin typeface="Symbol" panose="05050102010706020507" pitchFamily="18" charset="2"/>
-              </a:endParaRPr>
-            </a:p>
-          </p:txBody>
-        </p:sp>
-        <p:sp>
-          <p:nvSpPr>
-            <p:cNvPr id="21" name="CustomShape 2"/>
-            <p:cNvSpPr/>
-            <p:nvPr/>
-          </p:nvSpPr>
-          <p:spPr>
-            <a:xfrm>
-              <a:off x="1476425" y="-211115"/>
-              <a:ext cx="538657" cy="539249"/>
-            </a:xfrm>
-            <a:prstGeom prst="ellipse">
-              <a:avLst/>
-            </a:prstGeom>
-            <a:noFill/>
-            <a:ln w="19080">
-              <a:solidFill>
-                <a:srgbClr val="FF0000"/>
-              </a:solidFill>
-              <a:prstDash val="dash"/>
-              <a:round/>
-            </a:ln>
-          </p:spPr>
-        </p:sp>
-        <p:sp>
-          <p:nvSpPr>
-            <p:cNvPr id="2" name="Rectangle 1"/>
-            <p:cNvSpPr/>
-            <p:nvPr/>
-          </p:nvSpPr>
-          <p:spPr>
-            <a:xfrm>
-              <a:off x="1404417" y="-270000"/>
-              <a:ext cx="792088" cy="306000"/>
+              <a:off x="211592" y="233884"/>
+              <a:ext cx="72008" cy="144016"/>
             </a:xfrm>
             <a:prstGeom prst="rect">
               <a:avLst/>
@@ -3866,109 +3216,899 @@
         </p:sp>
         <p:sp>
           <p:nvSpPr>
-            <p:cNvPr id="23" name="ZoneTexte 22"/>
-            <p:cNvSpPr txBox="1"/>
+            <p:cNvPr id="78" name="Rectangle 77"/>
+            <p:cNvSpPr/>
             <p:nvPr/>
           </p:nvSpPr>
           <p:spPr>
             <a:xfrm>
-              <a:off x="1044377" y="8568"/>
-              <a:ext cx="453970" cy="369332"/>
+              <a:off x="308792" y="1702800"/>
+              <a:ext cx="72008" cy="144016"/>
+            </a:xfrm>
+            <a:prstGeom prst="rect">
+              <a:avLst/>
+            </a:prstGeom>
+            <a:solidFill>
+              <a:schemeClr val="bg1"/>
+            </a:solidFill>
+            <a:ln>
+              <a:solidFill>
+                <a:schemeClr val="bg1"/>
+              </a:solidFill>
+            </a:ln>
+          </p:spPr>
+          <p:style>
+            <a:lnRef idx="2">
+              <a:schemeClr val="accent1">
+                <a:shade val="50000"/>
+              </a:schemeClr>
+            </a:lnRef>
+            <a:fillRef idx="1">
+              <a:schemeClr val="accent1"/>
+            </a:fillRef>
+            <a:effectRef idx="0">
+              <a:schemeClr val="accent1"/>
+            </a:effectRef>
+            <a:fontRef idx="minor">
+              <a:schemeClr val="lt1"/>
+            </a:fontRef>
+          </p:style>
+          <p:txBody>
+            <a:bodyPr rtlCol="0" anchor="ctr"/>
+            <a:lstStyle/>
+            <a:p>
+              <a:pPr algn="ctr"/>
+              <a:endParaRPr lang="fr-FR"/>
+            </a:p>
+          </p:txBody>
+        </p:sp>
+      </p:grpSp>
+      <p:sp>
+        <p:nvSpPr>
+          <p:cNvPr id="4" name="Rectangle 3"/>
+          <p:cNvSpPr/>
+          <p:nvPr/>
+        </p:nvSpPr>
+        <p:spPr>
+          <a:xfrm>
+            <a:off x="2745421" y="75600"/>
+            <a:ext cx="1023859" cy="2815380"/>
+          </a:xfrm>
+          <a:prstGeom prst="rect">
+            <a:avLst/>
+          </a:prstGeom>
+        </p:spPr>
+        <p:style>
+          <a:lnRef idx="2">
+            <a:schemeClr val="dk1">
+              <a:shade val="50000"/>
+            </a:schemeClr>
+          </a:lnRef>
+          <a:fillRef idx="1">
+            <a:schemeClr val="dk1"/>
+          </a:fillRef>
+          <a:effectRef idx="0">
+            <a:schemeClr val="dk1"/>
+          </a:effectRef>
+          <a:fontRef idx="minor">
+            <a:schemeClr val="lt1"/>
+          </a:fontRef>
+        </p:style>
+        <p:txBody>
+          <a:bodyPr rtlCol="0" anchor="ctr"/>
+          <a:lstStyle/>
+          <a:p>
+            <a:pPr algn="ctr"/>
+            <a:endParaRPr lang="fr-FR"/>
+          </a:p>
+        </p:txBody>
+      </p:sp>
+      <p:grpSp>
+        <p:nvGrpSpPr>
+          <p:cNvPr id="71" name="Groupe 70"/>
+          <p:cNvGrpSpPr/>
+          <p:nvPr/>
+        </p:nvGrpSpPr>
+        <p:grpSpPr>
+          <a:xfrm>
+            <a:off x="3815490" y="-126000"/>
+            <a:ext cx="1837117" cy="7074000"/>
+            <a:chOff x="3779912" y="-126000"/>
+            <a:chExt cx="1837117" cy="7074000"/>
+          </a:xfrm>
+        </p:grpSpPr>
+        <p:pic>
+          <p:nvPicPr>
+            <p:cNvPr id="72" name="Picture 15"/>
+            <p:cNvPicPr>
+              <a:picLocks noChangeAspect="1" noChangeArrowheads="1"/>
+            </p:cNvPicPr>
+            <p:nvPr/>
+          </p:nvPicPr>
+          <p:blipFill rotWithShape="1">
+            <a:blip r:embed="rId3">
+              <a:extLst>
+                <a:ext uri="{28A0092B-C50C-407E-A947-70E740481C1C}">
+                  <a14:useLocalDpi xmlns:a14="http://schemas.microsoft.com/office/drawing/2010/main" val="0"/>
+                </a:ext>
+              </a:extLst>
+            </a:blip>
+            <a:srcRect t="4704" r="12767" b="20137"/>
+            <a:stretch/>
+          </p:blipFill>
+          <p:spPr bwMode="auto">
+            <a:xfrm>
+              <a:off x="3779912" y="2156457"/>
+              <a:ext cx="1837117" cy="2118363"/>
             </a:xfrm>
             <a:prstGeom prst="rect">
               <a:avLst/>
             </a:prstGeom>
             <a:noFill/>
+            <a:ln>
+              <a:noFill/>
+            </a:ln>
+            <a:extLst>
+              <a:ext uri="{909E8E84-426E-40DD-AFC4-6F175D3DCCD1}">
+                <a14:hiddenFill xmlns:a14="http://schemas.microsoft.com/office/drawing/2010/main">
+                  <a:solidFill>
+                    <a:schemeClr val="accent1"/>
+                  </a:solidFill>
+                </a14:hiddenFill>
+              </a:ext>
+              <a:ext uri="{91240B29-F687-4F45-9708-019B960494DF}">
+                <a14:hiddenLine xmlns:a14="http://schemas.microsoft.com/office/drawing/2010/main" w="9525">
+                  <a:solidFill>
+                    <a:schemeClr val="tx1"/>
+                  </a:solidFill>
+                  <a:miter lim="800000"/>
+                  <a:headEnd/>
+                  <a:tailEnd/>
+                </a14:hiddenLine>
+              </a:ext>
+            </a:extLst>
           </p:spPr>
-          <p:txBody>
-            <a:bodyPr wrap="none" rtlCol="0">
-              <a:spAutoFit/>
-            </a:bodyPr>
-            <a:lstStyle/>
-            <a:p>
-              <a:r>
-                <a:rPr lang="fr-FR" dirty="0" smtClean="0">
-                  <a:solidFill>
-                    <a:srgbClr val="FF0000"/>
-                  </a:solidFill>
-                  <a:latin typeface="Symbol" panose="05050102010706020507" pitchFamily="18" charset="2"/>
-                </a:rPr>
-                <a:t>(6)</a:t>
-              </a:r>
-              <a:endParaRPr lang="fr-FR" dirty="0">
-                <a:solidFill>
-                  <a:srgbClr val="FF0000"/>
-                </a:solidFill>
-                <a:latin typeface="Symbol" panose="05050102010706020507" pitchFamily="18" charset="2"/>
-              </a:endParaRPr>
-            </a:p>
-          </p:txBody>
-        </p:sp>
-        <p:sp>
-          <p:nvSpPr>
-            <p:cNvPr id="24" name="CustomShape 2"/>
-            <p:cNvSpPr/>
+        </p:pic>
+        <p:pic>
+          <p:nvPicPr>
+            <p:cNvPr id="73" name="Picture 9"/>
+            <p:cNvPicPr>
+              <a:picLocks noChangeAspect="1" noChangeArrowheads="1"/>
+            </p:cNvPicPr>
             <p:nvPr/>
-          </p:nvSpPr>
-          <p:spPr>
+          </p:nvPicPr>
+          <p:blipFill rotWithShape="1">
+            <a:blip r:embed="rId4">
+              <a:extLst>
+                <a:ext uri="{28A0092B-C50C-407E-A947-70E740481C1C}">
+                  <a14:useLocalDpi xmlns:a14="http://schemas.microsoft.com/office/drawing/2010/main" val="0"/>
+                </a:ext>
+              </a:extLst>
+            </a:blip>
+            <a:srcRect t="2935" r="12764"/>
+            <a:stretch/>
+          </p:blipFill>
+          <p:spPr bwMode="auto">
             <a:xfrm>
-              <a:off x="2124497" y="4519171"/>
-              <a:ext cx="538657" cy="539249"/>
-            </a:xfrm>
-            <a:prstGeom prst="ellipse">
-              <a:avLst/>
-            </a:prstGeom>
-            <a:noFill/>
-            <a:ln w="19080">
-              <a:solidFill>
-                <a:srgbClr val="FF0000"/>
-              </a:solidFill>
-              <a:prstDash val="dash"/>
-              <a:round/>
-            </a:ln>
-          </p:spPr>
-        </p:sp>
-        <p:sp>
-          <p:nvSpPr>
-            <p:cNvPr id="25" name="ZoneTexte 24"/>
-            <p:cNvSpPr txBox="1"/>
-            <p:nvPr/>
-          </p:nvSpPr>
-          <p:spPr>
-            <a:xfrm>
-              <a:off x="1620441" y="4554364"/>
-              <a:ext cx="453970" cy="369332"/>
+              <a:off x="3780727" y="4274820"/>
+              <a:ext cx="1836302" cy="2673180"/>
             </a:xfrm>
             <a:prstGeom prst="rect">
               <a:avLst/>
             </a:prstGeom>
             <a:noFill/>
+            <a:ln>
+              <a:noFill/>
+            </a:ln>
+            <a:extLst>
+              <a:ext uri="{909E8E84-426E-40DD-AFC4-6F175D3DCCD1}">
+                <a14:hiddenFill xmlns:a14="http://schemas.microsoft.com/office/drawing/2010/main">
+                  <a:solidFill>
+                    <a:schemeClr val="accent1"/>
+                  </a:solidFill>
+                </a14:hiddenFill>
+              </a:ext>
+              <a:ext uri="{91240B29-F687-4F45-9708-019B960494DF}">
+                <a14:hiddenLine xmlns:a14="http://schemas.microsoft.com/office/drawing/2010/main" w="9525">
+                  <a:solidFill>
+                    <a:schemeClr val="tx1"/>
+                  </a:solidFill>
+                  <a:miter lim="800000"/>
+                  <a:headEnd/>
+                  <a:tailEnd/>
+                </a14:hiddenLine>
+              </a:ext>
+            </a:extLst>
           </p:spPr>
-          <p:txBody>
-            <a:bodyPr wrap="none" rtlCol="0">
-              <a:spAutoFit/>
-            </a:bodyPr>
-            <a:lstStyle/>
-            <a:p>
-              <a:r>
-                <a:rPr lang="fr-FR" dirty="0" smtClean="0">
+        </p:pic>
+        <p:pic>
+          <p:nvPicPr>
+            <p:cNvPr id="74" name="Picture 16"/>
+            <p:cNvPicPr>
+              <a:picLocks noChangeAspect="1" noChangeArrowheads="1"/>
+            </p:cNvPicPr>
+            <p:nvPr/>
+          </p:nvPicPr>
+          <p:blipFill rotWithShape="1">
+            <a:blip r:embed="rId5">
+              <a:extLst>
+                <a:ext uri="{28A0092B-C50C-407E-A947-70E740481C1C}">
+                  <a14:useLocalDpi xmlns:a14="http://schemas.microsoft.com/office/drawing/2010/main" val="0"/>
+                </a:ext>
+              </a:extLst>
+            </a:blip>
+            <a:srcRect r="12772" b="19074"/>
+            <a:stretch/>
+          </p:blipFill>
+          <p:spPr bwMode="auto">
+            <a:xfrm>
+              <a:off x="3780000" y="-126000"/>
+              <a:ext cx="1837029" cy="2246630"/>
+            </a:xfrm>
+            <a:prstGeom prst="rect">
+              <a:avLst/>
+            </a:prstGeom>
+            <a:noFill/>
+            <a:ln>
+              <a:noFill/>
+            </a:ln>
+            <a:extLst>
+              <a:ext uri="{909E8E84-426E-40DD-AFC4-6F175D3DCCD1}">
+                <a14:hiddenFill xmlns:a14="http://schemas.microsoft.com/office/drawing/2010/main">
                   <a:solidFill>
-                    <a:srgbClr val="FF0000"/>
+                    <a:schemeClr val="accent1"/>
                   </a:solidFill>
-                  <a:latin typeface="Symbol" panose="05050102010706020507" pitchFamily="18" charset="2"/>
-                </a:rPr>
-                <a:t>(3)</a:t>
-              </a:r>
-              <a:endParaRPr lang="fr-FR" dirty="0">
+                </a14:hiddenFill>
+              </a:ext>
+              <a:ext uri="{91240B29-F687-4F45-9708-019B960494DF}">
+                <a14:hiddenLine xmlns:a14="http://schemas.microsoft.com/office/drawing/2010/main" w="9525">
+                  <a:solidFill>
+                    <a:schemeClr val="tx1"/>
+                  </a:solidFill>
+                  <a:miter lim="800000"/>
+                  <a:headEnd/>
+                  <a:tailEnd/>
+                </a14:hiddenLine>
+              </a:ext>
+            </a:extLst>
+          </p:spPr>
+        </p:pic>
+      </p:grpSp>
+      <p:sp>
+        <p:nvSpPr>
+          <p:cNvPr id="79" name="ZoneTexte 78"/>
+          <p:cNvSpPr txBox="1"/>
+          <p:nvPr/>
+        </p:nvSpPr>
+        <p:spPr>
+          <a:xfrm>
+            <a:off x="-90000" y="-126156"/>
+            <a:ext cx="526106" cy="461665"/>
+          </a:xfrm>
+          <a:prstGeom prst="rect">
+            <a:avLst/>
+          </a:prstGeom>
+          <a:noFill/>
+        </p:spPr>
+        <p:txBody>
+          <a:bodyPr wrap="none" rtlCol="0">
+            <a:spAutoFit/>
+          </a:bodyPr>
+          <a:lstStyle/>
+          <a:p>
+            <a:r>
+              <a:rPr lang="fr-FR" sz="2400" dirty="0" smtClean="0">
+                <a:latin typeface="Times New Roman" panose="02020603050405020304" pitchFamily="18" charset="0"/>
+                <a:cs typeface="Times New Roman" panose="02020603050405020304" pitchFamily="18" charset="0"/>
+              </a:rPr>
+              <a:t>(a)</a:t>
+            </a:r>
+            <a:endParaRPr lang="fr-FR" sz="2400" dirty="0">
+              <a:latin typeface="Times New Roman" panose="02020603050405020304" pitchFamily="18" charset="0"/>
+              <a:cs typeface="Times New Roman" panose="02020603050405020304" pitchFamily="18" charset="0"/>
+            </a:endParaRPr>
+          </a:p>
+        </p:txBody>
+      </p:sp>
+      <p:sp>
+        <p:nvSpPr>
+          <p:cNvPr id="80" name="ZoneTexte 79"/>
+          <p:cNvSpPr txBox="1"/>
+          <p:nvPr/>
+        </p:nvSpPr>
+        <p:spPr>
+          <a:xfrm>
+            <a:off x="684055" y="255950"/>
+            <a:ext cx="628698" cy="553998"/>
+          </a:xfrm>
+          <a:prstGeom prst="rect">
+            <a:avLst/>
+          </a:prstGeom>
+          <a:noFill/>
+        </p:spPr>
+        <p:txBody>
+          <a:bodyPr wrap="none" rtlCol="0">
+            <a:spAutoFit/>
+          </a:bodyPr>
+          <a:lstStyle/>
+          <a:p>
+            <a:r>
+              <a:rPr lang="fr-FR" sz="3000" dirty="0" smtClean="0">
                 <a:solidFill>
                   <a:srgbClr val="FF0000"/>
                 </a:solidFill>
                 <a:latin typeface="Symbol" panose="05050102010706020507" pitchFamily="18" charset="2"/>
-              </a:endParaRPr>
-            </a:p>
-          </p:txBody>
-        </p:sp>
-      </p:grpSp>
+              </a:rPr>
+              <a:t>s-</a:t>
+            </a:r>
+            <a:endParaRPr lang="fr-FR" sz="3000" dirty="0">
+              <a:solidFill>
+                <a:srgbClr val="FF0000"/>
+              </a:solidFill>
+              <a:latin typeface="Symbol" panose="05050102010706020507" pitchFamily="18" charset="2"/>
+            </a:endParaRPr>
+          </a:p>
+        </p:txBody>
+      </p:sp>
+      <p:sp>
+        <p:nvSpPr>
+          <p:cNvPr id="81" name="ZoneTexte 80"/>
+          <p:cNvSpPr txBox="1"/>
+          <p:nvPr/>
+        </p:nvSpPr>
+        <p:spPr>
+          <a:xfrm>
+            <a:off x="3812724" y="-126156"/>
+            <a:ext cx="543739" cy="461665"/>
+          </a:xfrm>
+          <a:prstGeom prst="rect">
+            <a:avLst/>
+          </a:prstGeom>
+          <a:noFill/>
+        </p:spPr>
+        <p:txBody>
+          <a:bodyPr wrap="none" rtlCol="0">
+            <a:spAutoFit/>
+          </a:bodyPr>
+          <a:lstStyle/>
+          <a:p>
+            <a:r>
+              <a:rPr lang="fr-FR" sz="2400" dirty="0" smtClean="0">
+                <a:latin typeface="Times New Roman" panose="02020603050405020304" pitchFamily="18" charset="0"/>
+                <a:cs typeface="Times New Roman" panose="02020603050405020304" pitchFamily="18" charset="0"/>
+              </a:rPr>
+              <a:t>(b)</a:t>
+            </a:r>
+            <a:endParaRPr lang="fr-FR" sz="2400" dirty="0">
+              <a:latin typeface="Times New Roman" panose="02020603050405020304" pitchFamily="18" charset="0"/>
+              <a:cs typeface="Times New Roman" panose="02020603050405020304" pitchFamily="18" charset="0"/>
+            </a:endParaRPr>
+          </a:p>
+        </p:txBody>
+      </p:sp>
+      <p:sp>
+        <p:nvSpPr>
+          <p:cNvPr id="82" name="ZoneTexte 81"/>
+          <p:cNvSpPr txBox="1"/>
+          <p:nvPr/>
+        </p:nvSpPr>
+        <p:spPr>
+          <a:xfrm>
+            <a:off x="684055" y="5800566"/>
+            <a:ext cx="628698" cy="553998"/>
+          </a:xfrm>
+          <a:prstGeom prst="rect">
+            <a:avLst/>
+          </a:prstGeom>
+          <a:noFill/>
+        </p:spPr>
+        <p:txBody>
+          <a:bodyPr wrap="none" rtlCol="0">
+            <a:spAutoFit/>
+          </a:bodyPr>
+          <a:lstStyle/>
+          <a:p>
+            <a:r>
+              <a:rPr lang="fr-FR" sz="3000" dirty="0" smtClean="0">
+                <a:solidFill>
+                  <a:srgbClr val="FF0000"/>
+                </a:solidFill>
+                <a:latin typeface="Symbol" panose="05050102010706020507" pitchFamily="18" charset="2"/>
+              </a:rPr>
+              <a:t>s+</a:t>
+            </a:r>
+            <a:endParaRPr lang="fr-FR" sz="3000" dirty="0">
+              <a:solidFill>
+                <a:srgbClr val="FF0000"/>
+              </a:solidFill>
+              <a:latin typeface="Symbol" panose="05050102010706020507" pitchFamily="18" charset="2"/>
+            </a:endParaRPr>
+          </a:p>
+        </p:txBody>
+      </p:sp>
+      <p:sp>
+        <p:nvSpPr>
+          <p:cNvPr id="14" name="CustomShape 2"/>
+          <p:cNvSpPr/>
+          <p:nvPr/>
+        </p:nvSpPr>
+        <p:spPr>
+          <a:xfrm>
+            <a:off x="1350160" y="2309241"/>
+            <a:ext cx="757487" cy="588939"/>
+          </a:xfrm>
+          <a:prstGeom prst="ellipse">
+            <a:avLst/>
+          </a:prstGeom>
+          <a:noFill/>
+          <a:ln w="19080">
+            <a:solidFill>
+              <a:srgbClr val="FF0000"/>
+            </a:solidFill>
+            <a:prstDash val="dash"/>
+            <a:round/>
+          </a:ln>
+        </p:spPr>
+      </p:sp>
+      <p:sp>
+        <p:nvSpPr>
+          <p:cNvPr id="15" name="ZoneTexte 14"/>
+          <p:cNvSpPr txBox="1"/>
+          <p:nvPr/>
+        </p:nvSpPr>
+        <p:spPr>
+          <a:xfrm>
+            <a:off x="896190" y="2528848"/>
+            <a:ext cx="453970" cy="369332"/>
+          </a:xfrm>
+          <a:prstGeom prst="rect">
+            <a:avLst/>
+          </a:prstGeom>
+          <a:noFill/>
+        </p:spPr>
+        <p:txBody>
+          <a:bodyPr wrap="none" rtlCol="0">
+            <a:spAutoFit/>
+          </a:bodyPr>
+          <a:lstStyle/>
+          <a:p>
+            <a:r>
+              <a:rPr lang="fr-FR" dirty="0" smtClean="0">
+                <a:solidFill>
+                  <a:srgbClr val="FF0000"/>
+                </a:solidFill>
+                <a:latin typeface="Symbol" panose="05050102010706020507" pitchFamily="18" charset="2"/>
+              </a:rPr>
+              <a:t>(4)</a:t>
+            </a:r>
+            <a:endParaRPr lang="fr-FR" dirty="0">
+              <a:solidFill>
+                <a:srgbClr val="FF0000"/>
+              </a:solidFill>
+              <a:latin typeface="Symbol" panose="05050102010706020507" pitchFamily="18" charset="2"/>
+            </a:endParaRPr>
+          </a:p>
+        </p:txBody>
+      </p:sp>
+      <p:sp>
+        <p:nvSpPr>
+          <p:cNvPr id="16" name="CustomShape 2"/>
+          <p:cNvSpPr/>
+          <p:nvPr/>
+        </p:nvSpPr>
+        <p:spPr>
+          <a:xfrm>
+            <a:off x="2107647" y="1350819"/>
+            <a:ext cx="538657" cy="539249"/>
+          </a:xfrm>
+          <a:prstGeom prst="ellipse">
+            <a:avLst/>
+          </a:prstGeom>
+          <a:noFill/>
+          <a:ln w="19080">
+            <a:solidFill>
+              <a:srgbClr val="FF0000"/>
+            </a:solidFill>
+            <a:prstDash val="dash"/>
+            <a:round/>
+          </a:ln>
+        </p:spPr>
+      </p:sp>
+      <p:sp>
+        <p:nvSpPr>
+          <p:cNvPr id="18" name="CustomShape 2"/>
+          <p:cNvSpPr/>
+          <p:nvPr/>
+        </p:nvSpPr>
+        <p:spPr>
+          <a:xfrm>
+            <a:off x="2035639" y="2946013"/>
+            <a:ext cx="538657" cy="539249"/>
+          </a:xfrm>
+          <a:prstGeom prst="ellipse">
+            <a:avLst/>
+          </a:prstGeom>
+          <a:noFill/>
+          <a:ln w="19080">
+            <a:solidFill>
+              <a:srgbClr val="FF0000"/>
+            </a:solidFill>
+            <a:prstDash val="dash"/>
+            <a:round/>
+          </a:ln>
+        </p:spPr>
+      </p:sp>
+      <p:sp>
+        <p:nvSpPr>
+          <p:cNvPr id="21" name="CustomShape 2"/>
+          <p:cNvSpPr/>
+          <p:nvPr/>
+        </p:nvSpPr>
+        <p:spPr>
+          <a:xfrm>
+            <a:off x="1422168" y="-211115"/>
+            <a:ext cx="538657" cy="539249"/>
+          </a:xfrm>
+          <a:prstGeom prst="ellipse">
+            <a:avLst/>
+          </a:prstGeom>
+          <a:noFill/>
+          <a:ln w="19080">
+            <a:solidFill>
+              <a:srgbClr val="FF0000"/>
+            </a:solidFill>
+            <a:prstDash val="dash"/>
+            <a:round/>
+          </a:ln>
+        </p:spPr>
+      </p:sp>
+      <p:sp>
+        <p:nvSpPr>
+          <p:cNvPr id="2" name="Rectangle 1"/>
+          <p:cNvSpPr/>
+          <p:nvPr/>
+        </p:nvSpPr>
+        <p:spPr>
+          <a:xfrm>
+            <a:off x="1350160" y="-270000"/>
+            <a:ext cx="792088" cy="306000"/>
+          </a:xfrm>
+          <a:prstGeom prst="rect">
+            <a:avLst/>
+          </a:prstGeom>
+          <a:solidFill>
+            <a:schemeClr val="bg1"/>
+          </a:solidFill>
+          <a:ln>
+            <a:solidFill>
+              <a:schemeClr val="bg1"/>
+            </a:solidFill>
+          </a:ln>
+        </p:spPr>
+        <p:style>
+          <a:lnRef idx="2">
+            <a:schemeClr val="accent1">
+              <a:shade val="50000"/>
+            </a:schemeClr>
+          </a:lnRef>
+          <a:fillRef idx="1">
+            <a:schemeClr val="accent1"/>
+          </a:fillRef>
+          <a:effectRef idx="0">
+            <a:schemeClr val="accent1"/>
+          </a:effectRef>
+          <a:fontRef idx="minor">
+            <a:schemeClr val="lt1"/>
+          </a:fontRef>
+        </p:style>
+        <p:txBody>
+          <a:bodyPr rtlCol="0" anchor="ctr"/>
+          <a:lstStyle/>
+          <a:p>
+            <a:pPr algn="ctr"/>
+            <a:endParaRPr lang="fr-FR"/>
+          </a:p>
+        </p:txBody>
+      </p:sp>
+      <p:sp>
+        <p:nvSpPr>
+          <p:cNvPr id="23" name="ZoneTexte 22"/>
+          <p:cNvSpPr txBox="1"/>
+          <p:nvPr/>
+        </p:nvSpPr>
+        <p:spPr>
+          <a:xfrm>
+            <a:off x="990120" y="8568"/>
+            <a:ext cx="453970" cy="369332"/>
+          </a:xfrm>
+          <a:prstGeom prst="rect">
+            <a:avLst/>
+          </a:prstGeom>
+          <a:noFill/>
+        </p:spPr>
+        <p:txBody>
+          <a:bodyPr wrap="none" rtlCol="0">
+            <a:spAutoFit/>
+          </a:bodyPr>
+          <a:lstStyle/>
+          <a:p>
+            <a:r>
+              <a:rPr lang="fr-FR" dirty="0" smtClean="0">
+                <a:solidFill>
+                  <a:srgbClr val="FF0000"/>
+                </a:solidFill>
+                <a:latin typeface="Symbol" panose="05050102010706020507" pitchFamily="18" charset="2"/>
+              </a:rPr>
+              <a:t>(6)</a:t>
+            </a:r>
+            <a:endParaRPr lang="fr-FR" dirty="0">
+              <a:solidFill>
+                <a:srgbClr val="FF0000"/>
+              </a:solidFill>
+              <a:latin typeface="Symbol" panose="05050102010706020507" pitchFamily="18" charset="2"/>
+            </a:endParaRPr>
+          </a:p>
+        </p:txBody>
+      </p:sp>
+      <p:sp>
+        <p:nvSpPr>
+          <p:cNvPr id="24" name="CustomShape 2"/>
+          <p:cNvSpPr/>
+          <p:nvPr/>
+        </p:nvSpPr>
+        <p:spPr>
+          <a:xfrm>
+            <a:off x="2070240" y="4519171"/>
+            <a:ext cx="538657" cy="539249"/>
+          </a:xfrm>
+          <a:prstGeom prst="ellipse">
+            <a:avLst/>
+          </a:prstGeom>
+          <a:noFill/>
+          <a:ln w="19080">
+            <a:solidFill>
+              <a:srgbClr val="FF0000"/>
+            </a:solidFill>
+            <a:prstDash val="dash"/>
+            <a:round/>
+          </a:ln>
+        </p:spPr>
+      </p:sp>
+      <p:sp>
+        <p:nvSpPr>
+          <p:cNvPr id="25" name="ZoneTexte 24"/>
+          <p:cNvSpPr txBox="1"/>
+          <p:nvPr/>
+        </p:nvSpPr>
+        <p:spPr>
+          <a:xfrm>
+            <a:off x="1566184" y="4554364"/>
+            <a:ext cx="453970" cy="369332"/>
+          </a:xfrm>
+          <a:prstGeom prst="rect">
+            <a:avLst/>
+          </a:prstGeom>
+          <a:noFill/>
+        </p:spPr>
+        <p:txBody>
+          <a:bodyPr wrap="none" rtlCol="0">
+            <a:spAutoFit/>
+          </a:bodyPr>
+          <a:lstStyle/>
+          <a:p>
+            <a:r>
+              <a:rPr lang="fr-FR" dirty="0" smtClean="0">
+                <a:solidFill>
+                  <a:srgbClr val="FF0000"/>
+                </a:solidFill>
+                <a:latin typeface="Symbol" panose="05050102010706020507" pitchFamily="18" charset="2"/>
+              </a:rPr>
+              <a:t>(3)</a:t>
+            </a:r>
+            <a:endParaRPr lang="fr-FR" dirty="0">
+              <a:solidFill>
+                <a:srgbClr val="FF0000"/>
+              </a:solidFill>
+              <a:latin typeface="Symbol" panose="05050102010706020507" pitchFamily="18" charset="2"/>
+            </a:endParaRPr>
+          </a:p>
+        </p:txBody>
+      </p:sp>
+      <p:sp>
+        <p:nvSpPr>
+          <p:cNvPr id="26" name="Rectangle 25"/>
+          <p:cNvSpPr/>
+          <p:nvPr/>
+        </p:nvSpPr>
+        <p:spPr>
+          <a:xfrm>
+            <a:off x="2772000" y="2528848"/>
+            <a:ext cx="1000800" cy="612000"/>
+          </a:xfrm>
+          <a:prstGeom prst="rect">
+            <a:avLst/>
+          </a:prstGeom>
+        </p:spPr>
+        <p:style>
+          <a:lnRef idx="2">
+            <a:schemeClr val="dk1">
+              <a:shade val="50000"/>
+            </a:schemeClr>
+          </a:lnRef>
+          <a:fillRef idx="1">
+            <a:schemeClr val="dk1"/>
+          </a:fillRef>
+          <a:effectRef idx="0">
+            <a:schemeClr val="dk1"/>
+          </a:effectRef>
+          <a:fontRef idx="minor">
+            <a:schemeClr val="lt1"/>
+          </a:fontRef>
+        </p:style>
+        <p:txBody>
+          <a:bodyPr rtlCol="0" anchor="ctr"/>
+          <a:lstStyle/>
+          <a:p>
+            <a:pPr algn="ctr"/>
+            <a:endParaRPr lang="fr-FR"/>
+          </a:p>
+        </p:txBody>
+      </p:sp>
+      <p:sp>
+        <p:nvSpPr>
+          <p:cNvPr id="17" name="ZoneTexte 16"/>
+          <p:cNvSpPr txBox="1"/>
+          <p:nvPr/>
+        </p:nvSpPr>
+        <p:spPr>
+          <a:xfrm>
+            <a:off x="2646304" y="1530028"/>
+            <a:ext cx="453970" cy="369332"/>
+          </a:xfrm>
+          <a:prstGeom prst="rect">
+            <a:avLst/>
+          </a:prstGeom>
+          <a:noFill/>
+        </p:spPr>
+        <p:txBody>
+          <a:bodyPr wrap="none" rtlCol="0">
+            <a:spAutoFit/>
+          </a:bodyPr>
+          <a:lstStyle/>
+          <a:p>
+            <a:r>
+              <a:rPr lang="fr-FR" dirty="0" smtClean="0">
+                <a:solidFill>
+                  <a:srgbClr val="FF0000"/>
+                </a:solidFill>
+                <a:latin typeface="Symbol" panose="05050102010706020507" pitchFamily="18" charset="2"/>
+              </a:rPr>
+              <a:t>(2)</a:t>
+            </a:r>
+            <a:endParaRPr lang="fr-FR" dirty="0">
+              <a:solidFill>
+                <a:srgbClr val="FF0000"/>
+              </a:solidFill>
+              <a:latin typeface="Symbol" panose="05050102010706020507" pitchFamily="18" charset="2"/>
+            </a:endParaRPr>
+          </a:p>
+        </p:txBody>
+      </p:sp>
+      <p:sp>
+        <p:nvSpPr>
+          <p:cNvPr id="27" name="Rectangle 26"/>
+          <p:cNvSpPr/>
+          <p:nvPr/>
+        </p:nvSpPr>
+        <p:spPr>
+          <a:xfrm>
+            <a:off x="2873289" y="2934252"/>
+            <a:ext cx="899511" cy="612000"/>
+          </a:xfrm>
+          <a:prstGeom prst="rect">
+            <a:avLst/>
+          </a:prstGeom>
+        </p:spPr>
+        <p:style>
+          <a:lnRef idx="2">
+            <a:schemeClr val="dk1">
+              <a:shade val="50000"/>
+            </a:schemeClr>
+          </a:lnRef>
+          <a:fillRef idx="1">
+            <a:schemeClr val="dk1"/>
+          </a:fillRef>
+          <a:effectRef idx="0">
+            <a:schemeClr val="dk1"/>
+          </a:effectRef>
+          <a:fontRef idx="minor">
+            <a:schemeClr val="lt1"/>
+          </a:fontRef>
+        </p:style>
+        <p:txBody>
+          <a:bodyPr rtlCol="0" anchor="ctr"/>
+          <a:lstStyle/>
+          <a:p>
+            <a:pPr algn="ctr"/>
+            <a:endParaRPr lang="fr-FR"/>
+          </a:p>
+        </p:txBody>
+      </p:sp>
+      <p:sp>
+        <p:nvSpPr>
+          <p:cNvPr id="19" name="ZoneTexte 18"/>
+          <p:cNvSpPr txBox="1"/>
+          <p:nvPr/>
+        </p:nvSpPr>
+        <p:spPr>
+          <a:xfrm>
+            <a:off x="2745421" y="2842368"/>
+            <a:ext cx="453970" cy="369332"/>
+          </a:xfrm>
+          <a:prstGeom prst="rect">
+            <a:avLst/>
+          </a:prstGeom>
+          <a:noFill/>
+        </p:spPr>
+        <p:txBody>
+          <a:bodyPr wrap="none" rtlCol="0">
+            <a:spAutoFit/>
+          </a:bodyPr>
+          <a:lstStyle/>
+          <a:p>
+            <a:r>
+              <a:rPr lang="fr-FR" dirty="0" smtClean="0">
+                <a:solidFill>
+                  <a:srgbClr val="FF0000"/>
+                </a:solidFill>
+                <a:latin typeface="Symbol" panose="05050102010706020507" pitchFamily="18" charset="2"/>
+              </a:rPr>
+              <a:t>(1)</a:t>
+            </a:r>
+            <a:endParaRPr lang="fr-FR" dirty="0">
+              <a:solidFill>
+                <a:srgbClr val="FF0000"/>
+              </a:solidFill>
+              <a:latin typeface="Symbol" panose="05050102010706020507" pitchFamily="18" charset="2"/>
+            </a:endParaRPr>
+          </a:p>
+        </p:txBody>
+      </p:sp>
+      <p:cxnSp>
+        <p:nvCxnSpPr>
+          <p:cNvPr id="5" name="Connecteur droit 4"/>
+          <p:cNvCxnSpPr/>
+          <p:nvPr/>
+        </p:nvCxnSpPr>
+        <p:spPr>
+          <a:xfrm>
+            <a:off x="2826544" y="3211200"/>
+            <a:ext cx="961200" cy="0"/>
+          </a:xfrm>
+          <a:prstGeom prst="line">
+            <a:avLst/>
+          </a:prstGeom>
+          <a:ln>
+            <a:solidFill>
+              <a:schemeClr val="bg1"/>
+            </a:solidFill>
+          </a:ln>
+        </p:spPr>
+        <p:style>
+          <a:lnRef idx="1">
+            <a:schemeClr val="accent1"/>
+          </a:lnRef>
+          <a:fillRef idx="0">
+            <a:schemeClr val="accent1"/>
+          </a:fillRef>
+          <a:effectRef idx="0">
+            <a:schemeClr val="accent1"/>
+          </a:effectRef>
+          <a:fontRef idx="minor">
+            <a:schemeClr val="tx1"/>
+          </a:fontRef>
+        </p:style>
+      </p:cxnSp>
     </p:spTree>
     <p:extLst>
       <p:ext uri="{BB962C8B-B14F-4D97-AF65-F5344CB8AC3E}">

</xml_diff>

<commit_message>
Chap04: Some correction done. To be proofread and check Fig10 (Antiferro)
</commit_message>
<xml_diff>
--- a/04-CrMagOpt/Pictures/Antiferro-Cr.pptx
+++ b/04-CrMagOpt/Pictures/Antiferro-Cr.pptx
@@ -4,10 +4,13 @@
   <p:sldMasterIdLst>
     <p:sldMasterId id="2147483648" r:id="rId1"/>
   </p:sldMasterIdLst>
+  <p:notesMasterIdLst>
+    <p:notesMasterId r:id="rId3"/>
+  </p:notesMasterIdLst>
   <p:sldIdLst>
     <p:sldId id="256" r:id="rId2"/>
   </p:sldIdLst>
-  <p:sldSz cx="5653088" cy="6948488"/>
+  <p:sldSz cx="8208963" cy="6948488"/>
   <p:notesSz cx="6858000" cy="9144000"/>
   <p:defaultTextStyle>
     <a:defPPr>
@@ -107,6 +110,445 @@
 </p:presentation>
 </file>
 
+<file path=ppt/notesMasters/notesMaster1.xml><?xml version="1.0" encoding="utf-8"?>
+<p:notesMaster xmlns:a="http://schemas.openxmlformats.org/drawingml/2006/main" xmlns:r="http://schemas.openxmlformats.org/officeDocument/2006/relationships" xmlns:p="http://schemas.openxmlformats.org/presentationml/2006/main">
+  <p:cSld>
+    <p:bg>
+      <p:bgRef idx="1001">
+        <a:schemeClr val="bg1"/>
+      </p:bgRef>
+    </p:bg>
+    <p:spTree>
+      <p:nvGrpSpPr>
+        <p:cNvPr id="1" name=""/>
+        <p:cNvGrpSpPr/>
+        <p:nvPr/>
+      </p:nvGrpSpPr>
+      <p:grpSpPr>
+        <a:xfrm>
+          <a:off x="0" y="0"/>
+          <a:ext cx="0" cy="0"/>
+          <a:chOff x="0" y="0"/>
+          <a:chExt cx="0" cy="0"/>
+        </a:xfrm>
+      </p:grpSpPr>
+      <p:sp>
+        <p:nvSpPr>
+          <p:cNvPr id="2" name="Espace réservé de l'en-tête 1"/>
+          <p:cNvSpPr>
+            <a:spLocks noGrp="1"/>
+          </p:cNvSpPr>
+          <p:nvPr>
+            <p:ph type="hdr" sz="quarter"/>
+          </p:nvPr>
+        </p:nvSpPr>
+        <p:spPr>
+          <a:xfrm>
+            <a:off x="0" y="0"/>
+            <a:ext cx="2971800" cy="457200"/>
+          </a:xfrm>
+          <a:prstGeom prst="rect">
+            <a:avLst/>
+          </a:prstGeom>
+        </p:spPr>
+        <p:txBody>
+          <a:bodyPr vert="horz" lIns="91440" tIns="45720" rIns="91440" bIns="45720" rtlCol="0"/>
+          <a:lstStyle>
+            <a:lvl1pPr algn="l">
+              <a:defRPr sz="1200"/>
+            </a:lvl1pPr>
+          </a:lstStyle>
+          <a:p>
+            <a:endParaRPr lang="fr-FR"/>
+          </a:p>
+        </p:txBody>
+      </p:sp>
+      <p:sp>
+        <p:nvSpPr>
+          <p:cNvPr id="3" name="Espace réservé de la date 2"/>
+          <p:cNvSpPr>
+            <a:spLocks noGrp="1"/>
+          </p:cNvSpPr>
+          <p:nvPr>
+            <p:ph type="dt" idx="1"/>
+          </p:nvPr>
+        </p:nvSpPr>
+        <p:spPr>
+          <a:xfrm>
+            <a:off x="3884613" y="0"/>
+            <a:ext cx="2971800" cy="457200"/>
+          </a:xfrm>
+          <a:prstGeom prst="rect">
+            <a:avLst/>
+          </a:prstGeom>
+        </p:spPr>
+        <p:txBody>
+          <a:bodyPr vert="horz" lIns="91440" tIns="45720" rIns="91440" bIns="45720" rtlCol="0"/>
+          <a:lstStyle>
+            <a:lvl1pPr algn="r">
+              <a:defRPr sz="1200"/>
+            </a:lvl1pPr>
+          </a:lstStyle>
+          <a:p>
+            <a:fld id="{941132E1-805D-4665-B78D-1BCC811E5833}" type="datetimeFigureOut">
+              <a:rPr lang="fr-FR" smtClean="0"/>
+              <a:t>18/08/2017</a:t>
+            </a:fld>
+            <a:endParaRPr lang="fr-FR"/>
+          </a:p>
+        </p:txBody>
+      </p:sp>
+      <p:sp>
+        <p:nvSpPr>
+          <p:cNvPr id="4" name="Espace réservé de l'image des diapositives 3"/>
+          <p:cNvSpPr>
+            <a:spLocks noGrp="1" noRot="1" noChangeAspect="1"/>
+          </p:cNvSpPr>
+          <p:nvPr>
+            <p:ph type="sldImg" idx="2"/>
+          </p:nvPr>
+        </p:nvSpPr>
+        <p:spPr>
+          <a:xfrm>
+            <a:off x="1403350" y="685800"/>
+            <a:ext cx="4051300" cy="3429000"/>
+          </a:xfrm>
+          <a:prstGeom prst="rect">
+            <a:avLst/>
+          </a:prstGeom>
+          <a:noFill/>
+          <a:ln w="12700">
+            <a:solidFill>
+              <a:prstClr val="black"/>
+            </a:solidFill>
+          </a:ln>
+        </p:spPr>
+        <p:txBody>
+          <a:bodyPr vert="horz" lIns="91440" tIns="45720" rIns="91440" bIns="45720" rtlCol="0" anchor="ctr"/>
+          <a:lstStyle/>
+          <a:p>
+            <a:endParaRPr lang="fr-FR"/>
+          </a:p>
+        </p:txBody>
+      </p:sp>
+      <p:sp>
+        <p:nvSpPr>
+          <p:cNvPr id="5" name="Espace réservé des commentaires 4"/>
+          <p:cNvSpPr>
+            <a:spLocks noGrp="1"/>
+          </p:cNvSpPr>
+          <p:nvPr>
+            <p:ph type="body" sz="quarter" idx="3"/>
+          </p:nvPr>
+        </p:nvSpPr>
+        <p:spPr>
+          <a:xfrm>
+            <a:off x="685800" y="4343400"/>
+            <a:ext cx="5486400" cy="4114800"/>
+          </a:xfrm>
+          <a:prstGeom prst="rect">
+            <a:avLst/>
+          </a:prstGeom>
+        </p:spPr>
+        <p:txBody>
+          <a:bodyPr vert="horz" lIns="91440" tIns="45720" rIns="91440" bIns="45720" rtlCol="0"/>
+          <a:lstStyle/>
+          <a:p>
+            <a:pPr lvl="0"/>
+            <a:r>
+              <a:rPr lang="fr-FR" smtClean="0"/>
+              <a:t>Modifiez les styles du texte du masque</a:t>
+            </a:r>
+          </a:p>
+          <a:p>
+            <a:pPr lvl="1"/>
+            <a:r>
+              <a:rPr lang="fr-FR" smtClean="0"/>
+              <a:t>Deuxième niveau</a:t>
+            </a:r>
+          </a:p>
+          <a:p>
+            <a:pPr lvl="2"/>
+            <a:r>
+              <a:rPr lang="fr-FR" smtClean="0"/>
+              <a:t>Troisième niveau</a:t>
+            </a:r>
+          </a:p>
+          <a:p>
+            <a:pPr lvl="3"/>
+            <a:r>
+              <a:rPr lang="fr-FR" smtClean="0"/>
+              <a:t>Quatrième niveau</a:t>
+            </a:r>
+          </a:p>
+          <a:p>
+            <a:pPr lvl="4"/>
+            <a:r>
+              <a:rPr lang="fr-FR" smtClean="0"/>
+              <a:t>Cinquième niveau</a:t>
+            </a:r>
+            <a:endParaRPr lang="fr-FR"/>
+          </a:p>
+        </p:txBody>
+      </p:sp>
+      <p:sp>
+        <p:nvSpPr>
+          <p:cNvPr id="6" name="Espace réservé du pied de page 5"/>
+          <p:cNvSpPr>
+            <a:spLocks noGrp="1"/>
+          </p:cNvSpPr>
+          <p:nvPr>
+            <p:ph type="ftr" sz="quarter" idx="4"/>
+          </p:nvPr>
+        </p:nvSpPr>
+        <p:spPr>
+          <a:xfrm>
+            <a:off x="0" y="8685213"/>
+            <a:ext cx="2971800" cy="457200"/>
+          </a:xfrm>
+          <a:prstGeom prst="rect">
+            <a:avLst/>
+          </a:prstGeom>
+        </p:spPr>
+        <p:txBody>
+          <a:bodyPr vert="horz" lIns="91440" tIns="45720" rIns="91440" bIns="45720" rtlCol="0" anchor="b"/>
+          <a:lstStyle>
+            <a:lvl1pPr algn="l">
+              <a:defRPr sz="1200"/>
+            </a:lvl1pPr>
+          </a:lstStyle>
+          <a:p>
+            <a:endParaRPr lang="fr-FR"/>
+          </a:p>
+        </p:txBody>
+      </p:sp>
+      <p:sp>
+        <p:nvSpPr>
+          <p:cNvPr id="7" name="Espace réservé du numéro de diapositive 6"/>
+          <p:cNvSpPr>
+            <a:spLocks noGrp="1"/>
+          </p:cNvSpPr>
+          <p:nvPr>
+            <p:ph type="sldNum" sz="quarter" idx="5"/>
+          </p:nvPr>
+        </p:nvSpPr>
+        <p:spPr>
+          <a:xfrm>
+            <a:off x="3884613" y="8685213"/>
+            <a:ext cx="2971800" cy="457200"/>
+          </a:xfrm>
+          <a:prstGeom prst="rect">
+            <a:avLst/>
+          </a:prstGeom>
+        </p:spPr>
+        <p:txBody>
+          <a:bodyPr vert="horz" lIns="91440" tIns="45720" rIns="91440" bIns="45720" rtlCol="0" anchor="b"/>
+          <a:lstStyle>
+            <a:lvl1pPr algn="r">
+              <a:defRPr sz="1200"/>
+            </a:lvl1pPr>
+          </a:lstStyle>
+          <a:p>
+            <a:fld id="{5017429B-0ED3-4856-9976-6ECFDA905346}" type="slidenum">
+              <a:rPr lang="fr-FR" smtClean="0"/>
+              <a:t>‹N°›</a:t>
+            </a:fld>
+            <a:endParaRPr lang="fr-FR"/>
+          </a:p>
+        </p:txBody>
+      </p:sp>
+    </p:spTree>
+    <p:extLst>
+      <p:ext uri="{BB962C8B-B14F-4D97-AF65-F5344CB8AC3E}">
+        <p14:creationId xmlns:p14="http://schemas.microsoft.com/office/powerpoint/2010/main" val="3344579521"/>
+      </p:ext>
+    </p:extLst>
+  </p:cSld>
+  <p:clrMap bg1="lt1" tx1="dk1" bg2="lt2" tx2="dk2" accent1="accent1" accent2="accent2" accent3="accent3" accent4="accent4" accent5="accent5" accent6="accent6" hlink="hlink" folHlink="folHlink"/>
+  <p:notesStyle>
+    <a:lvl1pPr marL="0" algn="l" defTabSz="914400" rtl="0" eaLnBrk="1" latinLnBrk="0" hangingPunct="1">
+      <a:defRPr sz="1200" kern="1200">
+        <a:solidFill>
+          <a:schemeClr val="tx1"/>
+        </a:solidFill>
+        <a:latin typeface="+mn-lt"/>
+        <a:ea typeface="+mn-ea"/>
+        <a:cs typeface="+mn-cs"/>
+      </a:defRPr>
+    </a:lvl1pPr>
+    <a:lvl2pPr marL="457200" algn="l" defTabSz="914400" rtl="0" eaLnBrk="1" latinLnBrk="0" hangingPunct="1">
+      <a:defRPr sz="1200" kern="1200">
+        <a:solidFill>
+          <a:schemeClr val="tx1"/>
+        </a:solidFill>
+        <a:latin typeface="+mn-lt"/>
+        <a:ea typeface="+mn-ea"/>
+        <a:cs typeface="+mn-cs"/>
+      </a:defRPr>
+    </a:lvl2pPr>
+    <a:lvl3pPr marL="914400" algn="l" defTabSz="914400" rtl="0" eaLnBrk="1" latinLnBrk="0" hangingPunct="1">
+      <a:defRPr sz="1200" kern="1200">
+        <a:solidFill>
+          <a:schemeClr val="tx1"/>
+        </a:solidFill>
+        <a:latin typeface="+mn-lt"/>
+        <a:ea typeface="+mn-ea"/>
+        <a:cs typeface="+mn-cs"/>
+      </a:defRPr>
+    </a:lvl3pPr>
+    <a:lvl4pPr marL="1371600" algn="l" defTabSz="914400" rtl="0" eaLnBrk="1" latinLnBrk="0" hangingPunct="1">
+      <a:defRPr sz="1200" kern="1200">
+        <a:solidFill>
+          <a:schemeClr val="tx1"/>
+        </a:solidFill>
+        <a:latin typeface="+mn-lt"/>
+        <a:ea typeface="+mn-ea"/>
+        <a:cs typeface="+mn-cs"/>
+      </a:defRPr>
+    </a:lvl4pPr>
+    <a:lvl5pPr marL="1828800" algn="l" defTabSz="914400" rtl="0" eaLnBrk="1" latinLnBrk="0" hangingPunct="1">
+      <a:defRPr sz="1200" kern="1200">
+        <a:solidFill>
+          <a:schemeClr val="tx1"/>
+        </a:solidFill>
+        <a:latin typeface="+mn-lt"/>
+        <a:ea typeface="+mn-ea"/>
+        <a:cs typeface="+mn-cs"/>
+      </a:defRPr>
+    </a:lvl5pPr>
+    <a:lvl6pPr marL="2286000" algn="l" defTabSz="914400" rtl="0" eaLnBrk="1" latinLnBrk="0" hangingPunct="1">
+      <a:defRPr sz="1200" kern="1200">
+        <a:solidFill>
+          <a:schemeClr val="tx1"/>
+        </a:solidFill>
+        <a:latin typeface="+mn-lt"/>
+        <a:ea typeface="+mn-ea"/>
+        <a:cs typeface="+mn-cs"/>
+      </a:defRPr>
+    </a:lvl6pPr>
+    <a:lvl7pPr marL="2743200" algn="l" defTabSz="914400" rtl="0" eaLnBrk="1" latinLnBrk="0" hangingPunct="1">
+      <a:defRPr sz="1200" kern="1200">
+        <a:solidFill>
+          <a:schemeClr val="tx1"/>
+        </a:solidFill>
+        <a:latin typeface="+mn-lt"/>
+        <a:ea typeface="+mn-ea"/>
+        <a:cs typeface="+mn-cs"/>
+      </a:defRPr>
+    </a:lvl7pPr>
+    <a:lvl8pPr marL="3200400" algn="l" defTabSz="914400" rtl="0" eaLnBrk="1" latinLnBrk="0" hangingPunct="1">
+      <a:defRPr sz="1200" kern="1200">
+        <a:solidFill>
+          <a:schemeClr val="tx1"/>
+        </a:solidFill>
+        <a:latin typeface="+mn-lt"/>
+        <a:ea typeface="+mn-ea"/>
+        <a:cs typeface="+mn-cs"/>
+      </a:defRPr>
+    </a:lvl8pPr>
+    <a:lvl9pPr marL="3657600" algn="l" defTabSz="914400" rtl="0" eaLnBrk="1" latinLnBrk="0" hangingPunct="1">
+      <a:defRPr sz="1200" kern="1200">
+        <a:solidFill>
+          <a:schemeClr val="tx1"/>
+        </a:solidFill>
+        <a:latin typeface="+mn-lt"/>
+        <a:ea typeface="+mn-ea"/>
+        <a:cs typeface="+mn-cs"/>
+      </a:defRPr>
+    </a:lvl9pPr>
+  </p:notesStyle>
+</p:notesMaster>
+</file>
+
+<file path=ppt/notesSlides/notesSlide1.xml><?xml version="1.0" encoding="utf-8"?>
+<p:notes xmlns:a="http://schemas.openxmlformats.org/drawingml/2006/main" xmlns:r="http://schemas.openxmlformats.org/officeDocument/2006/relationships" xmlns:p="http://schemas.openxmlformats.org/presentationml/2006/main">
+  <p:cSld>
+    <p:spTree>
+      <p:nvGrpSpPr>
+        <p:cNvPr id="1" name=""/>
+        <p:cNvGrpSpPr/>
+        <p:nvPr/>
+      </p:nvGrpSpPr>
+      <p:grpSpPr>
+        <a:xfrm>
+          <a:off x="0" y="0"/>
+          <a:ext cx="0" cy="0"/>
+          <a:chOff x="0" y="0"/>
+          <a:chExt cx="0" cy="0"/>
+        </a:xfrm>
+      </p:grpSpPr>
+      <p:sp>
+        <p:nvSpPr>
+          <p:cNvPr id="2" name="Espace réservé de l'image des diapositives 1"/>
+          <p:cNvSpPr>
+            <a:spLocks noGrp="1" noRot="1" noChangeAspect="1"/>
+          </p:cNvSpPr>
+          <p:nvPr>
+            <p:ph type="sldImg"/>
+          </p:nvPr>
+        </p:nvSpPr>
+        <p:spPr>
+          <a:xfrm>
+            <a:off x="1403350" y="685800"/>
+            <a:ext cx="4051300" cy="3429000"/>
+          </a:xfrm>
+        </p:spPr>
+      </p:sp>
+      <p:sp>
+        <p:nvSpPr>
+          <p:cNvPr id="3" name="Espace réservé des commentaires 2"/>
+          <p:cNvSpPr>
+            <a:spLocks noGrp="1"/>
+          </p:cNvSpPr>
+          <p:nvPr>
+            <p:ph type="body" idx="1"/>
+          </p:nvPr>
+        </p:nvSpPr>
+        <p:spPr/>
+        <p:txBody>
+          <a:bodyPr/>
+          <a:lstStyle/>
+          <a:p>
+            <a:endParaRPr lang="fr-FR" dirty="0"/>
+          </a:p>
+        </p:txBody>
+      </p:sp>
+      <p:sp>
+        <p:nvSpPr>
+          <p:cNvPr id="4" name="Espace réservé du numéro de diapositive 3"/>
+          <p:cNvSpPr>
+            <a:spLocks noGrp="1"/>
+          </p:cNvSpPr>
+          <p:nvPr>
+            <p:ph type="sldNum" sz="quarter" idx="10"/>
+          </p:nvPr>
+        </p:nvSpPr>
+        <p:spPr/>
+        <p:txBody>
+          <a:bodyPr/>
+          <a:lstStyle/>
+          <a:p>
+            <a:fld id="{5017429B-0ED3-4856-9976-6ECFDA905346}" type="slidenum">
+              <a:rPr lang="fr-FR" smtClean="0"/>
+              <a:t>1</a:t>
+            </a:fld>
+            <a:endParaRPr lang="fr-FR"/>
+          </a:p>
+        </p:txBody>
+      </p:sp>
+    </p:spTree>
+    <p:extLst>
+      <p:ext uri="{BB962C8B-B14F-4D97-AF65-F5344CB8AC3E}">
+        <p14:creationId xmlns:p14="http://schemas.microsoft.com/office/powerpoint/2010/main" val="1683438716"/>
+      </p:ext>
+    </p:extLst>
+  </p:cSld>
+  <p:clrMapOvr>
+    <a:masterClrMapping/>
+  </p:clrMapOvr>
+</p:notes>
+</file>
+
 <file path=ppt/slideLayouts/slideLayout1.xml><?xml version="1.0" encoding="utf-8"?>
 <p:sldLayout xmlns:a="http://schemas.openxmlformats.org/drawingml/2006/main" xmlns:r="http://schemas.openxmlformats.org/officeDocument/2006/relationships" xmlns:p="http://schemas.openxmlformats.org/presentationml/2006/main" type="title" preserve="1">
   <p:cSld name="Diapositive de titre">
@@ -136,8 +578,8 @@
         </p:nvSpPr>
         <p:spPr>
           <a:xfrm>
-            <a:off x="423982" y="2158541"/>
-            <a:ext cx="4805126" cy="1489421"/>
+            <a:off x="615674" y="2158545"/>
+            <a:ext cx="6977622" cy="1489421"/>
           </a:xfrm>
         </p:spPr>
         <p:txBody>
@@ -164,8 +606,8 @@
         </p:nvSpPr>
         <p:spPr>
           <a:xfrm>
-            <a:off x="847965" y="3937481"/>
-            <a:ext cx="3957162" cy="1775725"/>
+            <a:off x="1231349" y="3937485"/>
+            <a:ext cx="5746275" cy="1775725"/>
           </a:xfrm>
         </p:spPr>
         <p:txBody>
@@ -288,7 +730,7 @@
           <a:p>
             <a:fld id="{A26ED350-09DA-47B2-96B1-414F1C332C84}" type="datetimeFigureOut">
               <a:rPr lang="fr-FR" smtClean="0"/>
-              <a:t>20/07/2017</a:t>
+              <a:t>18/08/2017</a:t>
             </a:fld>
             <a:endParaRPr lang="fr-FR"/>
           </a:p>
@@ -458,7 +900,7 @@
           <a:p>
             <a:fld id="{A26ED350-09DA-47B2-96B1-414F1C332C84}" type="datetimeFigureOut">
               <a:rPr lang="fr-FR" smtClean="0"/>
-              <a:t>20/07/2017</a:t>
+              <a:t>18/08/2017</a:t>
             </a:fld>
             <a:endParaRPr lang="fr-FR"/>
           </a:p>
@@ -548,8 +990,8 @@
         </p:nvSpPr>
         <p:spPr>
           <a:xfrm>
-            <a:off x="2421211" y="281479"/>
-            <a:ext cx="750801" cy="6007546"/>
+            <a:off x="3515891" y="281479"/>
+            <a:ext cx="1090254" cy="6007546"/>
           </a:xfrm>
         </p:spPr>
         <p:txBody>
@@ -576,8 +1018,8 @@
         </p:nvSpPr>
         <p:spPr>
           <a:xfrm>
-            <a:off x="166847" y="281479"/>
-            <a:ext cx="2160147" cy="6007546"/>
+            <a:off x="242283" y="281479"/>
+            <a:ext cx="3136794" cy="6007546"/>
           </a:xfrm>
         </p:spPr>
         <p:txBody>
@@ -638,7 +1080,7 @@
           <a:p>
             <a:fld id="{A26ED350-09DA-47B2-96B1-414F1C332C84}" type="datetimeFigureOut">
               <a:rPr lang="fr-FR" smtClean="0"/>
-              <a:t>20/07/2017</a:t>
+              <a:t>18/08/2017</a:t>
             </a:fld>
             <a:endParaRPr lang="fr-FR"/>
           </a:p>
@@ -808,7 +1250,7 @@
           <a:p>
             <a:fld id="{A26ED350-09DA-47B2-96B1-414F1C332C84}" type="datetimeFigureOut">
               <a:rPr lang="fr-FR" smtClean="0"/>
-              <a:t>20/07/2017</a:t>
+              <a:t>18/08/2017</a:t>
             </a:fld>
             <a:endParaRPr lang="fr-FR"/>
           </a:p>
@@ -898,8 +1340,8 @@
         </p:nvSpPr>
         <p:spPr>
           <a:xfrm>
-            <a:off x="446555" y="4465052"/>
-            <a:ext cx="4805126" cy="1380047"/>
+            <a:off x="648452" y="4465056"/>
+            <a:ext cx="6977622" cy="1380047"/>
           </a:xfrm>
         </p:spPr>
         <p:txBody>
@@ -930,8 +1372,8 @@
         </p:nvSpPr>
         <p:spPr>
           <a:xfrm>
-            <a:off x="446555" y="2945071"/>
-            <a:ext cx="4805126" cy="1519981"/>
+            <a:off x="648452" y="2945075"/>
+            <a:ext cx="6977622" cy="1519981"/>
           </a:xfrm>
         </p:spPr>
         <p:txBody>
@@ -1054,7 +1496,7 @@
           <a:p>
             <a:fld id="{A26ED350-09DA-47B2-96B1-414F1C332C84}" type="datetimeFigureOut">
               <a:rPr lang="fr-FR" smtClean="0"/>
-              <a:t>20/07/2017</a:t>
+              <a:t>18/08/2017</a:t>
             </a:fld>
             <a:endParaRPr lang="fr-FR"/>
           </a:p>
@@ -1167,8 +1609,8 @@
         </p:nvSpPr>
         <p:spPr>
           <a:xfrm>
-            <a:off x="166846" y="1642230"/>
-            <a:ext cx="1455474" cy="4646801"/>
+            <a:off x="242281" y="1642234"/>
+            <a:ext cx="2113523" cy="4646801"/>
           </a:xfrm>
         </p:spPr>
         <p:txBody>
@@ -1252,8 +1694,8 @@
         </p:nvSpPr>
         <p:spPr>
           <a:xfrm>
-            <a:off x="1716539" y="1642230"/>
-            <a:ext cx="1455473" cy="4646801"/>
+            <a:off x="2492624" y="1642234"/>
+            <a:ext cx="2113521" cy="4646801"/>
           </a:xfrm>
         </p:spPr>
         <p:txBody>
@@ -1342,7 +1784,7 @@
           <a:p>
             <a:fld id="{A26ED350-09DA-47B2-96B1-414F1C332C84}" type="datetimeFigureOut">
               <a:rPr lang="fr-FR" smtClean="0"/>
-              <a:t>20/07/2017</a:t>
+              <a:t>18/08/2017</a:t>
             </a:fld>
             <a:endParaRPr lang="fr-FR"/>
           </a:p>
@@ -1432,8 +1874,8 @@
         </p:nvSpPr>
         <p:spPr>
           <a:xfrm>
-            <a:off x="282655" y="278267"/>
-            <a:ext cx="5087780" cy="1158081"/>
+            <a:off x="410450" y="278271"/>
+            <a:ext cx="7388068" cy="1158081"/>
           </a:xfrm>
         </p:spPr>
         <p:txBody>
@@ -1464,8 +1906,8 @@
         </p:nvSpPr>
         <p:spPr>
           <a:xfrm>
-            <a:off x="282656" y="1555368"/>
-            <a:ext cx="2497763" cy="648203"/>
+            <a:off x="410453" y="1555368"/>
+            <a:ext cx="3627052" cy="648203"/>
           </a:xfrm>
         </p:spPr>
         <p:txBody>
@@ -1529,8 +1971,8 @@
         </p:nvSpPr>
         <p:spPr>
           <a:xfrm>
-            <a:off x="282656" y="2203577"/>
-            <a:ext cx="2497763" cy="4003423"/>
+            <a:off x="410453" y="2203581"/>
+            <a:ext cx="3627052" cy="4003423"/>
           </a:xfrm>
         </p:spPr>
         <p:txBody>
@@ -1614,8 +2056,8 @@
         </p:nvSpPr>
         <p:spPr>
           <a:xfrm>
-            <a:off x="2871693" y="1555368"/>
-            <a:ext cx="2498742" cy="648203"/>
+            <a:off x="4170043" y="1555368"/>
+            <a:ext cx="3628474" cy="648203"/>
           </a:xfrm>
         </p:spPr>
         <p:txBody>
@@ -1679,8 +2121,8 @@
         </p:nvSpPr>
         <p:spPr>
           <a:xfrm>
-            <a:off x="2871693" y="2203577"/>
-            <a:ext cx="2498742" cy="4003423"/>
+            <a:off x="4170043" y="2203581"/>
+            <a:ext cx="3628474" cy="4003423"/>
           </a:xfrm>
         </p:spPr>
         <p:txBody>
@@ -1769,7 +2211,7 @@
           <a:p>
             <a:fld id="{A26ED350-09DA-47B2-96B1-414F1C332C84}" type="datetimeFigureOut">
               <a:rPr lang="fr-FR" smtClean="0"/>
-              <a:t>20/07/2017</a:t>
+              <a:t>18/08/2017</a:t>
             </a:fld>
             <a:endParaRPr lang="fr-FR"/>
           </a:p>
@@ -1887,7 +2329,7 @@
           <a:p>
             <a:fld id="{A26ED350-09DA-47B2-96B1-414F1C332C84}" type="datetimeFigureOut">
               <a:rPr lang="fr-FR" smtClean="0"/>
-              <a:t>20/07/2017</a:t>
+              <a:t>18/08/2017</a:t>
             </a:fld>
             <a:endParaRPr lang="fr-FR"/>
           </a:p>
@@ -1982,7 +2424,7 @@
           <a:p>
             <a:fld id="{A26ED350-09DA-47B2-96B1-414F1C332C84}" type="datetimeFigureOut">
               <a:rPr lang="fr-FR" smtClean="0"/>
-              <a:t>20/07/2017</a:t>
+              <a:t>18/08/2017</a:t>
             </a:fld>
             <a:endParaRPr lang="fr-FR"/>
           </a:p>
@@ -2072,8 +2514,8 @@
         </p:nvSpPr>
         <p:spPr>
           <a:xfrm>
-            <a:off x="282656" y="276658"/>
-            <a:ext cx="1859827" cy="1177383"/>
+            <a:off x="410452" y="276662"/>
+            <a:ext cx="2700692" cy="1177383"/>
           </a:xfrm>
         </p:spPr>
         <p:txBody>
@@ -2104,8 +2546,8 @@
         </p:nvSpPr>
         <p:spPr>
           <a:xfrm>
-            <a:off x="2210202" y="276653"/>
-            <a:ext cx="3160233" cy="5930342"/>
+            <a:off x="3209480" y="276653"/>
+            <a:ext cx="4589039" cy="5930342"/>
           </a:xfrm>
         </p:spPr>
         <p:txBody>
@@ -2189,8 +2631,8 @@
         </p:nvSpPr>
         <p:spPr>
           <a:xfrm>
-            <a:off x="282656" y="1454041"/>
-            <a:ext cx="1859827" cy="4752959"/>
+            <a:off x="410452" y="1454045"/>
+            <a:ext cx="2700692" cy="4752959"/>
           </a:xfrm>
         </p:spPr>
         <p:txBody>
@@ -2259,7 +2701,7 @@
           <a:p>
             <a:fld id="{A26ED350-09DA-47B2-96B1-414F1C332C84}" type="datetimeFigureOut">
               <a:rPr lang="fr-FR" smtClean="0"/>
-              <a:t>20/07/2017</a:t>
+              <a:t>18/08/2017</a:t>
             </a:fld>
             <a:endParaRPr lang="fr-FR"/>
           </a:p>
@@ -2349,8 +2791,8 @@
         </p:nvSpPr>
         <p:spPr>
           <a:xfrm>
-            <a:off x="1108046" y="4863942"/>
-            <a:ext cx="3391853" cy="574216"/>
+            <a:off x="1609017" y="4863942"/>
+            <a:ext cx="4925378" cy="574216"/>
           </a:xfrm>
         </p:spPr>
         <p:txBody>
@@ -2381,8 +2823,8 @@
         </p:nvSpPr>
         <p:spPr>
           <a:xfrm>
-            <a:off x="1108046" y="620865"/>
-            <a:ext cx="3391853" cy="4169093"/>
+            <a:off x="1609017" y="620869"/>
+            <a:ext cx="4925378" cy="4169093"/>
           </a:xfrm>
         </p:spPr>
         <p:txBody>
@@ -2442,8 +2884,8 @@
         </p:nvSpPr>
         <p:spPr>
           <a:xfrm>
-            <a:off x="1108046" y="5438157"/>
-            <a:ext cx="3391853" cy="815482"/>
+            <a:off x="1609017" y="5438157"/>
+            <a:ext cx="4925378" cy="815482"/>
           </a:xfrm>
         </p:spPr>
         <p:txBody>
@@ -2512,7 +2954,7 @@
           <a:p>
             <a:fld id="{A26ED350-09DA-47B2-96B1-414F1C332C84}" type="datetimeFigureOut">
               <a:rPr lang="fr-FR" smtClean="0"/>
-              <a:t>20/07/2017</a:t>
+              <a:t>18/08/2017</a:t>
             </a:fld>
             <a:endParaRPr lang="fr-FR"/>
           </a:p>
@@ -2607,8 +3049,8 @@
         </p:nvSpPr>
         <p:spPr>
           <a:xfrm>
-            <a:off x="282655" y="278267"/>
-            <a:ext cx="5087780" cy="1158081"/>
+            <a:off x="410450" y="278271"/>
+            <a:ext cx="7388068" cy="1158081"/>
           </a:xfrm>
           <a:prstGeom prst="rect">
             <a:avLst/>
@@ -2640,8 +3082,8 @@
         </p:nvSpPr>
         <p:spPr>
           <a:xfrm>
-            <a:off x="282655" y="1621319"/>
-            <a:ext cx="5087780" cy="4585681"/>
+            <a:off x="410450" y="1621323"/>
+            <a:ext cx="7388068" cy="4585681"/>
           </a:xfrm>
           <a:prstGeom prst="rect">
             <a:avLst/>
@@ -2702,8 +3144,8 @@
         </p:nvSpPr>
         <p:spPr>
           <a:xfrm>
-            <a:off x="282656" y="6440224"/>
-            <a:ext cx="1319055" cy="369943"/>
+            <a:off x="410453" y="6440228"/>
+            <a:ext cx="1915426" cy="369943"/>
           </a:xfrm>
           <a:prstGeom prst="rect">
             <a:avLst/>
@@ -2725,7 +3167,7 @@
           <a:p>
             <a:fld id="{A26ED350-09DA-47B2-96B1-414F1C332C84}" type="datetimeFigureOut">
               <a:rPr lang="fr-FR" smtClean="0"/>
-              <a:t>20/07/2017</a:t>
+              <a:t>18/08/2017</a:t>
             </a:fld>
             <a:endParaRPr lang="fr-FR"/>
           </a:p>
@@ -2743,8 +3185,8 @@
         </p:nvSpPr>
         <p:spPr>
           <a:xfrm>
-            <a:off x="1931473" y="6440224"/>
-            <a:ext cx="1790145" cy="369943"/>
+            <a:off x="2804731" y="6440228"/>
+            <a:ext cx="2599506" cy="369943"/>
           </a:xfrm>
           <a:prstGeom prst="rect">
             <a:avLst/>
@@ -2780,8 +3222,8 @@
         </p:nvSpPr>
         <p:spPr>
           <a:xfrm>
-            <a:off x="4051381" y="6440224"/>
-            <a:ext cx="1319055" cy="369943"/>
+            <a:off x="5883093" y="6440228"/>
+            <a:ext cx="1915426" cy="369943"/>
           </a:xfrm>
           <a:prstGeom prst="rect">
             <a:avLst/>
@@ -3100,9 +3542,825 @@
           <a:chExt cx="0" cy="0"/>
         </a:xfrm>
       </p:grpSpPr>
+      <p:pic>
+        <p:nvPicPr>
+          <p:cNvPr id="288" name="Picture 9"/>
+          <p:cNvPicPr>
+            <a:picLocks noChangeAspect="1" noChangeArrowheads="1"/>
+          </p:cNvPicPr>
+          <p:nvPr/>
+        </p:nvPicPr>
+        <p:blipFill rotWithShape="1">
+          <a:blip r:embed="rId3">
+            <a:extLst>
+              <a:ext uri="{28A0092B-C50C-407E-A947-70E740481C1C}">
+                <a14:useLocalDpi xmlns:a14="http://schemas.microsoft.com/office/drawing/2010/main" val="0"/>
+              </a:ext>
+            </a:extLst>
+          </a:blip>
+          <a:srcRect b="18614"/>
+          <a:stretch/>
+        </p:blipFill>
+        <p:spPr bwMode="auto">
+          <a:xfrm>
+            <a:off x="3790602" y="-126000"/>
+            <a:ext cx="3500438" cy="2253250"/>
+          </a:xfrm>
+          <a:prstGeom prst="rect">
+            <a:avLst/>
+          </a:prstGeom>
+          <a:noFill/>
+          <a:ln>
+            <a:noFill/>
+          </a:ln>
+          <a:effectLst/>
+          <a:extLst>
+            <a:ext uri="{909E8E84-426E-40DD-AFC4-6F175D3DCCD1}">
+              <a14:hiddenFill xmlns:a14="http://schemas.microsoft.com/office/drawing/2010/main">
+                <a:solidFill>
+                  <a:schemeClr val="accent1"/>
+                </a:solidFill>
+              </a14:hiddenFill>
+            </a:ext>
+            <a:ext uri="{91240B29-F687-4F45-9708-019B960494DF}">
+              <a14:hiddenLine xmlns:a14="http://schemas.microsoft.com/office/drawing/2010/main" w="9525">
+                <a:solidFill>
+                  <a:schemeClr val="tx1"/>
+                </a:solidFill>
+                <a:miter lim="800000"/>
+                <a:headEnd/>
+                <a:tailEnd/>
+              </a14:hiddenLine>
+            </a:ext>
+            <a:ext uri="{AF507438-7753-43E0-B8FC-AC1667EBCBE1}">
+              <a14:hiddenEffects xmlns:a14="http://schemas.microsoft.com/office/drawing/2010/main">
+                <a:effectLst>
+                  <a:outerShdw dist="35921" dir="2700000" algn="ctr" rotWithShape="0">
+                    <a:schemeClr val="bg2"/>
+                  </a:outerShdw>
+                </a:effectLst>
+              </a14:hiddenEffects>
+            </a:ext>
+          </a:extLst>
+        </p:spPr>
+      </p:pic>
+      <p:pic>
+        <p:nvPicPr>
+          <p:cNvPr id="289" name="Picture 8"/>
+          <p:cNvPicPr>
+            <a:picLocks noChangeAspect="1" noChangeArrowheads="1"/>
+          </p:cNvPicPr>
+          <p:nvPr/>
+        </p:nvPicPr>
+        <p:blipFill rotWithShape="1">
+          <a:blip r:embed="rId4">
+            <a:extLst>
+              <a:ext uri="{28A0092B-C50C-407E-A947-70E740481C1C}">
+                <a14:useLocalDpi xmlns:a14="http://schemas.microsoft.com/office/drawing/2010/main" val="0"/>
+              </a:ext>
+            </a:extLst>
+          </a:blip>
+          <a:srcRect t="5529"/>
+          <a:stretch/>
+        </p:blipFill>
+        <p:spPr bwMode="auto">
+          <a:xfrm>
+            <a:off x="3816000" y="2190590"/>
+            <a:ext cx="2201862" cy="2675509"/>
+          </a:xfrm>
+          <a:prstGeom prst="rect">
+            <a:avLst/>
+          </a:prstGeom>
+          <a:noFill/>
+          <a:ln>
+            <a:noFill/>
+          </a:ln>
+          <a:effectLst/>
+          <a:extLst>
+            <a:ext uri="{909E8E84-426E-40DD-AFC4-6F175D3DCCD1}">
+              <a14:hiddenFill xmlns:a14="http://schemas.microsoft.com/office/drawing/2010/main">
+                <a:solidFill>
+                  <a:schemeClr val="accent1"/>
+                </a:solidFill>
+              </a14:hiddenFill>
+            </a:ext>
+            <a:ext uri="{91240B29-F687-4F45-9708-019B960494DF}">
+              <a14:hiddenLine xmlns:a14="http://schemas.microsoft.com/office/drawing/2010/main" w="9525">
+                <a:solidFill>
+                  <a:schemeClr val="tx1"/>
+                </a:solidFill>
+                <a:miter lim="800000"/>
+                <a:headEnd/>
+                <a:tailEnd/>
+              </a14:hiddenLine>
+            </a:ext>
+            <a:ext uri="{AF507438-7753-43E0-B8FC-AC1667EBCBE1}">
+              <a14:hiddenEffects xmlns:a14="http://schemas.microsoft.com/office/drawing/2010/main">
+                <a:effectLst>
+                  <a:outerShdw dist="35921" dir="2700000" algn="ctr" rotWithShape="0">
+                    <a:schemeClr val="bg2"/>
+                  </a:outerShdw>
+                </a:effectLst>
+              </a14:hiddenEffects>
+            </a:ext>
+          </a:extLst>
+        </p:spPr>
+      </p:pic>
+      <p:pic>
+        <p:nvPicPr>
+          <p:cNvPr id="290" name="Picture 2"/>
+          <p:cNvPicPr>
+            <a:picLocks noChangeAspect="1" noChangeArrowheads="1"/>
+          </p:cNvPicPr>
+          <p:nvPr/>
+        </p:nvPicPr>
+        <p:blipFill>
+          <a:blip r:embed="rId5">
+            <a:extLst>
+              <a:ext uri="{28A0092B-C50C-407E-A947-70E740481C1C}">
+                <a14:useLocalDpi xmlns:a14="http://schemas.microsoft.com/office/drawing/2010/main" val="0"/>
+              </a:ext>
+            </a:extLst>
+          </a:blip>
+          <a:srcRect/>
+          <a:stretch>
+            <a:fillRect/>
+          </a:stretch>
+        </p:blipFill>
+        <p:spPr bwMode="auto">
+          <a:xfrm>
+            <a:off x="3781078" y="4276800"/>
+            <a:ext cx="3509962" cy="2768600"/>
+          </a:xfrm>
+          <a:prstGeom prst="rect">
+            <a:avLst/>
+          </a:prstGeom>
+          <a:noFill/>
+          <a:ln>
+            <a:noFill/>
+          </a:ln>
+          <a:effectLst/>
+          <a:extLst>
+            <a:ext uri="{909E8E84-426E-40DD-AFC4-6F175D3DCCD1}">
+              <a14:hiddenFill xmlns:a14="http://schemas.microsoft.com/office/drawing/2010/main">
+                <a:solidFill>
+                  <a:schemeClr val="accent1"/>
+                </a:solidFill>
+              </a14:hiddenFill>
+            </a:ext>
+            <a:ext uri="{91240B29-F687-4F45-9708-019B960494DF}">
+              <a14:hiddenLine xmlns:a14="http://schemas.microsoft.com/office/drawing/2010/main" w="9525">
+                <a:solidFill>
+                  <a:schemeClr val="tx1"/>
+                </a:solidFill>
+                <a:miter lim="800000"/>
+                <a:headEnd/>
+                <a:tailEnd/>
+              </a14:hiddenLine>
+            </a:ext>
+            <a:ext uri="{AF507438-7753-43E0-B8FC-AC1667EBCBE1}">
+              <a14:hiddenEffects xmlns:a14="http://schemas.microsoft.com/office/drawing/2010/main">
+                <a:effectLst>
+                  <a:outerShdw dist="35921" dir="2700000" algn="ctr" rotWithShape="0">
+                    <a:schemeClr val="bg2"/>
+                  </a:outerShdw>
+                </a:effectLst>
+              </a14:hiddenEffects>
+            </a:ext>
+          </a:extLst>
+        </p:spPr>
+      </p:pic>
       <p:grpSp>
         <p:nvGrpSpPr>
-          <p:cNvPr id="75" name="Groupe 74"/>
+          <p:cNvPr id="291" name="Groupe 290"/>
+          <p:cNvGrpSpPr/>
+          <p:nvPr/>
+        </p:nvGrpSpPr>
+        <p:grpSpPr>
+          <a:xfrm>
+            <a:off x="5562848" y="4626372"/>
+            <a:ext cx="1389018" cy="1151399"/>
+            <a:chOff x="6262062" y="5205167"/>
+            <a:chExt cx="1389018" cy="1151399"/>
+          </a:xfrm>
+        </p:grpSpPr>
+        <p:sp>
+          <p:nvSpPr>
+            <p:cNvPr id="292" name="Line 70"/>
+            <p:cNvSpPr>
+              <a:spLocks noChangeShapeType="1"/>
+            </p:cNvSpPr>
+            <p:nvPr/>
+          </p:nvSpPr>
+          <p:spPr bwMode="auto">
+            <a:xfrm>
+              <a:off x="6631950" y="5536954"/>
+              <a:ext cx="265112" cy="0"/>
+            </a:xfrm>
+            <a:prstGeom prst="line">
+              <a:avLst/>
+            </a:prstGeom>
+            <a:noFill/>
+            <a:ln w="9525">
+              <a:solidFill>
+                <a:schemeClr val="tx1"/>
+              </a:solidFill>
+              <a:round/>
+              <a:headEnd/>
+              <a:tailEnd/>
+            </a:ln>
+            <a:effectLst/>
+            <a:extLst>
+              <a:ext uri="{909E8E84-426E-40DD-AFC4-6F175D3DCCD1}">
+                <a14:hiddenFill xmlns:a14="http://schemas.microsoft.com/office/drawing/2010/main">
+                  <a:noFill/>
+                </a14:hiddenFill>
+              </a:ext>
+              <a:ext uri="{AF507438-7753-43E0-B8FC-AC1667EBCBE1}">
+                <a14:hiddenEffects xmlns:a14="http://schemas.microsoft.com/office/drawing/2010/main">
+                  <a:effectLst>
+                    <a:outerShdw dist="35921" dir="2700000" algn="ctr" rotWithShape="0">
+                      <a:schemeClr val="bg2"/>
+                    </a:outerShdw>
+                  </a:effectLst>
+                </a14:hiddenEffects>
+              </a:ext>
+            </a:extLst>
+          </p:spPr>
+          <p:txBody>
+            <a:bodyPr/>
+            <a:lstStyle/>
+            <a:p>
+              <a:endParaRPr lang="en-US"/>
+            </a:p>
+          </p:txBody>
+        </p:sp>
+        <p:sp>
+          <p:nvSpPr>
+            <p:cNvPr id="293" name="Line 71"/>
+            <p:cNvSpPr>
+              <a:spLocks noChangeShapeType="1"/>
+            </p:cNvSpPr>
+            <p:nvPr/>
+          </p:nvSpPr>
+          <p:spPr bwMode="auto">
+            <a:xfrm>
+              <a:off x="6627187" y="5862392"/>
+              <a:ext cx="269875" cy="0"/>
+            </a:xfrm>
+            <a:prstGeom prst="line">
+              <a:avLst/>
+            </a:prstGeom>
+            <a:noFill/>
+            <a:ln w="9525">
+              <a:solidFill>
+                <a:schemeClr val="tx1"/>
+              </a:solidFill>
+              <a:round/>
+              <a:headEnd/>
+              <a:tailEnd/>
+            </a:ln>
+            <a:effectLst/>
+            <a:extLst>
+              <a:ext uri="{909E8E84-426E-40DD-AFC4-6F175D3DCCD1}">
+                <a14:hiddenFill xmlns:a14="http://schemas.microsoft.com/office/drawing/2010/main">
+                  <a:noFill/>
+                </a14:hiddenFill>
+              </a:ext>
+              <a:ext uri="{AF507438-7753-43E0-B8FC-AC1667EBCBE1}">
+                <a14:hiddenEffects xmlns:a14="http://schemas.microsoft.com/office/drawing/2010/main">
+                  <a:effectLst>
+                    <a:outerShdw dist="35921" dir="2700000" algn="ctr" rotWithShape="0">
+                      <a:schemeClr val="bg2"/>
+                    </a:outerShdw>
+                  </a:effectLst>
+                </a14:hiddenEffects>
+              </a:ext>
+            </a:extLst>
+          </p:spPr>
+          <p:txBody>
+            <a:bodyPr/>
+            <a:lstStyle/>
+            <a:p>
+              <a:endParaRPr lang="en-US"/>
+            </a:p>
+          </p:txBody>
+        </p:sp>
+        <p:sp>
+          <p:nvSpPr>
+            <p:cNvPr id="294" name="Line 75"/>
+            <p:cNvSpPr>
+              <a:spLocks noChangeShapeType="1"/>
+            </p:cNvSpPr>
+            <p:nvPr/>
+          </p:nvSpPr>
+          <p:spPr bwMode="auto">
+            <a:xfrm rot="10800000">
+              <a:off x="6766887" y="5421067"/>
+              <a:ext cx="0" cy="204787"/>
+            </a:xfrm>
+            <a:prstGeom prst="line">
+              <a:avLst/>
+            </a:prstGeom>
+            <a:noFill/>
+            <a:ln w="25400">
+              <a:solidFill>
+                <a:srgbClr val="FF0000"/>
+              </a:solidFill>
+              <a:round/>
+              <a:headEnd type="triangle" w="med" len="med"/>
+              <a:tailEnd type="none" w="med" len="med"/>
+            </a:ln>
+            <a:effectLst/>
+            <a:extLst>
+              <a:ext uri="{909E8E84-426E-40DD-AFC4-6F175D3DCCD1}">
+                <a14:hiddenFill xmlns:a14="http://schemas.microsoft.com/office/drawing/2010/main">
+                  <a:noFill/>
+                </a14:hiddenFill>
+              </a:ext>
+              <a:ext uri="{AF507438-7753-43E0-B8FC-AC1667EBCBE1}">
+                <a14:hiddenEffects xmlns:a14="http://schemas.microsoft.com/office/drawing/2010/main">
+                  <a:effectLst>
+                    <a:outerShdw dist="35921" dir="2700000" algn="ctr" rotWithShape="0">
+                      <a:schemeClr val="bg2"/>
+                    </a:outerShdw>
+                  </a:effectLst>
+                </a14:hiddenEffects>
+              </a:ext>
+            </a:extLst>
+          </p:spPr>
+          <p:txBody>
+            <a:bodyPr/>
+            <a:lstStyle/>
+            <a:p>
+              <a:endParaRPr lang="en-US"/>
+            </a:p>
+          </p:txBody>
+        </p:sp>
+        <p:sp>
+          <p:nvSpPr>
+            <p:cNvPr id="295" name="Freeform 79"/>
+            <p:cNvSpPr>
+              <a:spLocks/>
+            </p:cNvSpPr>
+            <p:nvPr/>
+          </p:nvSpPr>
+          <p:spPr bwMode="auto">
+            <a:xfrm>
+              <a:off x="6268412" y="5205167"/>
+              <a:ext cx="949325" cy="463550"/>
+            </a:xfrm>
+            <a:custGeom>
+              <a:avLst/>
+              <a:gdLst>
+                <a:gd name="T0" fmla="*/ 0 w 1242"/>
+                <a:gd name="T1" fmla="*/ 0 h 366"/>
+                <a:gd name="T2" fmla="*/ 474 w 1242"/>
+                <a:gd name="T3" fmla="*/ 0 h 366"/>
+                <a:gd name="T4" fmla="*/ 474 w 1242"/>
+                <a:gd name="T5" fmla="*/ 366 h 366"/>
+                <a:gd name="T6" fmla="*/ 840 w 1242"/>
+                <a:gd name="T7" fmla="*/ 366 h 366"/>
+                <a:gd name="T8" fmla="*/ 840 w 1242"/>
+                <a:gd name="T9" fmla="*/ 6 h 366"/>
+                <a:gd name="T10" fmla="*/ 1242 w 1242"/>
+                <a:gd name="T11" fmla="*/ 6 h 366"/>
+              </a:gdLst>
+              <a:ahLst/>
+              <a:cxnLst>
+                <a:cxn ang="0">
+                  <a:pos x="T0" y="T1"/>
+                </a:cxn>
+                <a:cxn ang="0">
+                  <a:pos x="T2" y="T3"/>
+                </a:cxn>
+                <a:cxn ang="0">
+                  <a:pos x="T4" y="T5"/>
+                </a:cxn>
+                <a:cxn ang="0">
+                  <a:pos x="T6" y="T7"/>
+                </a:cxn>
+                <a:cxn ang="0">
+                  <a:pos x="T8" y="T9"/>
+                </a:cxn>
+                <a:cxn ang="0">
+                  <a:pos x="T10" y="T11"/>
+                </a:cxn>
+              </a:cxnLst>
+              <a:rect l="0" t="0" r="r" b="b"/>
+              <a:pathLst>
+                <a:path w="1242" h="366">
+                  <a:moveTo>
+                    <a:pt x="0" y="0"/>
+                  </a:moveTo>
+                  <a:lnTo>
+                    <a:pt x="474" y="0"/>
+                  </a:lnTo>
+                  <a:lnTo>
+                    <a:pt x="474" y="366"/>
+                  </a:lnTo>
+                  <a:lnTo>
+                    <a:pt x="840" y="366"/>
+                  </a:lnTo>
+                  <a:lnTo>
+                    <a:pt x="840" y="6"/>
+                  </a:lnTo>
+                  <a:lnTo>
+                    <a:pt x="1242" y="6"/>
+                  </a:lnTo>
+                </a:path>
+              </a:pathLst>
+            </a:custGeom>
+            <a:noFill/>
+            <a:ln w="9525">
+              <a:solidFill>
+                <a:schemeClr val="tx1"/>
+              </a:solidFill>
+              <a:round/>
+              <a:headEnd/>
+              <a:tailEnd/>
+            </a:ln>
+            <a:effectLst/>
+            <a:extLst>
+              <a:ext uri="{909E8E84-426E-40DD-AFC4-6F175D3DCCD1}">
+                <a14:hiddenFill xmlns:a14="http://schemas.microsoft.com/office/drawing/2010/main">
+                  <a:solidFill>
+                    <a:schemeClr val="accent1"/>
+                  </a:solidFill>
+                </a14:hiddenFill>
+              </a:ext>
+              <a:ext uri="{AF507438-7753-43E0-B8FC-AC1667EBCBE1}">
+                <a14:hiddenEffects xmlns:a14="http://schemas.microsoft.com/office/drawing/2010/main">
+                  <a:effectLst>
+                    <a:outerShdw dist="35921" dir="2700000" algn="ctr" rotWithShape="0">
+                      <a:schemeClr val="bg2"/>
+                    </a:outerShdw>
+                  </a:effectLst>
+                </a14:hiddenEffects>
+              </a:ext>
+            </a:extLst>
+          </p:spPr>
+          <p:txBody>
+            <a:bodyPr/>
+            <a:lstStyle/>
+            <a:p>
+              <a:endParaRPr lang="en-US"/>
+            </a:p>
+          </p:txBody>
+        </p:sp>
+        <p:sp>
+          <p:nvSpPr>
+            <p:cNvPr id="296" name="Freeform 80"/>
+            <p:cNvSpPr>
+              <a:spLocks/>
+            </p:cNvSpPr>
+            <p:nvPr/>
+          </p:nvSpPr>
+          <p:spPr bwMode="auto">
+            <a:xfrm flipV="1">
+              <a:off x="6262062" y="5797304"/>
+              <a:ext cx="949325" cy="261938"/>
+            </a:xfrm>
+            <a:custGeom>
+              <a:avLst/>
+              <a:gdLst>
+                <a:gd name="T0" fmla="*/ 0 w 1242"/>
+                <a:gd name="T1" fmla="*/ 0 h 366"/>
+                <a:gd name="T2" fmla="*/ 474 w 1242"/>
+                <a:gd name="T3" fmla="*/ 0 h 366"/>
+                <a:gd name="T4" fmla="*/ 474 w 1242"/>
+                <a:gd name="T5" fmla="*/ 366 h 366"/>
+                <a:gd name="T6" fmla="*/ 840 w 1242"/>
+                <a:gd name="T7" fmla="*/ 366 h 366"/>
+                <a:gd name="T8" fmla="*/ 840 w 1242"/>
+                <a:gd name="T9" fmla="*/ 6 h 366"/>
+                <a:gd name="T10" fmla="*/ 1242 w 1242"/>
+                <a:gd name="T11" fmla="*/ 6 h 366"/>
+              </a:gdLst>
+              <a:ahLst/>
+              <a:cxnLst>
+                <a:cxn ang="0">
+                  <a:pos x="T0" y="T1"/>
+                </a:cxn>
+                <a:cxn ang="0">
+                  <a:pos x="T2" y="T3"/>
+                </a:cxn>
+                <a:cxn ang="0">
+                  <a:pos x="T4" y="T5"/>
+                </a:cxn>
+                <a:cxn ang="0">
+                  <a:pos x="T6" y="T7"/>
+                </a:cxn>
+                <a:cxn ang="0">
+                  <a:pos x="T8" y="T9"/>
+                </a:cxn>
+                <a:cxn ang="0">
+                  <a:pos x="T10" y="T11"/>
+                </a:cxn>
+              </a:cxnLst>
+              <a:rect l="0" t="0" r="r" b="b"/>
+              <a:pathLst>
+                <a:path w="1242" h="366">
+                  <a:moveTo>
+                    <a:pt x="0" y="0"/>
+                  </a:moveTo>
+                  <a:lnTo>
+                    <a:pt x="474" y="0"/>
+                  </a:lnTo>
+                  <a:lnTo>
+                    <a:pt x="474" y="366"/>
+                  </a:lnTo>
+                  <a:lnTo>
+                    <a:pt x="840" y="366"/>
+                  </a:lnTo>
+                  <a:lnTo>
+                    <a:pt x="840" y="6"/>
+                  </a:lnTo>
+                  <a:lnTo>
+                    <a:pt x="1242" y="6"/>
+                  </a:lnTo>
+                </a:path>
+              </a:pathLst>
+            </a:custGeom>
+            <a:noFill/>
+            <a:ln w="9525">
+              <a:solidFill>
+                <a:schemeClr val="tx1"/>
+              </a:solidFill>
+              <a:round/>
+              <a:headEnd/>
+              <a:tailEnd/>
+            </a:ln>
+            <a:effectLst/>
+            <a:extLst>
+              <a:ext uri="{909E8E84-426E-40DD-AFC4-6F175D3DCCD1}">
+                <a14:hiddenFill xmlns:a14="http://schemas.microsoft.com/office/drawing/2010/main">
+                  <a:solidFill>
+                    <a:schemeClr val="accent1"/>
+                  </a:solidFill>
+                </a14:hiddenFill>
+              </a:ext>
+              <a:ext uri="{AF507438-7753-43E0-B8FC-AC1667EBCBE1}">
+                <a14:hiddenEffects xmlns:a14="http://schemas.microsoft.com/office/drawing/2010/main">
+                  <a:effectLst>
+                    <a:outerShdw dist="35921" dir="2700000" algn="ctr" rotWithShape="0">
+                      <a:schemeClr val="bg2"/>
+                    </a:outerShdw>
+                  </a:effectLst>
+                </a14:hiddenEffects>
+              </a:ext>
+            </a:extLst>
+          </p:spPr>
+          <p:txBody>
+            <a:bodyPr/>
+            <a:lstStyle/>
+            <a:p>
+              <a:endParaRPr lang="en-US"/>
+            </a:p>
+          </p:txBody>
+        </p:sp>
+        <p:sp>
+          <p:nvSpPr>
+            <p:cNvPr id="297" name="Line 83"/>
+            <p:cNvSpPr>
+              <a:spLocks noChangeShapeType="1"/>
+            </p:cNvSpPr>
+            <p:nvPr/>
+          </p:nvSpPr>
+          <p:spPr bwMode="auto">
+            <a:xfrm>
+              <a:off x="7054150" y="5396459"/>
+              <a:ext cx="0" cy="544513"/>
+            </a:xfrm>
+            <a:prstGeom prst="line">
+              <a:avLst/>
+            </a:prstGeom>
+            <a:noFill/>
+            <a:ln w="28575">
+              <a:solidFill>
+                <a:srgbClr val="00B050"/>
+              </a:solidFill>
+              <a:round/>
+              <a:headEnd type="none" w="med" len="med"/>
+              <a:tailEnd type="triangle" w="med" len="med"/>
+            </a:ln>
+            <a:effectLst/>
+            <a:extLst>
+              <a:ext uri="{909E8E84-426E-40DD-AFC4-6F175D3DCCD1}">
+                <a14:hiddenFill xmlns:a14="http://schemas.microsoft.com/office/drawing/2010/main">
+                  <a:noFill/>
+                </a14:hiddenFill>
+              </a:ext>
+              <a:ext uri="{AF507438-7753-43E0-B8FC-AC1667EBCBE1}">
+                <a14:hiddenEffects xmlns:a14="http://schemas.microsoft.com/office/drawing/2010/main">
+                  <a:effectLst>
+                    <a:outerShdw dist="35921" dir="2700000" algn="ctr" rotWithShape="0">
+                      <a:schemeClr val="bg2"/>
+                    </a:outerShdw>
+                  </a:effectLst>
+                </a14:hiddenEffects>
+              </a:ext>
+            </a:extLst>
+          </p:spPr>
+          <p:txBody>
+            <a:bodyPr/>
+            <a:lstStyle/>
+            <a:p>
+              <a:endParaRPr lang="en-US"/>
+            </a:p>
+          </p:txBody>
+        </p:sp>
+        <p:sp>
+          <p:nvSpPr>
+            <p:cNvPr id="298" name="Line 96"/>
+            <p:cNvSpPr>
+              <a:spLocks noChangeShapeType="1"/>
+            </p:cNvSpPr>
+            <p:nvPr/>
+          </p:nvSpPr>
+          <p:spPr bwMode="auto">
+            <a:xfrm>
+              <a:off x="6766887" y="5781429"/>
+              <a:ext cx="0" cy="204788"/>
+            </a:xfrm>
+            <a:prstGeom prst="line">
+              <a:avLst/>
+            </a:prstGeom>
+            <a:noFill/>
+            <a:ln w="38100" cmpd="dbl">
+              <a:solidFill>
+                <a:srgbClr val="0066CC"/>
+              </a:solidFill>
+              <a:round/>
+              <a:headEnd type="triangle" w="med" len="med"/>
+              <a:tailEnd type="none" w="med" len="med"/>
+            </a:ln>
+            <a:effectLst/>
+            <a:extLst>
+              <a:ext uri="{909E8E84-426E-40DD-AFC4-6F175D3DCCD1}">
+                <a14:hiddenFill xmlns:a14="http://schemas.microsoft.com/office/drawing/2010/main">
+                  <a:noFill/>
+                </a14:hiddenFill>
+              </a:ext>
+              <a:ext uri="{AF507438-7753-43E0-B8FC-AC1667EBCBE1}">
+                <a14:hiddenEffects xmlns:a14="http://schemas.microsoft.com/office/drawing/2010/main">
+                  <a:effectLst>
+                    <a:outerShdw dist="35921" dir="2700000" algn="ctr" rotWithShape="0">
+                      <a:schemeClr val="bg2"/>
+                    </a:outerShdw>
+                  </a:effectLst>
+                </a14:hiddenEffects>
+              </a:ext>
+            </a:extLst>
+          </p:spPr>
+          <p:txBody>
+            <a:bodyPr/>
+            <a:lstStyle/>
+            <a:p>
+              <a:endParaRPr lang="en-US"/>
+            </a:p>
+          </p:txBody>
+        </p:sp>
+        <p:sp>
+          <p:nvSpPr>
+            <p:cNvPr id="299" name="Rectangle 298"/>
+            <p:cNvSpPr>
+              <a:spLocks noChangeArrowheads="1"/>
+            </p:cNvSpPr>
+            <p:nvPr/>
+          </p:nvSpPr>
+          <p:spPr bwMode="auto">
+            <a:xfrm>
+              <a:off x="7016691" y="5541087"/>
+              <a:ext cx="634389" cy="332584"/>
+            </a:xfrm>
+            <a:prstGeom prst="rect">
+              <a:avLst/>
+            </a:prstGeom>
+            <a:noFill/>
+            <a:ln>
+              <a:noFill/>
+            </a:ln>
+            <a:effectLst/>
+            <a:extLst>
+              <a:ext uri="{909E8E84-426E-40DD-AFC4-6F175D3DCCD1}">
+                <a14:hiddenFill xmlns:a14="http://schemas.microsoft.com/office/drawing/2010/main">
+                  <a:solidFill>
+                    <a:srgbClr val="FFFFFF"/>
+                  </a:solidFill>
+                </a14:hiddenFill>
+              </a:ext>
+              <a:ext uri="{91240B29-F687-4F45-9708-019B960494DF}">
+                <a14:hiddenLine xmlns:a14="http://schemas.microsoft.com/office/drawing/2010/main" w="9525" cap="flat">
+                  <a:solidFill>
+                    <a:srgbClr val="3465A4"/>
+                  </a:solidFill>
+                  <a:round/>
+                  <a:headEnd/>
+                  <a:tailEnd/>
+                </a14:hiddenLine>
+              </a:ext>
+              <a:ext uri="{AF507438-7753-43E0-B8FC-AC1667EBCBE1}">
+                <a14:hiddenEffects xmlns:a14="http://schemas.microsoft.com/office/drawing/2010/main">
+                  <a:effectLst>
+                    <a:outerShdw dist="35921" dir="2700000" algn="ctr" rotWithShape="0">
+                      <a:srgbClr val="808080"/>
+                    </a:outerShdw>
+                  </a:effectLst>
+                </a14:hiddenEffects>
+              </a:ext>
+            </a:extLst>
+          </p:spPr>
+          <p:txBody>
+            <a:bodyPr wrap="none" lIns="85527" tIns="42764" rIns="85527" bIns="42764">
+              <a:spAutoFit/>
+            </a:bodyPr>
+            <a:lstStyle/>
+            <a:p>
+              <a:r>
+                <a:rPr lang="en-GB" sz="1600" dirty="0" err="1">
+                  <a:latin typeface="Times New Roman" pitchFamily="16" charset="0"/>
+                </a:rPr>
+                <a:t>S</a:t>
+              </a:r>
+              <a:r>
+                <a:rPr lang="en-GB" sz="1600" baseline="-25000" dirty="0" err="1">
+                  <a:latin typeface="Times New Roman" pitchFamily="16" charset="0"/>
+                </a:rPr>
+                <a:t>z</a:t>
+              </a:r>
+              <a:r>
+                <a:rPr lang="en-GB" sz="1600" dirty="0" smtClean="0">
+                  <a:latin typeface="Times New Roman" pitchFamily="16" charset="0"/>
+                </a:rPr>
+                <a:t>=</a:t>
+              </a:r>
+              <a:r>
+                <a:rPr lang="en-GB" sz="1600" i="1" dirty="0" smtClean="0">
+                  <a:latin typeface="Times New Roman" pitchFamily="16" charset="0"/>
+                </a:rPr>
+                <a:t>-</a:t>
+              </a:r>
+              <a:r>
+                <a:rPr lang="en-GB" sz="1600" dirty="0">
+                  <a:latin typeface="Times New Roman" pitchFamily="16" charset="0"/>
+                </a:rPr>
+                <a:t>1</a:t>
+              </a:r>
+            </a:p>
+          </p:txBody>
+        </p:sp>
+        <p:sp>
+          <p:nvSpPr>
+            <p:cNvPr id="300" name="ZoneTexte 299"/>
+            <p:cNvSpPr txBox="1"/>
+            <p:nvPr/>
+          </p:nvSpPr>
+          <p:spPr>
+            <a:xfrm>
+              <a:off x="6550094" y="5987234"/>
+              <a:ext cx="458780" cy="369332"/>
+            </a:xfrm>
+            <a:prstGeom prst="rect">
+              <a:avLst/>
+            </a:prstGeom>
+            <a:noFill/>
+          </p:spPr>
+          <p:txBody>
+            <a:bodyPr wrap="none" rtlCol="0">
+              <a:spAutoFit/>
+            </a:bodyPr>
+            <a:lstStyle/>
+            <a:p>
+              <a:r>
+                <a:rPr lang="fr-FR" dirty="0" smtClean="0">
+                  <a:solidFill>
+                    <a:srgbClr val="FF0000"/>
+                  </a:solidFill>
+                  <a:latin typeface="Symbol" panose="05050102010706020507" pitchFamily="18" charset="2"/>
+                </a:rPr>
+                <a:t>s</a:t>
+              </a:r>
+              <a:r>
+                <a:rPr lang="fr-FR" dirty="0" smtClean="0">
+                  <a:solidFill>
+                    <a:srgbClr val="FF0000"/>
+                  </a:solidFill>
+                </a:rPr>
+                <a:t>+</a:t>
+              </a:r>
+              <a:endParaRPr lang="en-US" dirty="0">
+                <a:solidFill>
+                  <a:srgbClr val="FF0000"/>
+                </a:solidFill>
+              </a:endParaRPr>
+            </a:p>
+          </p:txBody>
+        </p:sp>
+      </p:grpSp>
+      <p:grpSp>
+        <p:nvGrpSpPr>
+          <p:cNvPr id="301" name="Groupe 300"/>
           <p:cNvGrpSpPr/>
           <p:nvPr/>
         </p:nvGrpSpPr>
@@ -3116,14 +4374,14 @@
         </p:grpSpPr>
         <p:pic>
           <p:nvPicPr>
-            <p:cNvPr id="76" name="Picture 5"/>
+            <p:cNvPr id="302" name="Picture 5"/>
             <p:cNvPicPr>
               <a:picLocks noChangeAspect="1" noChangeArrowheads="1"/>
             </p:cNvPicPr>
             <p:nvPr/>
           </p:nvPicPr>
           <p:blipFill rotWithShape="1">
-            <a:blip r:embed="rId2">
+            <a:blip r:embed="rId6">
               <a:extLst>
                 <a:ext uri="{28A0092B-C50C-407E-A947-70E740481C1C}">
                   <a14:useLocalDpi xmlns:a14="http://schemas.microsoft.com/office/drawing/2010/main" val="0"/>
@@ -3168,7 +4426,7 @@
         </p:pic>
         <p:sp>
           <p:nvSpPr>
-            <p:cNvPr id="77" name="Rectangle 76"/>
+            <p:cNvPr id="303" name="Rectangle 302"/>
             <p:cNvSpPr/>
             <p:nvPr/>
           </p:nvSpPr>
@@ -3216,7 +4474,7 @@
         </p:sp>
         <p:sp>
           <p:nvSpPr>
-            <p:cNvPr id="78" name="Rectangle 77"/>
+            <p:cNvPr id="304" name="Rectangle 303"/>
             <p:cNvSpPr/>
             <p:nvPr/>
           </p:nvSpPr>
@@ -3265,7 +4523,7 @@
       </p:grpSp>
       <p:sp>
         <p:nvSpPr>
-          <p:cNvPr id="4" name="Rectangle 3"/>
+          <p:cNvPr id="305" name="Rectangle 304"/>
           <p:cNvSpPr/>
           <p:nvPr/>
         </p:nvSpPr>
@@ -3303,180 +4561,9 @@
           </a:p>
         </p:txBody>
       </p:sp>
-      <p:grpSp>
-        <p:nvGrpSpPr>
-          <p:cNvPr id="71" name="Groupe 70"/>
-          <p:cNvGrpSpPr/>
-          <p:nvPr/>
-        </p:nvGrpSpPr>
-        <p:grpSpPr>
-          <a:xfrm>
-            <a:off x="3815490" y="-126000"/>
-            <a:ext cx="1837117" cy="7074000"/>
-            <a:chOff x="3779912" y="-126000"/>
-            <a:chExt cx="1837117" cy="7074000"/>
-          </a:xfrm>
-        </p:grpSpPr>
-        <p:pic>
-          <p:nvPicPr>
-            <p:cNvPr id="72" name="Picture 15"/>
-            <p:cNvPicPr>
-              <a:picLocks noChangeAspect="1" noChangeArrowheads="1"/>
-            </p:cNvPicPr>
-            <p:nvPr/>
-          </p:nvPicPr>
-          <p:blipFill rotWithShape="1">
-            <a:blip r:embed="rId3">
-              <a:extLst>
-                <a:ext uri="{28A0092B-C50C-407E-A947-70E740481C1C}">
-                  <a14:useLocalDpi xmlns:a14="http://schemas.microsoft.com/office/drawing/2010/main" val="0"/>
-                </a:ext>
-              </a:extLst>
-            </a:blip>
-            <a:srcRect t="4704" r="12767" b="20137"/>
-            <a:stretch/>
-          </p:blipFill>
-          <p:spPr bwMode="auto">
-            <a:xfrm>
-              <a:off x="3779912" y="2156457"/>
-              <a:ext cx="1837117" cy="2118363"/>
-            </a:xfrm>
-            <a:prstGeom prst="rect">
-              <a:avLst/>
-            </a:prstGeom>
-            <a:noFill/>
-            <a:ln>
-              <a:noFill/>
-            </a:ln>
-            <a:extLst>
-              <a:ext uri="{909E8E84-426E-40DD-AFC4-6F175D3DCCD1}">
-                <a14:hiddenFill xmlns:a14="http://schemas.microsoft.com/office/drawing/2010/main">
-                  <a:solidFill>
-                    <a:schemeClr val="accent1"/>
-                  </a:solidFill>
-                </a14:hiddenFill>
-              </a:ext>
-              <a:ext uri="{91240B29-F687-4F45-9708-019B960494DF}">
-                <a14:hiddenLine xmlns:a14="http://schemas.microsoft.com/office/drawing/2010/main" w="9525">
-                  <a:solidFill>
-                    <a:schemeClr val="tx1"/>
-                  </a:solidFill>
-                  <a:miter lim="800000"/>
-                  <a:headEnd/>
-                  <a:tailEnd/>
-                </a14:hiddenLine>
-              </a:ext>
-            </a:extLst>
-          </p:spPr>
-        </p:pic>
-        <p:pic>
-          <p:nvPicPr>
-            <p:cNvPr id="73" name="Picture 9"/>
-            <p:cNvPicPr>
-              <a:picLocks noChangeAspect="1" noChangeArrowheads="1"/>
-            </p:cNvPicPr>
-            <p:nvPr/>
-          </p:nvPicPr>
-          <p:blipFill rotWithShape="1">
-            <a:blip r:embed="rId4">
-              <a:extLst>
-                <a:ext uri="{28A0092B-C50C-407E-A947-70E740481C1C}">
-                  <a14:useLocalDpi xmlns:a14="http://schemas.microsoft.com/office/drawing/2010/main" val="0"/>
-                </a:ext>
-              </a:extLst>
-            </a:blip>
-            <a:srcRect t="2935" r="12764"/>
-            <a:stretch/>
-          </p:blipFill>
-          <p:spPr bwMode="auto">
-            <a:xfrm>
-              <a:off x="3780727" y="4274820"/>
-              <a:ext cx="1836302" cy="2673180"/>
-            </a:xfrm>
-            <a:prstGeom prst="rect">
-              <a:avLst/>
-            </a:prstGeom>
-            <a:noFill/>
-            <a:ln>
-              <a:noFill/>
-            </a:ln>
-            <a:extLst>
-              <a:ext uri="{909E8E84-426E-40DD-AFC4-6F175D3DCCD1}">
-                <a14:hiddenFill xmlns:a14="http://schemas.microsoft.com/office/drawing/2010/main">
-                  <a:solidFill>
-                    <a:schemeClr val="accent1"/>
-                  </a:solidFill>
-                </a14:hiddenFill>
-              </a:ext>
-              <a:ext uri="{91240B29-F687-4F45-9708-019B960494DF}">
-                <a14:hiddenLine xmlns:a14="http://schemas.microsoft.com/office/drawing/2010/main" w="9525">
-                  <a:solidFill>
-                    <a:schemeClr val="tx1"/>
-                  </a:solidFill>
-                  <a:miter lim="800000"/>
-                  <a:headEnd/>
-                  <a:tailEnd/>
-                </a14:hiddenLine>
-              </a:ext>
-            </a:extLst>
-          </p:spPr>
-        </p:pic>
-        <p:pic>
-          <p:nvPicPr>
-            <p:cNvPr id="74" name="Picture 16"/>
-            <p:cNvPicPr>
-              <a:picLocks noChangeAspect="1" noChangeArrowheads="1"/>
-            </p:cNvPicPr>
-            <p:nvPr/>
-          </p:nvPicPr>
-          <p:blipFill rotWithShape="1">
-            <a:blip r:embed="rId5">
-              <a:extLst>
-                <a:ext uri="{28A0092B-C50C-407E-A947-70E740481C1C}">
-                  <a14:useLocalDpi xmlns:a14="http://schemas.microsoft.com/office/drawing/2010/main" val="0"/>
-                </a:ext>
-              </a:extLst>
-            </a:blip>
-            <a:srcRect r="12772" b="19074"/>
-            <a:stretch/>
-          </p:blipFill>
-          <p:spPr bwMode="auto">
-            <a:xfrm>
-              <a:off x="3780000" y="-126000"/>
-              <a:ext cx="1837029" cy="2246630"/>
-            </a:xfrm>
-            <a:prstGeom prst="rect">
-              <a:avLst/>
-            </a:prstGeom>
-            <a:noFill/>
-            <a:ln>
-              <a:noFill/>
-            </a:ln>
-            <a:extLst>
-              <a:ext uri="{909E8E84-426E-40DD-AFC4-6F175D3DCCD1}">
-                <a14:hiddenFill xmlns:a14="http://schemas.microsoft.com/office/drawing/2010/main">
-                  <a:solidFill>
-                    <a:schemeClr val="accent1"/>
-                  </a:solidFill>
-                </a14:hiddenFill>
-              </a:ext>
-              <a:ext uri="{91240B29-F687-4F45-9708-019B960494DF}">
-                <a14:hiddenLine xmlns:a14="http://schemas.microsoft.com/office/drawing/2010/main" w="9525">
-                  <a:solidFill>
-                    <a:schemeClr val="tx1"/>
-                  </a:solidFill>
-                  <a:miter lim="800000"/>
-                  <a:headEnd/>
-                  <a:tailEnd/>
-                </a14:hiddenLine>
-              </a:ext>
-            </a:extLst>
-          </p:spPr>
-        </p:pic>
-      </p:grpSp>
-      <p:sp>
-        <p:nvSpPr>
-          <p:cNvPr id="79" name="ZoneTexte 78"/>
+      <p:sp>
+        <p:nvSpPr>
+          <p:cNvPr id="306" name="ZoneTexte 305"/>
           <p:cNvSpPr txBox="1"/>
           <p:nvPr/>
         </p:nvSpPr>
@@ -3512,7 +4599,7 @@
       </p:sp>
       <p:sp>
         <p:nvSpPr>
-          <p:cNvPr id="80" name="ZoneTexte 79"/>
+          <p:cNvPr id="307" name="ZoneTexte 306"/>
           <p:cNvSpPr txBox="1"/>
           <p:nvPr/>
         </p:nvSpPr>
@@ -3552,7 +4639,7 @@
       </p:sp>
       <p:sp>
         <p:nvSpPr>
-          <p:cNvPr id="81" name="ZoneTexte 80"/>
+          <p:cNvPr id="308" name="ZoneTexte 307"/>
           <p:cNvSpPr txBox="1"/>
           <p:nvPr/>
         </p:nvSpPr>
@@ -3588,7 +4675,7 @@
       </p:sp>
       <p:sp>
         <p:nvSpPr>
-          <p:cNvPr id="82" name="ZoneTexte 81"/>
+          <p:cNvPr id="309" name="ZoneTexte 308"/>
           <p:cNvSpPr txBox="1"/>
           <p:nvPr/>
         </p:nvSpPr>
@@ -3628,7 +4715,7 @@
       </p:sp>
       <p:sp>
         <p:nvSpPr>
-          <p:cNvPr id="14" name="CustomShape 2"/>
+          <p:cNvPr id="310" name="CustomShape 2"/>
           <p:cNvSpPr/>
           <p:nvPr/>
         </p:nvSpPr>
@@ -3652,7 +4739,7 @@
       </p:sp>
       <p:sp>
         <p:nvSpPr>
-          <p:cNvPr id="15" name="ZoneTexte 14"/>
+          <p:cNvPr id="311" name="ZoneTexte 310"/>
           <p:cNvSpPr txBox="1"/>
           <p:nvPr/>
         </p:nvSpPr>
@@ -3692,7 +4779,7 @@
       </p:sp>
       <p:sp>
         <p:nvSpPr>
-          <p:cNvPr id="16" name="CustomShape 2"/>
+          <p:cNvPr id="312" name="CustomShape 2"/>
           <p:cNvSpPr/>
           <p:nvPr/>
         </p:nvSpPr>
@@ -3716,7 +4803,7 @@
       </p:sp>
       <p:sp>
         <p:nvSpPr>
-          <p:cNvPr id="18" name="CustomShape 2"/>
+          <p:cNvPr id="313" name="CustomShape 2"/>
           <p:cNvSpPr/>
           <p:nvPr/>
         </p:nvSpPr>
@@ -3740,7 +4827,7 @@
       </p:sp>
       <p:sp>
         <p:nvSpPr>
-          <p:cNvPr id="21" name="CustomShape 2"/>
+          <p:cNvPr id="314" name="CustomShape 2"/>
           <p:cNvSpPr/>
           <p:nvPr/>
         </p:nvSpPr>
@@ -3764,7 +4851,7 @@
       </p:sp>
       <p:sp>
         <p:nvSpPr>
-          <p:cNvPr id="2" name="Rectangle 1"/>
+          <p:cNvPr id="315" name="Rectangle 314"/>
           <p:cNvSpPr/>
           <p:nvPr/>
         </p:nvSpPr>
@@ -3812,7 +4899,7 @@
       </p:sp>
       <p:sp>
         <p:nvSpPr>
-          <p:cNvPr id="23" name="ZoneTexte 22"/>
+          <p:cNvPr id="316" name="ZoneTexte 315"/>
           <p:cNvSpPr txBox="1"/>
           <p:nvPr/>
         </p:nvSpPr>
@@ -3852,7 +4939,7 @@
       </p:sp>
       <p:sp>
         <p:nvSpPr>
-          <p:cNvPr id="24" name="CustomShape 2"/>
+          <p:cNvPr id="317" name="CustomShape 2"/>
           <p:cNvSpPr/>
           <p:nvPr/>
         </p:nvSpPr>
@@ -3876,7 +4963,7 @@
       </p:sp>
       <p:sp>
         <p:nvSpPr>
-          <p:cNvPr id="25" name="ZoneTexte 24"/>
+          <p:cNvPr id="318" name="ZoneTexte 317"/>
           <p:cNvSpPr txBox="1"/>
           <p:nvPr/>
         </p:nvSpPr>
@@ -3916,7 +5003,7 @@
       </p:sp>
       <p:sp>
         <p:nvSpPr>
-          <p:cNvPr id="26" name="Rectangle 25"/>
+          <p:cNvPr id="319" name="Rectangle 318"/>
           <p:cNvSpPr/>
           <p:nvPr/>
         </p:nvSpPr>
@@ -3956,7 +5043,7 @@
       </p:sp>
       <p:sp>
         <p:nvSpPr>
-          <p:cNvPr id="17" name="ZoneTexte 16"/>
+          <p:cNvPr id="320" name="ZoneTexte 319"/>
           <p:cNvSpPr txBox="1"/>
           <p:nvPr/>
         </p:nvSpPr>
@@ -3996,7 +5083,7 @@
       </p:sp>
       <p:sp>
         <p:nvSpPr>
-          <p:cNvPr id="27" name="Rectangle 26"/>
+          <p:cNvPr id="321" name="Rectangle 320"/>
           <p:cNvSpPr/>
           <p:nvPr/>
         </p:nvSpPr>
@@ -4036,7 +5123,7 @@
       </p:sp>
       <p:sp>
         <p:nvSpPr>
-          <p:cNvPr id="19" name="ZoneTexte 18"/>
+          <p:cNvPr id="322" name="ZoneTexte 321"/>
           <p:cNvSpPr txBox="1"/>
           <p:nvPr/>
         </p:nvSpPr>
@@ -4076,7 +5163,7 @@
       </p:sp>
       <p:cxnSp>
         <p:nvCxnSpPr>
-          <p:cNvPr id="5" name="Connecteur droit 4"/>
+          <p:cNvPr id="323" name="Connecteur droit 322"/>
           <p:cNvCxnSpPr/>
           <p:nvPr/>
         </p:nvCxnSpPr>
@@ -4109,6 +5196,1362 @@
           </a:fontRef>
         </p:style>
       </p:cxnSp>
+      <p:grpSp>
+        <p:nvGrpSpPr>
+          <p:cNvPr id="324" name="Groupe 323"/>
+          <p:cNvGrpSpPr/>
+          <p:nvPr/>
+        </p:nvGrpSpPr>
+        <p:grpSpPr>
+          <a:xfrm>
+            <a:off x="5490840" y="233884"/>
+            <a:ext cx="1426477" cy="1161420"/>
+            <a:chOff x="9300914" y="1046733"/>
+            <a:chExt cx="1426477" cy="1161420"/>
+          </a:xfrm>
+        </p:grpSpPr>
+        <p:sp>
+          <p:nvSpPr>
+            <p:cNvPr id="325" name="Line 70"/>
+            <p:cNvSpPr>
+              <a:spLocks noChangeShapeType="1"/>
+            </p:cNvSpPr>
+            <p:nvPr/>
+          </p:nvSpPr>
+          <p:spPr bwMode="auto">
+            <a:xfrm>
+              <a:off x="9670802" y="1378520"/>
+              <a:ext cx="265112" cy="0"/>
+            </a:xfrm>
+            <a:prstGeom prst="line">
+              <a:avLst/>
+            </a:prstGeom>
+            <a:noFill/>
+            <a:ln w="9525">
+              <a:solidFill>
+                <a:schemeClr val="tx1"/>
+              </a:solidFill>
+              <a:round/>
+              <a:headEnd/>
+              <a:tailEnd/>
+            </a:ln>
+            <a:effectLst/>
+            <a:extLst>
+              <a:ext uri="{909E8E84-426E-40DD-AFC4-6F175D3DCCD1}">
+                <a14:hiddenFill xmlns:a14="http://schemas.microsoft.com/office/drawing/2010/main">
+                  <a:noFill/>
+                </a14:hiddenFill>
+              </a:ext>
+              <a:ext uri="{AF507438-7753-43E0-B8FC-AC1667EBCBE1}">
+                <a14:hiddenEffects xmlns:a14="http://schemas.microsoft.com/office/drawing/2010/main">
+                  <a:effectLst>
+                    <a:outerShdw dist="35921" dir="2700000" algn="ctr" rotWithShape="0">
+                      <a:schemeClr val="bg2"/>
+                    </a:outerShdw>
+                  </a:effectLst>
+                </a14:hiddenEffects>
+              </a:ext>
+            </a:extLst>
+          </p:spPr>
+          <p:txBody>
+            <a:bodyPr/>
+            <a:lstStyle/>
+            <a:p>
+              <a:endParaRPr lang="en-US"/>
+            </a:p>
+          </p:txBody>
+        </p:sp>
+        <p:sp>
+          <p:nvSpPr>
+            <p:cNvPr id="326" name="Line 71"/>
+            <p:cNvSpPr>
+              <a:spLocks noChangeShapeType="1"/>
+            </p:cNvSpPr>
+            <p:nvPr/>
+          </p:nvSpPr>
+          <p:spPr bwMode="auto">
+            <a:xfrm>
+              <a:off x="9666039" y="1703958"/>
+              <a:ext cx="269875" cy="0"/>
+            </a:xfrm>
+            <a:prstGeom prst="line">
+              <a:avLst/>
+            </a:prstGeom>
+            <a:noFill/>
+            <a:ln w="9525">
+              <a:solidFill>
+                <a:schemeClr val="tx1"/>
+              </a:solidFill>
+              <a:round/>
+              <a:headEnd/>
+              <a:tailEnd/>
+            </a:ln>
+            <a:effectLst/>
+            <a:extLst>
+              <a:ext uri="{909E8E84-426E-40DD-AFC4-6F175D3DCCD1}">
+                <a14:hiddenFill xmlns:a14="http://schemas.microsoft.com/office/drawing/2010/main">
+                  <a:noFill/>
+                </a14:hiddenFill>
+              </a:ext>
+              <a:ext uri="{AF507438-7753-43E0-B8FC-AC1667EBCBE1}">
+                <a14:hiddenEffects xmlns:a14="http://schemas.microsoft.com/office/drawing/2010/main">
+                  <a:effectLst>
+                    <a:outerShdw dist="35921" dir="2700000" algn="ctr" rotWithShape="0">
+                      <a:schemeClr val="bg2"/>
+                    </a:outerShdw>
+                  </a:effectLst>
+                </a14:hiddenEffects>
+              </a:ext>
+            </a:extLst>
+          </p:spPr>
+          <p:txBody>
+            <a:bodyPr/>
+            <a:lstStyle/>
+            <a:p>
+              <a:endParaRPr lang="en-US"/>
+            </a:p>
+          </p:txBody>
+        </p:sp>
+        <p:sp>
+          <p:nvSpPr>
+            <p:cNvPr id="327" name="Line 75"/>
+            <p:cNvSpPr>
+              <a:spLocks noChangeShapeType="1"/>
+            </p:cNvSpPr>
+            <p:nvPr/>
+          </p:nvSpPr>
+          <p:spPr bwMode="auto">
+            <a:xfrm rot="10800000">
+              <a:off x="9805739" y="1262633"/>
+              <a:ext cx="0" cy="204787"/>
+            </a:xfrm>
+            <a:prstGeom prst="line">
+              <a:avLst/>
+            </a:prstGeom>
+            <a:noFill/>
+            <a:ln w="25400">
+              <a:solidFill>
+                <a:srgbClr val="FF0000"/>
+              </a:solidFill>
+              <a:round/>
+              <a:headEnd type="none" w="med" len="med"/>
+              <a:tailEnd type="triangle" w="med" len="med"/>
+            </a:ln>
+            <a:effectLst/>
+            <a:extLst>
+              <a:ext uri="{909E8E84-426E-40DD-AFC4-6F175D3DCCD1}">
+                <a14:hiddenFill xmlns:a14="http://schemas.microsoft.com/office/drawing/2010/main">
+                  <a:noFill/>
+                </a14:hiddenFill>
+              </a:ext>
+              <a:ext uri="{AF507438-7753-43E0-B8FC-AC1667EBCBE1}">
+                <a14:hiddenEffects xmlns:a14="http://schemas.microsoft.com/office/drawing/2010/main">
+                  <a:effectLst>
+                    <a:outerShdw dist="35921" dir="2700000" algn="ctr" rotWithShape="0">
+                      <a:schemeClr val="bg2"/>
+                    </a:outerShdw>
+                  </a:effectLst>
+                </a14:hiddenEffects>
+              </a:ext>
+            </a:extLst>
+          </p:spPr>
+          <p:txBody>
+            <a:bodyPr/>
+            <a:lstStyle/>
+            <a:p>
+              <a:endParaRPr lang="en-US"/>
+            </a:p>
+          </p:txBody>
+        </p:sp>
+        <p:sp>
+          <p:nvSpPr>
+            <p:cNvPr id="328" name="Freeform 79"/>
+            <p:cNvSpPr>
+              <a:spLocks/>
+            </p:cNvSpPr>
+            <p:nvPr/>
+          </p:nvSpPr>
+          <p:spPr bwMode="auto">
+            <a:xfrm>
+              <a:off x="9307264" y="1046733"/>
+              <a:ext cx="949325" cy="463550"/>
+            </a:xfrm>
+            <a:custGeom>
+              <a:avLst/>
+              <a:gdLst>
+                <a:gd name="T0" fmla="*/ 0 w 1242"/>
+                <a:gd name="T1" fmla="*/ 0 h 366"/>
+                <a:gd name="T2" fmla="*/ 474 w 1242"/>
+                <a:gd name="T3" fmla="*/ 0 h 366"/>
+                <a:gd name="T4" fmla="*/ 474 w 1242"/>
+                <a:gd name="T5" fmla="*/ 366 h 366"/>
+                <a:gd name="T6" fmla="*/ 840 w 1242"/>
+                <a:gd name="T7" fmla="*/ 366 h 366"/>
+                <a:gd name="T8" fmla="*/ 840 w 1242"/>
+                <a:gd name="T9" fmla="*/ 6 h 366"/>
+                <a:gd name="T10" fmla="*/ 1242 w 1242"/>
+                <a:gd name="T11" fmla="*/ 6 h 366"/>
+              </a:gdLst>
+              <a:ahLst/>
+              <a:cxnLst>
+                <a:cxn ang="0">
+                  <a:pos x="T0" y="T1"/>
+                </a:cxn>
+                <a:cxn ang="0">
+                  <a:pos x="T2" y="T3"/>
+                </a:cxn>
+                <a:cxn ang="0">
+                  <a:pos x="T4" y="T5"/>
+                </a:cxn>
+                <a:cxn ang="0">
+                  <a:pos x="T6" y="T7"/>
+                </a:cxn>
+                <a:cxn ang="0">
+                  <a:pos x="T8" y="T9"/>
+                </a:cxn>
+                <a:cxn ang="0">
+                  <a:pos x="T10" y="T11"/>
+                </a:cxn>
+              </a:cxnLst>
+              <a:rect l="0" t="0" r="r" b="b"/>
+              <a:pathLst>
+                <a:path w="1242" h="366">
+                  <a:moveTo>
+                    <a:pt x="0" y="0"/>
+                  </a:moveTo>
+                  <a:lnTo>
+                    <a:pt x="474" y="0"/>
+                  </a:lnTo>
+                  <a:lnTo>
+                    <a:pt x="474" y="366"/>
+                  </a:lnTo>
+                  <a:lnTo>
+                    <a:pt x="840" y="366"/>
+                  </a:lnTo>
+                  <a:lnTo>
+                    <a:pt x="840" y="6"/>
+                  </a:lnTo>
+                  <a:lnTo>
+                    <a:pt x="1242" y="6"/>
+                  </a:lnTo>
+                </a:path>
+              </a:pathLst>
+            </a:custGeom>
+            <a:noFill/>
+            <a:ln w="9525">
+              <a:solidFill>
+                <a:schemeClr val="tx1"/>
+              </a:solidFill>
+              <a:round/>
+              <a:headEnd/>
+              <a:tailEnd/>
+            </a:ln>
+            <a:effectLst/>
+            <a:extLst>
+              <a:ext uri="{909E8E84-426E-40DD-AFC4-6F175D3DCCD1}">
+                <a14:hiddenFill xmlns:a14="http://schemas.microsoft.com/office/drawing/2010/main">
+                  <a:solidFill>
+                    <a:schemeClr val="accent1"/>
+                  </a:solidFill>
+                </a14:hiddenFill>
+              </a:ext>
+              <a:ext uri="{AF507438-7753-43E0-B8FC-AC1667EBCBE1}">
+                <a14:hiddenEffects xmlns:a14="http://schemas.microsoft.com/office/drawing/2010/main">
+                  <a:effectLst>
+                    <a:outerShdw dist="35921" dir="2700000" algn="ctr" rotWithShape="0">
+                      <a:schemeClr val="bg2"/>
+                    </a:outerShdw>
+                  </a:effectLst>
+                </a14:hiddenEffects>
+              </a:ext>
+            </a:extLst>
+          </p:spPr>
+          <p:txBody>
+            <a:bodyPr/>
+            <a:lstStyle/>
+            <a:p>
+              <a:endParaRPr lang="en-US"/>
+            </a:p>
+          </p:txBody>
+        </p:sp>
+        <p:sp>
+          <p:nvSpPr>
+            <p:cNvPr id="329" name="Freeform 80"/>
+            <p:cNvSpPr>
+              <a:spLocks/>
+            </p:cNvSpPr>
+            <p:nvPr/>
+          </p:nvSpPr>
+          <p:spPr bwMode="auto">
+            <a:xfrm flipV="1">
+              <a:off x="9300914" y="1638870"/>
+              <a:ext cx="949325" cy="261938"/>
+            </a:xfrm>
+            <a:custGeom>
+              <a:avLst/>
+              <a:gdLst>
+                <a:gd name="T0" fmla="*/ 0 w 1242"/>
+                <a:gd name="T1" fmla="*/ 0 h 366"/>
+                <a:gd name="T2" fmla="*/ 474 w 1242"/>
+                <a:gd name="T3" fmla="*/ 0 h 366"/>
+                <a:gd name="T4" fmla="*/ 474 w 1242"/>
+                <a:gd name="T5" fmla="*/ 366 h 366"/>
+                <a:gd name="T6" fmla="*/ 840 w 1242"/>
+                <a:gd name="T7" fmla="*/ 366 h 366"/>
+                <a:gd name="T8" fmla="*/ 840 w 1242"/>
+                <a:gd name="T9" fmla="*/ 6 h 366"/>
+                <a:gd name="T10" fmla="*/ 1242 w 1242"/>
+                <a:gd name="T11" fmla="*/ 6 h 366"/>
+              </a:gdLst>
+              <a:ahLst/>
+              <a:cxnLst>
+                <a:cxn ang="0">
+                  <a:pos x="T0" y="T1"/>
+                </a:cxn>
+                <a:cxn ang="0">
+                  <a:pos x="T2" y="T3"/>
+                </a:cxn>
+                <a:cxn ang="0">
+                  <a:pos x="T4" y="T5"/>
+                </a:cxn>
+                <a:cxn ang="0">
+                  <a:pos x="T6" y="T7"/>
+                </a:cxn>
+                <a:cxn ang="0">
+                  <a:pos x="T8" y="T9"/>
+                </a:cxn>
+                <a:cxn ang="0">
+                  <a:pos x="T10" y="T11"/>
+                </a:cxn>
+              </a:cxnLst>
+              <a:rect l="0" t="0" r="r" b="b"/>
+              <a:pathLst>
+                <a:path w="1242" h="366">
+                  <a:moveTo>
+                    <a:pt x="0" y="0"/>
+                  </a:moveTo>
+                  <a:lnTo>
+                    <a:pt x="474" y="0"/>
+                  </a:lnTo>
+                  <a:lnTo>
+                    <a:pt x="474" y="366"/>
+                  </a:lnTo>
+                  <a:lnTo>
+                    <a:pt x="840" y="366"/>
+                  </a:lnTo>
+                  <a:lnTo>
+                    <a:pt x="840" y="6"/>
+                  </a:lnTo>
+                  <a:lnTo>
+                    <a:pt x="1242" y="6"/>
+                  </a:lnTo>
+                </a:path>
+              </a:pathLst>
+            </a:custGeom>
+            <a:noFill/>
+            <a:ln w="9525">
+              <a:solidFill>
+                <a:schemeClr val="tx1"/>
+              </a:solidFill>
+              <a:round/>
+              <a:headEnd/>
+              <a:tailEnd/>
+            </a:ln>
+            <a:effectLst/>
+            <a:extLst>
+              <a:ext uri="{909E8E84-426E-40DD-AFC4-6F175D3DCCD1}">
+                <a14:hiddenFill xmlns:a14="http://schemas.microsoft.com/office/drawing/2010/main">
+                  <a:solidFill>
+                    <a:schemeClr val="accent1"/>
+                  </a:solidFill>
+                </a14:hiddenFill>
+              </a:ext>
+              <a:ext uri="{AF507438-7753-43E0-B8FC-AC1667EBCBE1}">
+                <a14:hiddenEffects xmlns:a14="http://schemas.microsoft.com/office/drawing/2010/main">
+                  <a:effectLst>
+                    <a:outerShdw dist="35921" dir="2700000" algn="ctr" rotWithShape="0">
+                      <a:schemeClr val="bg2"/>
+                    </a:outerShdw>
+                  </a:effectLst>
+                </a14:hiddenEffects>
+              </a:ext>
+            </a:extLst>
+          </p:spPr>
+          <p:txBody>
+            <a:bodyPr/>
+            <a:lstStyle/>
+            <a:p>
+              <a:endParaRPr lang="en-US"/>
+            </a:p>
+          </p:txBody>
+        </p:sp>
+        <p:sp>
+          <p:nvSpPr>
+            <p:cNvPr id="330" name="Line 83"/>
+            <p:cNvSpPr>
+              <a:spLocks noChangeShapeType="1"/>
+            </p:cNvSpPr>
+            <p:nvPr/>
+          </p:nvSpPr>
+          <p:spPr bwMode="auto">
+            <a:xfrm>
+              <a:off x="10093002" y="1238025"/>
+              <a:ext cx="0" cy="544513"/>
+            </a:xfrm>
+            <a:prstGeom prst="line">
+              <a:avLst/>
+            </a:prstGeom>
+            <a:noFill/>
+            <a:ln w="28575">
+              <a:solidFill>
+                <a:srgbClr val="00B050"/>
+              </a:solidFill>
+              <a:round/>
+              <a:headEnd type="none" w="med" len="med"/>
+              <a:tailEnd type="triangle" w="med" len="med"/>
+            </a:ln>
+            <a:effectLst/>
+            <a:extLst>
+              <a:ext uri="{909E8E84-426E-40DD-AFC4-6F175D3DCCD1}">
+                <a14:hiddenFill xmlns:a14="http://schemas.microsoft.com/office/drawing/2010/main">
+                  <a:noFill/>
+                </a14:hiddenFill>
+              </a:ext>
+              <a:ext uri="{AF507438-7753-43E0-B8FC-AC1667EBCBE1}">
+                <a14:hiddenEffects xmlns:a14="http://schemas.microsoft.com/office/drawing/2010/main">
+                  <a:effectLst>
+                    <a:outerShdw dist="35921" dir="2700000" algn="ctr" rotWithShape="0">
+                      <a:schemeClr val="bg2"/>
+                    </a:outerShdw>
+                  </a:effectLst>
+                </a14:hiddenEffects>
+              </a:ext>
+            </a:extLst>
+          </p:spPr>
+          <p:txBody>
+            <a:bodyPr/>
+            <a:lstStyle/>
+            <a:p>
+              <a:endParaRPr lang="en-US"/>
+            </a:p>
+          </p:txBody>
+        </p:sp>
+        <p:sp>
+          <p:nvSpPr>
+            <p:cNvPr id="331" name="Line 96"/>
+            <p:cNvSpPr>
+              <a:spLocks noChangeShapeType="1"/>
+            </p:cNvSpPr>
+            <p:nvPr/>
+          </p:nvSpPr>
+          <p:spPr bwMode="auto">
+            <a:xfrm>
+              <a:off x="9805739" y="1622995"/>
+              <a:ext cx="0" cy="204788"/>
+            </a:xfrm>
+            <a:prstGeom prst="line">
+              <a:avLst/>
+            </a:prstGeom>
+            <a:noFill/>
+            <a:ln w="38100" cmpd="dbl">
+              <a:solidFill>
+                <a:srgbClr val="0066CC"/>
+              </a:solidFill>
+              <a:round/>
+              <a:headEnd/>
+              <a:tailEnd type="triangle" w="med" len="med"/>
+            </a:ln>
+            <a:effectLst/>
+            <a:extLst>
+              <a:ext uri="{909E8E84-426E-40DD-AFC4-6F175D3DCCD1}">
+                <a14:hiddenFill xmlns:a14="http://schemas.microsoft.com/office/drawing/2010/main">
+                  <a:noFill/>
+                </a14:hiddenFill>
+              </a:ext>
+              <a:ext uri="{AF507438-7753-43E0-B8FC-AC1667EBCBE1}">
+                <a14:hiddenEffects xmlns:a14="http://schemas.microsoft.com/office/drawing/2010/main">
+                  <a:effectLst>
+                    <a:outerShdw dist="35921" dir="2700000" algn="ctr" rotWithShape="0">
+                      <a:schemeClr val="bg2"/>
+                    </a:outerShdw>
+                  </a:effectLst>
+                </a14:hiddenEffects>
+              </a:ext>
+            </a:extLst>
+          </p:spPr>
+          <p:txBody>
+            <a:bodyPr/>
+            <a:lstStyle/>
+            <a:p>
+              <a:endParaRPr lang="en-US"/>
+            </a:p>
+          </p:txBody>
+        </p:sp>
+        <p:sp>
+          <p:nvSpPr>
+            <p:cNvPr id="332" name="Rectangle 331"/>
+            <p:cNvSpPr>
+              <a:spLocks noChangeArrowheads="1"/>
+            </p:cNvSpPr>
+            <p:nvPr/>
+          </p:nvSpPr>
+          <p:spPr bwMode="auto">
+            <a:xfrm>
+              <a:off x="10093002" y="1382653"/>
+              <a:ext cx="634389" cy="332584"/>
+            </a:xfrm>
+            <a:prstGeom prst="rect">
+              <a:avLst/>
+            </a:prstGeom>
+            <a:noFill/>
+            <a:ln>
+              <a:noFill/>
+            </a:ln>
+            <a:effectLst/>
+            <a:extLst>
+              <a:ext uri="{909E8E84-426E-40DD-AFC4-6F175D3DCCD1}">
+                <a14:hiddenFill xmlns:a14="http://schemas.microsoft.com/office/drawing/2010/main">
+                  <a:solidFill>
+                    <a:srgbClr val="FFFFFF"/>
+                  </a:solidFill>
+                </a14:hiddenFill>
+              </a:ext>
+              <a:ext uri="{91240B29-F687-4F45-9708-019B960494DF}">
+                <a14:hiddenLine xmlns:a14="http://schemas.microsoft.com/office/drawing/2010/main" w="9525" cap="flat">
+                  <a:solidFill>
+                    <a:srgbClr val="3465A4"/>
+                  </a:solidFill>
+                  <a:round/>
+                  <a:headEnd/>
+                  <a:tailEnd/>
+                </a14:hiddenLine>
+              </a:ext>
+              <a:ext uri="{AF507438-7753-43E0-B8FC-AC1667EBCBE1}">
+                <a14:hiddenEffects xmlns:a14="http://schemas.microsoft.com/office/drawing/2010/main">
+                  <a:effectLst>
+                    <a:outerShdw dist="35921" dir="2700000" algn="ctr" rotWithShape="0">
+                      <a:srgbClr val="808080"/>
+                    </a:outerShdw>
+                  </a:effectLst>
+                </a14:hiddenEffects>
+              </a:ext>
+            </a:extLst>
+          </p:spPr>
+          <p:txBody>
+            <a:bodyPr wrap="none" lIns="85527" tIns="42764" rIns="85527" bIns="42764">
+              <a:spAutoFit/>
+            </a:bodyPr>
+            <a:lstStyle/>
+            <a:p>
+              <a:r>
+                <a:rPr lang="en-GB" sz="1600" dirty="0" err="1">
+                  <a:latin typeface="Times New Roman" pitchFamily="16" charset="0"/>
+                </a:rPr>
+                <a:t>S</a:t>
+              </a:r>
+              <a:r>
+                <a:rPr lang="en-GB" sz="1600" baseline="-25000" dirty="0" err="1">
+                  <a:latin typeface="Times New Roman" pitchFamily="16" charset="0"/>
+                </a:rPr>
+                <a:t>z</a:t>
+              </a:r>
+              <a:r>
+                <a:rPr lang="en-GB" sz="1600" dirty="0" smtClean="0">
+                  <a:latin typeface="Times New Roman" pitchFamily="16" charset="0"/>
+                </a:rPr>
+                <a:t>=</a:t>
+              </a:r>
+              <a:r>
+                <a:rPr lang="en-GB" sz="1600" i="1" dirty="0" smtClean="0">
+                  <a:latin typeface="Times New Roman" pitchFamily="16" charset="0"/>
+                </a:rPr>
+                <a:t>-</a:t>
+              </a:r>
+              <a:r>
+                <a:rPr lang="en-GB" sz="1600" dirty="0">
+                  <a:latin typeface="Times New Roman" pitchFamily="16" charset="0"/>
+                </a:rPr>
+                <a:t>1</a:t>
+              </a:r>
+            </a:p>
+          </p:txBody>
+        </p:sp>
+        <p:sp>
+          <p:nvSpPr>
+            <p:cNvPr id="333" name="ZoneTexte 332"/>
+            <p:cNvSpPr txBox="1"/>
+            <p:nvPr/>
+          </p:nvSpPr>
+          <p:spPr>
+            <a:xfrm>
+              <a:off x="9645005" y="1838821"/>
+              <a:ext cx="394660" cy="369332"/>
+            </a:xfrm>
+            <a:prstGeom prst="rect">
+              <a:avLst/>
+            </a:prstGeom>
+            <a:noFill/>
+          </p:spPr>
+          <p:txBody>
+            <a:bodyPr wrap="none" rtlCol="0">
+              <a:spAutoFit/>
+            </a:bodyPr>
+            <a:lstStyle/>
+            <a:p>
+              <a:r>
+                <a:rPr lang="fr-FR" dirty="0" smtClean="0">
+                  <a:solidFill>
+                    <a:srgbClr val="FF0000"/>
+                  </a:solidFill>
+                  <a:latin typeface="Symbol" panose="05050102010706020507" pitchFamily="18" charset="2"/>
+                </a:rPr>
+                <a:t>s</a:t>
+              </a:r>
+              <a:r>
+                <a:rPr lang="fr-FR" dirty="0" smtClean="0">
+                  <a:solidFill>
+                    <a:srgbClr val="FF0000"/>
+                  </a:solidFill>
+                </a:rPr>
+                <a:t>-</a:t>
+              </a:r>
+              <a:endParaRPr lang="en-US" dirty="0">
+                <a:solidFill>
+                  <a:srgbClr val="FF0000"/>
+                </a:solidFill>
+              </a:endParaRPr>
+            </a:p>
+          </p:txBody>
+        </p:sp>
+      </p:grpSp>
+      <p:sp>
+        <p:nvSpPr>
+          <p:cNvPr id="334" name="Rectangle 333"/>
+          <p:cNvSpPr/>
+          <p:nvPr/>
+        </p:nvSpPr>
+        <p:spPr>
+          <a:xfrm>
+            <a:off x="5290984" y="5974779"/>
+            <a:ext cx="631904" cy="307777"/>
+          </a:xfrm>
+          <a:prstGeom prst="rect">
+            <a:avLst/>
+          </a:prstGeom>
+        </p:spPr>
+        <p:txBody>
+          <a:bodyPr wrap="none">
+            <a:spAutoFit/>
+          </a:bodyPr>
+          <a:lstStyle/>
+          <a:p>
+            <a:r>
+              <a:rPr lang="fr-FR" sz="1400" b="1" dirty="0" err="1" smtClean="0">
+                <a:latin typeface="Times New Roman" panose="02020603050405020304" pitchFamily="18" charset="0"/>
+                <a:cs typeface="Times New Roman" panose="02020603050405020304" pitchFamily="18" charset="0"/>
+              </a:rPr>
+              <a:t>S</a:t>
+            </a:r>
+            <a:r>
+              <a:rPr lang="fr-FR" sz="1400" b="1" baseline="-25000" dirty="0" err="1" smtClean="0">
+                <a:latin typeface="Times New Roman" panose="02020603050405020304" pitchFamily="18" charset="0"/>
+                <a:cs typeface="Times New Roman" panose="02020603050405020304" pitchFamily="18" charset="0"/>
+              </a:rPr>
+              <a:t>z</a:t>
+            </a:r>
+            <a:r>
+              <a:rPr lang="fr-FR" sz="1400" b="1" dirty="0" smtClean="0">
+                <a:latin typeface="Times New Roman" panose="02020603050405020304" pitchFamily="18" charset="0"/>
+                <a:cs typeface="Times New Roman" panose="02020603050405020304" pitchFamily="18" charset="0"/>
+              </a:rPr>
+              <a:t>=+1</a:t>
+            </a:r>
+            <a:endParaRPr lang="en-US" sz="1400" b="1" dirty="0">
+              <a:latin typeface="Times New Roman" panose="02020603050405020304" pitchFamily="18" charset="0"/>
+              <a:cs typeface="Times New Roman" panose="02020603050405020304" pitchFamily="18" charset="0"/>
+            </a:endParaRPr>
+          </a:p>
+        </p:txBody>
+      </p:sp>
+      <p:sp>
+        <p:nvSpPr>
+          <p:cNvPr id="335" name="Rectangle 334"/>
+          <p:cNvSpPr/>
+          <p:nvPr/>
+        </p:nvSpPr>
+        <p:spPr>
+          <a:xfrm>
+            <a:off x="5033536" y="4822651"/>
+            <a:ext cx="529312" cy="307777"/>
+          </a:xfrm>
+          <a:prstGeom prst="rect">
+            <a:avLst/>
+          </a:prstGeom>
+        </p:spPr>
+        <p:txBody>
+          <a:bodyPr wrap="none">
+            <a:spAutoFit/>
+          </a:bodyPr>
+          <a:lstStyle/>
+          <a:p>
+            <a:r>
+              <a:rPr lang="fr-FR" sz="1400" b="1" dirty="0" err="1" smtClean="0">
+                <a:latin typeface="Times New Roman" panose="02020603050405020304" pitchFamily="18" charset="0"/>
+                <a:cs typeface="Times New Roman" panose="02020603050405020304" pitchFamily="18" charset="0"/>
+              </a:rPr>
+              <a:t>S</a:t>
+            </a:r>
+            <a:r>
+              <a:rPr lang="fr-FR" sz="1400" b="1" baseline="-25000" dirty="0" err="1" smtClean="0">
+                <a:latin typeface="Times New Roman" panose="02020603050405020304" pitchFamily="18" charset="0"/>
+                <a:cs typeface="Times New Roman" panose="02020603050405020304" pitchFamily="18" charset="0"/>
+              </a:rPr>
+              <a:t>z</a:t>
+            </a:r>
+            <a:r>
+              <a:rPr lang="fr-FR" sz="1400" b="1" dirty="0" smtClean="0">
+                <a:latin typeface="Times New Roman" panose="02020603050405020304" pitchFamily="18" charset="0"/>
+                <a:cs typeface="Times New Roman" panose="02020603050405020304" pitchFamily="18" charset="0"/>
+              </a:rPr>
+              <a:t>=0</a:t>
+            </a:r>
+            <a:endParaRPr lang="en-US" sz="1400" b="1" dirty="0">
+              <a:latin typeface="Times New Roman" panose="02020603050405020304" pitchFamily="18" charset="0"/>
+              <a:cs typeface="Times New Roman" panose="02020603050405020304" pitchFamily="18" charset="0"/>
+            </a:endParaRPr>
+          </a:p>
+        </p:txBody>
+      </p:sp>
+      <p:sp>
+        <p:nvSpPr>
+          <p:cNvPr id="336" name="Rectangle 335"/>
+          <p:cNvSpPr/>
+          <p:nvPr/>
+        </p:nvSpPr>
+        <p:spPr>
+          <a:xfrm>
+            <a:off x="4542177" y="4750643"/>
+            <a:ext cx="588623" cy="307777"/>
+          </a:xfrm>
+          <a:prstGeom prst="rect">
+            <a:avLst/>
+          </a:prstGeom>
+        </p:spPr>
+        <p:txBody>
+          <a:bodyPr wrap="none">
+            <a:spAutoFit/>
+          </a:bodyPr>
+          <a:lstStyle/>
+          <a:p>
+            <a:r>
+              <a:rPr lang="fr-FR" sz="1400" b="1" dirty="0" err="1" smtClean="0">
+                <a:latin typeface="Times New Roman" panose="02020603050405020304" pitchFamily="18" charset="0"/>
+                <a:cs typeface="Times New Roman" panose="02020603050405020304" pitchFamily="18" charset="0"/>
+              </a:rPr>
+              <a:t>S</a:t>
+            </a:r>
+            <a:r>
+              <a:rPr lang="fr-FR" sz="1400" b="1" baseline="-25000" dirty="0" err="1" smtClean="0">
+                <a:latin typeface="Times New Roman" panose="02020603050405020304" pitchFamily="18" charset="0"/>
+                <a:cs typeface="Times New Roman" panose="02020603050405020304" pitchFamily="18" charset="0"/>
+              </a:rPr>
+              <a:t>z</a:t>
+            </a:r>
+            <a:r>
+              <a:rPr lang="fr-FR" sz="1400" b="1" dirty="0" smtClean="0">
+                <a:latin typeface="Times New Roman" panose="02020603050405020304" pitchFamily="18" charset="0"/>
+                <a:cs typeface="Times New Roman" panose="02020603050405020304" pitchFamily="18" charset="0"/>
+              </a:rPr>
+              <a:t>=-1</a:t>
+            </a:r>
+            <a:endParaRPr lang="en-US" sz="1400" b="1" dirty="0">
+              <a:latin typeface="Times New Roman" panose="02020603050405020304" pitchFamily="18" charset="0"/>
+              <a:cs typeface="Times New Roman" panose="02020603050405020304" pitchFamily="18" charset="0"/>
+            </a:endParaRPr>
+          </a:p>
+        </p:txBody>
+      </p:sp>
+      <p:sp>
+        <p:nvSpPr>
+          <p:cNvPr id="337" name="Rectangle 336"/>
+          <p:cNvSpPr/>
+          <p:nvPr/>
+        </p:nvSpPr>
+        <p:spPr>
+          <a:xfrm>
+            <a:off x="4901291" y="502171"/>
+            <a:ext cx="588623" cy="307777"/>
+          </a:xfrm>
+          <a:prstGeom prst="rect">
+            <a:avLst/>
+          </a:prstGeom>
+        </p:spPr>
+        <p:txBody>
+          <a:bodyPr wrap="none">
+            <a:spAutoFit/>
+          </a:bodyPr>
+          <a:lstStyle/>
+          <a:p>
+            <a:r>
+              <a:rPr lang="fr-FR" sz="1400" b="1" dirty="0" err="1" smtClean="0">
+                <a:latin typeface="Times New Roman" panose="02020603050405020304" pitchFamily="18" charset="0"/>
+                <a:cs typeface="Times New Roman" panose="02020603050405020304" pitchFamily="18" charset="0"/>
+              </a:rPr>
+              <a:t>S</a:t>
+            </a:r>
+            <a:r>
+              <a:rPr lang="fr-FR" sz="1400" b="1" baseline="-25000" dirty="0" err="1" smtClean="0">
+                <a:latin typeface="Times New Roman" panose="02020603050405020304" pitchFamily="18" charset="0"/>
+                <a:cs typeface="Times New Roman" panose="02020603050405020304" pitchFamily="18" charset="0"/>
+              </a:rPr>
+              <a:t>z</a:t>
+            </a:r>
+            <a:r>
+              <a:rPr lang="fr-FR" sz="1400" b="1" dirty="0" smtClean="0">
+                <a:latin typeface="Times New Roman" panose="02020603050405020304" pitchFamily="18" charset="0"/>
+                <a:cs typeface="Times New Roman" panose="02020603050405020304" pitchFamily="18" charset="0"/>
+              </a:rPr>
+              <a:t>=-1</a:t>
+            </a:r>
+            <a:endParaRPr lang="en-US" sz="1400" b="1" dirty="0">
+              <a:latin typeface="Times New Roman" panose="02020603050405020304" pitchFamily="18" charset="0"/>
+              <a:cs typeface="Times New Roman" panose="02020603050405020304" pitchFamily="18" charset="0"/>
+            </a:endParaRPr>
+          </a:p>
+        </p:txBody>
+      </p:sp>
+      <p:sp>
+        <p:nvSpPr>
+          <p:cNvPr id="338" name="Rectangle 337"/>
+          <p:cNvSpPr/>
+          <p:nvPr/>
+        </p:nvSpPr>
+        <p:spPr>
+          <a:xfrm>
+            <a:off x="4367257" y="286147"/>
+            <a:ext cx="529312" cy="307777"/>
+          </a:xfrm>
+          <a:prstGeom prst="rect">
+            <a:avLst/>
+          </a:prstGeom>
+        </p:spPr>
+        <p:txBody>
+          <a:bodyPr wrap="none">
+            <a:spAutoFit/>
+          </a:bodyPr>
+          <a:lstStyle/>
+          <a:p>
+            <a:r>
+              <a:rPr lang="fr-FR" sz="1400" b="1" dirty="0" err="1" smtClean="0">
+                <a:latin typeface="Times New Roman" panose="02020603050405020304" pitchFamily="18" charset="0"/>
+                <a:cs typeface="Times New Roman" panose="02020603050405020304" pitchFamily="18" charset="0"/>
+              </a:rPr>
+              <a:t>S</a:t>
+            </a:r>
+            <a:r>
+              <a:rPr lang="fr-FR" sz="1400" b="1" baseline="-25000" dirty="0" err="1" smtClean="0">
+                <a:latin typeface="Times New Roman" panose="02020603050405020304" pitchFamily="18" charset="0"/>
+                <a:cs typeface="Times New Roman" panose="02020603050405020304" pitchFamily="18" charset="0"/>
+              </a:rPr>
+              <a:t>z</a:t>
+            </a:r>
+            <a:r>
+              <a:rPr lang="fr-FR" sz="1400" b="1" dirty="0" smtClean="0">
+                <a:latin typeface="Times New Roman" panose="02020603050405020304" pitchFamily="18" charset="0"/>
+                <a:cs typeface="Times New Roman" panose="02020603050405020304" pitchFamily="18" charset="0"/>
+              </a:rPr>
+              <a:t>=0</a:t>
+            </a:r>
+            <a:endParaRPr lang="en-US" sz="1400" b="1" dirty="0">
+              <a:latin typeface="Times New Roman" panose="02020603050405020304" pitchFamily="18" charset="0"/>
+              <a:cs typeface="Times New Roman" panose="02020603050405020304" pitchFamily="18" charset="0"/>
+            </a:endParaRPr>
+          </a:p>
+        </p:txBody>
+      </p:sp>
+      <p:sp>
+        <p:nvSpPr>
+          <p:cNvPr id="339" name="Rectangle 338"/>
+          <p:cNvSpPr/>
+          <p:nvPr/>
+        </p:nvSpPr>
+        <p:spPr>
+          <a:xfrm>
+            <a:off x="4282872" y="1510283"/>
+            <a:ext cx="631904" cy="307777"/>
+          </a:xfrm>
+          <a:prstGeom prst="rect">
+            <a:avLst/>
+          </a:prstGeom>
+        </p:spPr>
+        <p:txBody>
+          <a:bodyPr wrap="none">
+            <a:spAutoFit/>
+          </a:bodyPr>
+          <a:lstStyle/>
+          <a:p>
+            <a:r>
+              <a:rPr lang="fr-FR" sz="1400" b="1" dirty="0" err="1" smtClean="0">
+                <a:latin typeface="Times New Roman" panose="02020603050405020304" pitchFamily="18" charset="0"/>
+                <a:cs typeface="Times New Roman" panose="02020603050405020304" pitchFamily="18" charset="0"/>
+              </a:rPr>
+              <a:t>S</a:t>
+            </a:r>
+            <a:r>
+              <a:rPr lang="fr-FR" sz="1400" b="1" baseline="-25000" dirty="0" err="1" smtClean="0">
+                <a:latin typeface="Times New Roman" panose="02020603050405020304" pitchFamily="18" charset="0"/>
+                <a:cs typeface="Times New Roman" panose="02020603050405020304" pitchFamily="18" charset="0"/>
+              </a:rPr>
+              <a:t>z</a:t>
+            </a:r>
+            <a:r>
+              <a:rPr lang="fr-FR" sz="1400" b="1" dirty="0" smtClean="0">
+                <a:latin typeface="Times New Roman" panose="02020603050405020304" pitchFamily="18" charset="0"/>
+                <a:cs typeface="Times New Roman" panose="02020603050405020304" pitchFamily="18" charset="0"/>
+              </a:rPr>
+              <a:t>=+1</a:t>
+            </a:r>
+            <a:endParaRPr lang="en-US" sz="1400" b="1" dirty="0">
+              <a:latin typeface="Times New Roman" panose="02020603050405020304" pitchFamily="18" charset="0"/>
+              <a:cs typeface="Times New Roman" panose="02020603050405020304" pitchFamily="18" charset="0"/>
+            </a:endParaRPr>
+          </a:p>
+        </p:txBody>
+      </p:sp>
+      <p:grpSp>
+        <p:nvGrpSpPr>
+          <p:cNvPr id="340" name="Groupe 339"/>
+          <p:cNvGrpSpPr>
+            <a:grpSpLocks noChangeAspect="1"/>
+          </p:cNvGrpSpPr>
+          <p:nvPr/>
+        </p:nvGrpSpPr>
+        <p:grpSpPr>
+          <a:xfrm>
+            <a:off x="6040942" y="2122348"/>
+            <a:ext cx="2258210" cy="2360008"/>
+            <a:chOff x="5933802" y="2472283"/>
+            <a:chExt cx="1693849" cy="1770203"/>
+          </a:xfrm>
+        </p:grpSpPr>
+        <p:cxnSp>
+          <p:nvCxnSpPr>
+            <p:cNvPr id="341" name="Connecteur droit 340"/>
+            <p:cNvCxnSpPr/>
+            <p:nvPr/>
+          </p:nvCxnSpPr>
+          <p:spPr>
+            <a:xfrm>
+              <a:off x="6077818" y="3758406"/>
+              <a:ext cx="1008112" cy="0"/>
+            </a:xfrm>
+            <a:prstGeom prst="line">
+              <a:avLst/>
+            </a:prstGeom>
+          </p:spPr>
+          <p:style>
+            <a:lnRef idx="1">
+              <a:schemeClr val="dk1"/>
+            </a:lnRef>
+            <a:fillRef idx="0">
+              <a:schemeClr val="dk1"/>
+            </a:fillRef>
+            <a:effectRef idx="0">
+              <a:schemeClr val="dk1"/>
+            </a:effectRef>
+            <a:fontRef idx="minor">
+              <a:schemeClr val="tx1"/>
+            </a:fontRef>
+          </p:style>
+        </p:cxnSp>
+        <p:cxnSp>
+          <p:nvCxnSpPr>
+            <p:cNvPr id="342" name="Connecteur droit 341"/>
+            <p:cNvCxnSpPr/>
+            <p:nvPr/>
+          </p:nvCxnSpPr>
+          <p:spPr>
+            <a:xfrm flipV="1">
+              <a:off x="6077818" y="2832323"/>
+              <a:ext cx="1008112" cy="407930"/>
+            </a:xfrm>
+            <a:prstGeom prst="line">
+              <a:avLst/>
+            </a:prstGeom>
+          </p:spPr>
+          <p:style>
+            <a:lnRef idx="1">
+              <a:schemeClr val="dk1"/>
+            </a:lnRef>
+            <a:fillRef idx="0">
+              <a:schemeClr val="dk1"/>
+            </a:fillRef>
+            <a:effectRef idx="0">
+              <a:schemeClr val="dk1"/>
+            </a:effectRef>
+            <a:fontRef idx="minor">
+              <a:schemeClr val="tx1"/>
+            </a:fontRef>
+          </p:style>
+        </p:cxnSp>
+        <p:cxnSp>
+          <p:nvCxnSpPr>
+            <p:cNvPr id="343" name="Connecteur droit 342"/>
+            <p:cNvCxnSpPr/>
+            <p:nvPr/>
+          </p:nvCxnSpPr>
+          <p:spPr>
+            <a:xfrm>
+              <a:off x="6077818" y="3240252"/>
+              <a:ext cx="1008112" cy="219490"/>
+            </a:xfrm>
+            <a:prstGeom prst="line">
+              <a:avLst/>
+            </a:prstGeom>
+          </p:spPr>
+          <p:style>
+            <a:lnRef idx="1">
+              <a:schemeClr val="dk1"/>
+            </a:lnRef>
+            <a:fillRef idx="0">
+              <a:schemeClr val="dk1"/>
+            </a:fillRef>
+            <a:effectRef idx="0">
+              <a:schemeClr val="dk1"/>
+            </a:effectRef>
+            <a:fontRef idx="minor">
+              <a:schemeClr val="tx1"/>
+            </a:fontRef>
+          </p:style>
+        </p:cxnSp>
+        <p:sp>
+          <p:nvSpPr>
+            <p:cNvPr id="344" name="Line 10"/>
+            <p:cNvSpPr>
+              <a:spLocks noChangeShapeType="1"/>
+            </p:cNvSpPr>
+            <p:nvPr/>
+          </p:nvSpPr>
+          <p:spPr bwMode="auto">
+            <a:xfrm flipV="1">
+              <a:off x="5933802" y="3990502"/>
+              <a:ext cx="1440160" cy="0"/>
+            </a:xfrm>
+            <a:prstGeom prst="line">
+              <a:avLst/>
+            </a:prstGeom>
+            <a:noFill/>
+            <a:ln w="12600" cap="flat">
+              <a:solidFill>
+                <a:srgbClr val="000000"/>
+              </a:solidFill>
+              <a:round/>
+              <a:headEnd type="none" w="med" len="med"/>
+              <a:tailEnd type="arrow" w="med" len="med"/>
+            </a:ln>
+            <a:effectLst/>
+            <a:extLst>
+              <a:ext uri="{909E8E84-426E-40DD-AFC4-6F175D3DCCD1}">
+                <a14:hiddenFill xmlns:a14="http://schemas.microsoft.com/office/drawing/2010/main">
+                  <a:noFill/>
+                </a14:hiddenFill>
+              </a:ext>
+              <a:ext uri="{AF507438-7753-43E0-B8FC-AC1667EBCBE1}">
+                <a14:hiddenEffects xmlns:a14="http://schemas.microsoft.com/office/drawing/2010/main">
+                  <a:effectLst>
+                    <a:outerShdw dist="35921" dir="2700000" algn="ctr" rotWithShape="0">
+                      <a:srgbClr val="808080"/>
+                    </a:outerShdw>
+                  </a:effectLst>
+                </a14:hiddenEffects>
+              </a:ext>
+            </a:extLst>
+          </p:spPr>
+          <p:txBody>
+            <a:bodyPr lIns="86895" tIns="43448" rIns="86895" bIns="43448"/>
+            <a:lstStyle/>
+            <a:p>
+              <a:endParaRPr lang="fr-FR"/>
+            </a:p>
+          </p:txBody>
+        </p:sp>
+        <p:sp>
+          <p:nvSpPr>
+            <p:cNvPr id="345" name="Line 10"/>
+            <p:cNvSpPr>
+              <a:spLocks noChangeShapeType="1"/>
+            </p:cNvSpPr>
+            <p:nvPr/>
+          </p:nvSpPr>
+          <p:spPr bwMode="auto">
+            <a:xfrm flipV="1">
+              <a:off x="6076255" y="2577483"/>
+              <a:ext cx="0" cy="1563100"/>
+            </a:xfrm>
+            <a:prstGeom prst="line">
+              <a:avLst/>
+            </a:prstGeom>
+            <a:noFill/>
+            <a:ln w="12600" cap="flat">
+              <a:solidFill>
+                <a:srgbClr val="000000"/>
+              </a:solidFill>
+              <a:round/>
+              <a:headEnd type="none" w="med" len="med"/>
+              <a:tailEnd type="arrow" w="med" len="med"/>
+            </a:ln>
+            <a:effectLst/>
+            <a:extLst>
+              <a:ext uri="{909E8E84-426E-40DD-AFC4-6F175D3DCCD1}">
+                <a14:hiddenFill xmlns:a14="http://schemas.microsoft.com/office/drawing/2010/main">
+                  <a:noFill/>
+                </a14:hiddenFill>
+              </a:ext>
+              <a:ext uri="{AF507438-7753-43E0-B8FC-AC1667EBCBE1}">
+                <a14:hiddenEffects xmlns:a14="http://schemas.microsoft.com/office/drawing/2010/main">
+                  <a:effectLst>
+                    <a:outerShdw dist="35921" dir="2700000" algn="ctr" rotWithShape="0">
+                      <a:srgbClr val="808080"/>
+                    </a:outerShdw>
+                  </a:effectLst>
+                </a14:hiddenEffects>
+              </a:ext>
+            </a:extLst>
+          </p:spPr>
+          <p:txBody>
+            <a:bodyPr lIns="86895" tIns="43448" rIns="86895" bIns="43448"/>
+            <a:lstStyle/>
+            <a:p>
+              <a:endParaRPr lang="fr-FR"/>
+            </a:p>
+          </p:txBody>
+        </p:sp>
+        <p:sp>
+          <p:nvSpPr>
+            <p:cNvPr id="346" name="Rectangle 345"/>
+            <p:cNvSpPr/>
+            <p:nvPr/>
+          </p:nvSpPr>
+          <p:spPr>
+            <a:xfrm>
+              <a:off x="7085930" y="3615317"/>
+              <a:ext cx="437910" cy="277030"/>
+            </a:xfrm>
+            <a:prstGeom prst="rect">
+              <a:avLst/>
+            </a:prstGeom>
+          </p:spPr>
+          <p:txBody>
+            <a:bodyPr wrap="none">
+              <a:spAutoFit/>
+            </a:bodyPr>
+            <a:lstStyle/>
+            <a:p>
+              <a:r>
+                <a:rPr lang="fr-FR" dirty="0" err="1" smtClean="0"/>
+                <a:t>S</a:t>
+              </a:r>
+              <a:r>
+                <a:rPr lang="fr-FR" baseline="-25000" dirty="0" err="1" smtClean="0"/>
+                <a:t>z</a:t>
+              </a:r>
+              <a:r>
+                <a:rPr lang="fr-FR" dirty="0" smtClean="0"/>
+                <a:t>=0</a:t>
+              </a:r>
+              <a:endParaRPr lang="en-US" dirty="0"/>
+            </a:p>
+          </p:txBody>
+        </p:sp>
+        <p:sp>
+          <p:nvSpPr>
+            <p:cNvPr id="347" name="Rectangle 346"/>
+            <p:cNvSpPr/>
+            <p:nvPr/>
+          </p:nvSpPr>
+          <p:spPr>
+            <a:xfrm>
+              <a:off x="7085930" y="3331540"/>
+              <a:ext cx="490815" cy="277030"/>
+            </a:xfrm>
+            <a:prstGeom prst="rect">
+              <a:avLst/>
+            </a:prstGeom>
+          </p:spPr>
+          <p:txBody>
+            <a:bodyPr wrap="none">
+              <a:spAutoFit/>
+            </a:bodyPr>
+            <a:lstStyle/>
+            <a:p>
+              <a:r>
+                <a:rPr lang="fr-FR" dirty="0" err="1" smtClean="0"/>
+                <a:t>S</a:t>
+              </a:r>
+              <a:r>
+                <a:rPr lang="fr-FR" baseline="-25000" dirty="0" err="1" smtClean="0"/>
+                <a:t>z</a:t>
+              </a:r>
+              <a:r>
+                <a:rPr lang="fr-FR" dirty="0" smtClean="0"/>
+                <a:t>=-1</a:t>
+              </a:r>
+              <a:endParaRPr lang="en-US" dirty="0"/>
+            </a:p>
+          </p:txBody>
+        </p:sp>
+        <p:sp>
+          <p:nvSpPr>
+            <p:cNvPr id="348" name="Rectangle 347"/>
+            <p:cNvSpPr/>
+            <p:nvPr/>
+          </p:nvSpPr>
+          <p:spPr>
+            <a:xfrm>
+              <a:off x="7103169" y="2688307"/>
+              <a:ext cx="524482" cy="277030"/>
+            </a:xfrm>
+            <a:prstGeom prst="rect">
+              <a:avLst/>
+            </a:prstGeom>
+          </p:spPr>
+          <p:txBody>
+            <a:bodyPr wrap="none">
+              <a:spAutoFit/>
+            </a:bodyPr>
+            <a:lstStyle/>
+            <a:p>
+              <a:r>
+                <a:rPr lang="fr-FR" dirty="0" err="1"/>
+                <a:t>S</a:t>
+              </a:r>
+              <a:r>
+                <a:rPr lang="fr-FR" baseline="-25000" dirty="0" err="1"/>
+                <a:t>z</a:t>
+              </a:r>
+              <a:r>
+                <a:rPr lang="fr-FR" dirty="0" smtClean="0"/>
+                <a:t>=+1</a:t>
+              </a:r>
+              <a:endParaRPr lang="en-US" dirty="0"/>
+            </a:p>
+          </p:txBody>
+        </p:sp>
+        <p:sp>
+          <p:nvSpPr>
+            <p:cNvPr id="349" name="Rectangle 348"/>
+            <p:cNvSpPr/>
+            <p:nvPr/>
+          </p:nvSpPr>
+          <p:spPr>
+            <a:xfrm>
+              <a:off x="6073875" y="2472283"/>
+              <a:ext cx="244325" cy="277030"/>
+            </a:xfrm>
+            <a:prstGeom prst="rect">
+              <a:avLst/>
+            </a:prstGeom>
+          </p:spPr>
+          <p:txBody>
+            <a:bodyPr wrap="none">
+              <a:spAutoFit/>
+            </a:bodyPr>
+            <a:lstStyle/>
+            <a:p>
+              <a:r>
+                <a:rPr lang="fr-FR" dirty="0" smtClean="0">
+                  <a:latin typeface="Times New Roman" panose="02020603050405020304" pitchFamily="18" charset="0"/>
+                  <a:cs typeface="Times New Roman" panose="02020603050405020304" pitchFamily="18" charset="0"/>
+                </a:rPr>
+                <a:t>E</a:t>
+              </a:r>
+              <a:endParaRPr lang="en-US" dirty="0">
+                <a:latin typeface="Times New Roman" panose="02020603050405020304" pitchFamily="18" charset="0"/>
+                <a:cs typeface="Times New Roman" panose="02020603050405020304" pitchFamily="18" charset="0"/>
+              </a:endParaRPr>
+            </a:p>
+          </p:txBody>
+        </p:sp>
+        <p:sp>
+          <p:nvSpPr>
+            <p:cNvPr id="350" name="ZoneTexte 349"/>
+            <p:cNvSpPr txBox="1"/>
+            <p:nvPr/>
+          </p:nvSpPr>
+          <p:spPr>
+            <a:xfrm>
+              <a:off x="7246775" y="3965456"/>
+              <a:ext cx="305648" cy="277030"/>
+            </a:xfrm>
+            <a:prstGeom prst="rect">
+              <a:avLst/>
+            </a:prstGeom>
+            <a:noFill/>
+          </p:spPr>
+          <p:txBody>
+            <a:bodyPr wrap="none" rtlCol="0">
+              <a:spAutoFit/>
+            </a:bodyPr>
+            <a:lstStyle/>
+            <a:p>
+              <a:r>
+                <a:rPr lang="fr-FR" dirty="0" err="1" smtClean="0">
+                  <a:latin typeface="Times New Roman" panose="02020603050405020304" pitchFamily="18" charset="0"/>
+                  <a:cs typeface="Times New Roman" panose="02020603050405020304" pitchFamily="18" charset="0"/>
+                </a:rPr>
+                <a:t>B</a:t>
+              </a:r>
+              <a:r>
+                <a:rPr lang="fr-FR" baseline="-25000" dirty="0" err="1" smtClean="0">
+                  <a:latin typeface="Times New Roman" panose="02020603050405020304" pitchFamily="18" charset="0"/>
+                  <a:cs typeface="Times New Roman" panose="02020603050405020304" pitchFamily="18" charset="0"/>
+                </a:rPr>
+                <a:t>z</a:t>
+              </a:r>
+              <a:endParaRPr lang="en-US" sz="1600" dirty="0">
+                <a:latin typeface="Times New Roman" panose="02020603050405020304" pitchFamily="18" charset="0"/>
+                <a:cs typeface="Times New Roman" panose="02020603050405020304" pitchFamily="18" charset="0"/>
+              </a:endParaRPr>
+            </a:p>
+          </p:txBody>
+        </p:sp>
+      </p:grpSp>
+      <p:sp>
+        <p:nvSpPr>
+          <p:cNvPr id="351" name="ZoneTexte 350"/>
+          <p:cNvSpPr txBox="1"/>
+          <p:nvPr/>
+        </p:nvSpPr>
+        <p:spPr>
+          <a:xfrm>
+            <a:off x="5738615" y="2148483"/>
+            <a:ext cx="526106" cy="461665"/>
+          </a:xfrm>
+          <a:prstGeom prst="rect">
+            <a:avLst/>
+          </a:prstGeom>
+          <a:noFill/>
+        </p:spPr>
+        <p:txBody>
+          <a:bodyPr wrap="none" rtlCol="0">
+            <a:spAutoFit/>
+          </a:bodyPr>
+          <a:lstStyle/>
+          <a:p>
+            <a:r>
+              <a:rPr lang="fr-FR" sz="2400" dirty="0" smtClean="0">
+                <a:latin typeface="Times New Roman" panose="02020603050405020304" pitchFamily="18" charset="0"/>
+                <a:cs typeface="Times New Roman" panose="02020603050405020304" pitchFamily="18" charset="0"/>
+              </a:rPr>
+              <a:t>(c)</a:t>
+            </a:r>
+            <a:endParaRPr lang="fr-FR" sz="2400" dirty="0">
+              <a:latin typeface="Times New Roman" panose="02020603050405020304" pitchFamily="18" charset="0"/>
+              <a:cs typeface="Times New Roman" panose="02020603050405020304" pitchFamily="18" charset="0"/>
+            </a:endParaRPr>
+          </a:p>
+        </p:txBody>
+      </p:sp>
     </p:spTree>
     <p:extLst>
       <p:ext uri="{BB962C8B-B14F-4D97-AF65-F5344CB8AC3E}">
@@ -4405,4 +6848,289 @@
   <a:objectDefaults/>
   <a:extraClrSchemeLst/>
 </a:theme>
+</file>
+
+<file path=ppt/theme/theme2.xml><?xml version="1.0" encoding="utf-8"?>
+<a:theme xmlns:a="http://schemas.openxmlformats.org/drawingml/2006/main" name="Thème Office">
+  <a:themeElements>
+    <a:clrScheme name="Office">
+      <a:dk1>
+        <a:sysClr val="windowText" lastClr="000000"/>
+      </a:dk1>
+      <a:lt1>
+        <a:sysClr val="window" lastClr="FFFFFF"/>
+      </a:lt1>
+      <a:dk2>
+        <a:srgbClr val="1F497D"/>
+      </a:dk2>
+      <a:lt2>
+        <a:srgbClr val="EEECE1"/>
+      </a:lt2>
+      <a:accent1>
+        <a:srgbClr val="4F81BD"/>
+      </a:accent1>
+      <a:accent2>
+        <a:srgbClr val="C0504D"/>
+      </a:accent2>
+      <a:accent3>
+        <a:srgbClr val="9BBB59"/>
+      </a:accent3>
+      <a:accent4>
+        <a:srgbClr val="8064A2"/>
+      </a:accent4>
+      <a:accent5>
+        <a:srgbClr val="4BACC6"/>
+      </a:accent5>
+      <a:accent6>
+        <a:srgbClr val="F79646"/>
+      </a:accent6>
+      <a:hlink>
+        <a:srgbClr val="0000FF"/>
+      </a:hlink>
+      <a:folHlink>
+        <a:srgbClr val="800080"/>
+      </a:folHlink>
+    </a:clrScheme>
+    <a:fontScheme name="Office">
+      <a:majorFont>
+        <a:latin typeface="Calibri"/>
+        <a:ea typeface=""/>
+        <a:cs typeface=""/>
+        <a:font script="Jpan" typeface="ＭＳ Ｐゴシック"/>
+        <a:font script="Hang" typeface="맑은 고딕"/>
+        <a:font script="Hans" typeface="宋体"/>
+        <a:font script="Hant" typeface="新細明體"/>
+        <a:font script="Arab" typeface="Times New Roman"/>
+        <a:font script="Hebr" typeface="Times New Roman"/>
+        <a:font script="Thai" typeface="Angsana New"/>
+        <a:font script="Ethi" typeface="Nyala"/>
+        <a:font script="Beng" typeface="Vrinda"/>
+        <a:font script="Gujr" typeface="Shruti"/>
+        <a:font script="Khmr" typeface="MoolBoran"/>
+        <a:font script="Knda" typeface="Tunga"/>
+        <a:font script="Guru" typeface="Raavi"/>
+        <a:font script="Cans" typeface="Euphemia"/>
+        <a:font script="Cher" typeface="Plantagenet Cherokee"/>
+        <a:font script="Yiii" typeface="Microsoft Yi Baiti"/>
+        <a:font script="Tibt" typeface="Microsoft Himalaya"/>
+        <a:font script="Thaa" typeface="MV Boli"/>
+        <a:font script="Deva" typeface="Mangal"/>
+        <a:font script="Telu" typeface="Gautami"/>
+        <a:font script="Taml" typeface="Latha"/>
+        <a:font script="Syrc" typeface="Estrangelo Edessa"/>
+        <a:font script="Orya" typeface="Kalinga"/>
+        <a:font script="Mlym" typeface="Kartika"/>
+        <a:font script="Laoo" typeface="DokChampa"/>
+        <a:font script="Sinh" typeface="Iskoola Pota"/>
+        <a:font script="Mong" typeface="Mongolian Baiti"/>
+        <a:font script="Viet" typeface="Times New Roman"/>
+        <a:font script="Uigh" typeface="Microsoft Uighur"/>
+        <a:font script="Geor" typeface="Sylfaen"/>
+      </a:majorFont>
+      <a:minorFont>
+        <a:latin typeface="Calibri"/>
+        <a:ea typeface=""/>
+        <a:cs typeface=""/>
+        <a:font script="Jpan" typeface="ＭＳ Ｐゴシック"/>
+        <a:font script="Hang" typeface="맑은 고딕"/>
+        <a:font script="Hans" typeface="宋体"/>
+        <a:font script="Hant" typeface="新細明體"/>
+        <a:font script="Arab" typeface="Arial"/>
+        <a:font script="Hebr" typeface="Arial"/>
+        <a:font script="Thai" typeface="Cordia New"/>
+        <a:font script="Ethi" typeface="Nyala"/>
+        <a:font script="Beng" typeface="Vrinda"/>
+        <a:font script="Gujr" typeface="Shruti"/>
+        <a:font script="Khmr" typeface="DaunPenh"/>
+        <a:font script="Knda" typeface="Tunga"/>
+        <a:font script="Guru" typeface="Raavi"/>
+        <a:font script="Cans" typeface="Euphemia"/>
+        <a:font script="Cher" typeface="Plantagenet Cherokee"/>
+        <a:font script="Yiii" typeface="Microsoft Yi Baiti"/>
+        <a:font script="Tibt" typeface="Microsoft Himalaya"/>
+        <a:font script="Thaa" typeface="MV Boli"/>
+        <a:font script="Deva" typeface="Mangal"/>
+        <a:font script="Telu" typeface="Gautami"/>
+        <a:font script="Taml" typeface="Latha"/>
+        <a:font script="Syrc" typeface="Estrangelo Edessa"/>
+        <a:font script="Orya" typeface="Kalinga"/>
+        <a:font script="Mlym" typeface="Kartika"/>
+        <a:font script="Laoo" typeface="DokChampa"/>
+        <a:font script="Sinh" typeface="Iskoola Pota"/>
+        <a:font script="Mong" typeface="Mongolian Baiti"/>
+        <a:font script="Viet" typeface="Arial"/>
+        <a:font script="Uigh" typeface="Microsoft Uighur"/>
+        <a:font script="Geor" typeface="Sylfaen"/>
+      </a:minorFont>
+    </a:fontScheme>
+    <a:fmtScheme name="Office">
+      <a:fillStyleLst>
+        <a:solidFill>
+          <a:schemeClr val="phClr"/>
+        </a:solidFill>
+        <a:gradFill rotWithShape="1">
+          <a:gsLst>
+            <a:gs pos="0">
+              <a:schemeClr val="phClr">
+                <a:tint val="50000"/>
+                <a:satMod val="300000"/>
+              </a:schemeClr>
+            </a:gs>
+            <a:gs pos="35000">
+              <a:schemeClr val="phClr">
+                <a:tint val="37000"/>
+                <a:satMod val="300000"/>
+              </a:schemeClr>
+            </a:gs>
+            <a:gs pos="100000">
+              <a:schemeClr val="phClr">
+                <a:tint val="15000"/>
+                <a:satMod val="350000"/>
+              </a:schemeClr>
+            </a:gs>
+          </a:gsLst>
+          <a:lin ang="16200000" scaled="1"/>
+        </a:gradFill>
+        <a:gradFill rotWithShape="1">
+          <a:gsLst>
+            <a:gs pos="0">
+              <a:schemeClr val="phClr">
+                <a:shade val="51000"/>
+                <a:satMod val="130000"/>
+              </a:schemeClr>
+            </a:gs>
+            <a:gs pos="80000">
+              <a:schemeClr val="phClr">
+                <a:shade val="93000"/>
+                <a:satMod val="130000"/>
+              </a:schemeClr>
+            </a:gs>
+            <a:gs pos="100000">
+              <a:schemeClr val="phClr">
+                <a:shade val="94000"/>
+                <a:satMod val="135000"/>
+              </a:schemeClr>
+            </a:gs>
+          </a:gsLst>
+          <a:lin ang="16200000" scaled="0"/>
+        </a:gradFill>
+      </a:fillStyleLst>
+      <a:lnStyleLst>
+        <a:ln w="9525" cap="flat" cmpd="sng" algn="ctr">
+          <a:solidFill>
+            <a:schemeClr val="phClr">
+              <a:shade val="95000"/>
+              <a:satMod val="105000"/>
+            </a:schemeClr>
+          </a:solidFill>
+          <a:prstDash val="solid"/>
+        </a:ln>
+        <a:ln w="25400" cap="flat" cmpd="sng" algn="ctr">
+          <a:solidFill>
+            <a:schemeClr val="phClr"/>
+          </a:solidFill>
+          <a:prstDash val="solid"/>
+        </a:ln>
+        <a:ln w="38100" cap="flat" cmpd="sng" algn="ctr">
+          <a:solidFill>
+            <a:schemeClr val="phClr"/>
+          </a:solidFill>
+          <a:prstDash val="solid"/>
+        </a:ln>
+      </a:lnStyleLst>
+      <a:effectStyleLst>
+        <a:effectStyle>
+          <a:effectLst>
+            <a:outerShdw blurRad="40000" dist="20000" dir="5400000" rotWithShape="0">
+              <a:srgbClr val="000000">
+                <a:alpha val="38000"/>
+              </a:srgbClr>
+            </a:outerShdw>
+          </a:effectLst>
+        </a:effectStyle>
+        <a:effectStyle>
+          <a:effectLst>
+            <a:outerShdw blurRad="40000" dist="23000" dir="5400000" rotWithShape="0">
+              <a:srgbClr val="000000">
+                <a:alpha val="35000"/>
+              </a:srgbClr>
+            </a:outerShdw>
+          </a:effectLst>
+        </a:effectStyle>
+        <a:effectStyle>
+          <a:effectLst>
+            <a:outerShdw blurRad="40000" dist="23000" dir="5400000" rotWithShape="0">
+              <a:srgbClr val="000000">
+                <a:alpha val="35000"/>
+              </a:srgbClr>
+            </a:outerShdw>
+          </a:effectLst>
+          <a:scene3d>
+            <a:camera prst="orthographicFront">
+              <a:rot lat="0" lon="0" rev="0"/>
+            </a:camera>
+            <a:lightRig rig="threePt" dir="t">
+              <a:rot lat="0" lon="0" rev="1200000"/>
+            </a:lightRig>
+          </a:scene3d>
+          <a:sp3d>
+            <a:bevelT w="63500" h="25400"/>
+          </a:sp3d>
+        </a:effectStyle>
+      </a:effectStyleLst>
+      <a:bgFillStyleLst>
+        <a:solidFill>
+          <a:schemeClr val="phClr"/>
+        </a:solidFill>
+        <a:gradFill rotWithShape="1">
+          <a:gsLst>
+            <a:gs pos="0">
+              <a:schemeClr val="phClr">
+                <a:tint val="40000"/>
+                <a:satMod val="350000"/>
+              </a:schemeClr>
+            </a:gs>
+            <a:gs pos="40000">
+              <a:schemeClr val="phClr">
+                <a:tint val="45000"/>
+                <a:shade val="99000"/>
+                <a:satMod val="350000"/>
+              </a:schemeClr>
+            </a:gs>
+            <a:gs pos="100000">
+              <a:schemeClr val="phClr">
+                <a:shade val="20000"/>
+                <a:satMod val="255000"/>
+              </a:schemeClr>
+            </a:gs>
+          </a:gsLst>
+          <a:path path="circle">
+            <a:fillToRect l="50000" t="-80000" r="50000" b="180000"/>
+          </a:path>
+        </a:gradFill>
+        <a:gradFill rotWithShape="1">
+          <a:gsLst>
+            <a:gs pos="0">
+              <a:schemeClr val="phClr">
+                <a:tint val="80000"/>
+                <a:satMod val="300000"/>
+              </a:schemeClr>
+            </a:gs>
+            <a:gs pos="100000">
+              <a:schemeClr val="phClr">
+                <a:shade val="30000"/>
+                <a:satMod val="200000"/>
+              </a:schemeClr>
+            </a:gs>
+          </a:gsLst>
+          <a:path path="circle">
+            <a:fillToRect l="50000" t="50000" r="50000" b="50000"/>
+          </a:path>
+        </a:gradFill>
+      </a:bgFillStyleLst>
+    </a:fmtScheme>
+  </a:themeElements>
+  <a:objectDefaults/>
+  <a:extraClrSchemeLst/>
+</a:theme>
 </file>
</xml_diff>